<commit_message>
Alterações no capítulo 4
</commit_message>
<xml_diff>
--- a/Figuras/Presentation1.pptx
+++ b/Figuras/Presentation1.pptx
@@ -7,6 +7,9 @@
   <p:sldIdLst>
     <p:sldId id="256" r:id="rId2"/>
     <p:sldId id="257" r:id="rId3"/>
+    <p:sldId id="258" r:id="rId4"/>
+    <p:sldId id="259" r:id="rId5"/>
+    <p:sldId id="260" r:id="rId6"/>
   </p:sldIdLst>
   <p:sldSz cx="12192000" cy="6858000"/>
   <p:notesSz cx="6858000" cy="9144000"/>
@@ -262,7 +265,7 @@
           <a:p>
             <a:fld id="{5135F40E-8B21-4562-A227-5932CD61C66C}" type="datetimeFigureOut">
               <a:rPr lang="pt-BR" smtClean="0"/>
-              <a:t>12/09/2018</a:t>
+              <a:t>15/09/2018</a:t>
             </a:fld>
             <a:endParaRPr lang="pt-BR"/>
           </a:p>
@@ -462,7 +465,7 @@
           <a:p>
             <a:fld id="{5135F40E-8B21-4562-A227-5932CD61C66C}" type="datetimeFigureOut">
               <a:rPr lang="pt-BR" smtClean="0"/>
-              <a:t>12/09/2018</a:t>
+              <a:t>15/09/2018</a:t>
             </a:fld>
             <a:endParaRPr lang="pt-BR"/>
           </a:p>
@@ -672,7 +675,7 @@
           <a:p>
             <a:fld id="{5135F40E-8B21-4562-A227-5932CD61C66C}" type="datetimeFigureOut">
               <a:rPr lang="pt-BR" smtClean="0"/>
-              <a:t>12/09/2018</a:t>
+              <a:t>15/09/2018</a:t>
             </a:fld>
             <a:endParaRPr lang="pt-BR"/>
           </a:p>
@@ -872,7 +875,7 @@
           <a:p>
             <a:fld id="{5135F40E-8B21-4562-A227-5932CD61C66C}" type="datetimeFigureOut">
               <a:rPr lang="pt-BR" smtClean="0"/>
-              <a:t>12/09/2018</a:t>
+              <a:t>15/09/2018</a:t>
             </a:fld>
             <a:endParaRPr lang="pt-BR"/>
           </a:p>
@@ -1148,7 +1151,7 @@
           <a:p>
             <a:fld id="{5135F40E-8B21-4562-A227-5932CD61C66C}" type="datetimeFigureOut">
               <a:rPr lang="pt-BR" smtClean="0"/>
-              <a:t>12/09/2018</a:t>
+              <a:t>15/09/2018</a:t>
             </a:fld>
             <a:endParaRPr lang="pt-BR"/>
           </a:p>
@@ -1416,7 +1419,7 @@
           <a:p>
             <a:fld id="{5135F40E-8B21-4562-A227-5932CD61C66C}" type="datetimeFigureOut">
               <a:rPr lang="pt-BR" smtClean="0"/>
-              <a:t>12/09/2018</a:t>
+              <a:t>15/09/2018</a:t>
             </a:fld>
             <a:endParaRPr lang="pt-BR"/>
           </a:p>
@@ -1831,7 +1834,7 @@
           <a:p>
             <a:fld id="{5135F40E-8B21-4562-A227-5932CD61C66C}" type="datetimeFigureOut">
               <a:rPr lang="pt-BR" smtClean="0"/>
-              <a:t>12/09/2018</a:t>
+              <a:t>15/09/2018</a:t>
             </a:fld>
             <a:endParaRPr lang="pt-BR"/>
           </a:p>
@@ -1973,7 +1976,7 @@
           <a:p>
             <a:fld id="{5135F40E-8B21-4562-A227-5932CD61C66C}" type="datetimeFigureOut">
               <a:rPr lang="pt-BR" smtClean="0"/>
-              <a:t>12/09/2018</a:t>
+              <a:t>15/09/2018</a:t>
             </a:fld>
             <a:endParaRPr lang="pt-BR"/>
           </a:p>
@@ -2086,7 +2089,7 @@
           <a:p>
             <a:fld id="{5135F40E-8B21-4562-A227-5932CD61C66C}" type="datetimeFigureOut">
               <a:rPr lang="pt-BR" smtClean="0"/>
-              <a:t>12/09/2018</a:t>
+              <a:t>15/09/2018</a:t>
             </a:fld>
             <a:endParaRPr lang="pt-BR"/>
           </a:p>
@@ -2399,7 +2402,7 @@
           <a:p>
             <a:fld id="{5135F40E-8B21-4562-A227-5932CD61C66C}" type="datetimeFigureOut">
               <a:rPr lang="pt-BR" smtClean="0"/>
-              <a:t>12/09/2018</a:t>
+              <a:t>15/09/2018</a:t>
             </a:fld>
             <a:endParaRPr lang="pt-BR"/>
           </a:p>
@@ -2688,7 +2691,7 @@
           <a:p>
             <a:fld id="{5135F40E-8B21-4562-A227-5932CD61C66C}" type="datetimeFigureOut">
               <a:rPr lang="pt-BR" smtClean="0"/>
-              <a:t>12/09/2018</a:t>
+              <a:t>15/09/2018</a:t>
             </a:fld>
             <a:endParaRPr lang="pt-BR"/>
           </a:p>
@@ -2931,7 +2934,7 @@
           <a:p>
             <a:fld id="{5135F40E-8B21-4562-A227-5932CD61C66C}" type="datetimeFigureOut">
               <a:rPr lang="pt-BR" smtClean="0"/>
-              <a:t>12/09/2018</a:t>
+              <a:t>15/09/2018</a:t>
             </a:fld>
             <a:endParaRPr lang="pt-BR"/>
           </a:p>
@@ -4222,6 +4225,3259 @@
 </p:sld>
 </file>
 
+<file path=ppt/slides/slide3.xml><?xml version="1.0" encoding="utf-8"?>
+<p:sld xmlns:a="http://schemas.openxmlformats.org/drawingml/2006/main" xmlns:r="http://schemas.openxmlformats.org/officeDocument/2006/relationships" xmlns:p="http://schemas.openxmlformats.org/presentationml/2006/main">
+  <p:cSld>
+    <p:spTree>
+      <p:nvGrpSpPr>
+        <p:cNvPr id="1" name=""/>
+        <p:cNvGrpSpPr/>
+        <p:nvPr/>
+      </p:nvGrpSpPr>
+      <p:grpSpPr>
+        <a:xfrm>
+          <a:off x="0" y="0"/>
+          <a:ext cx="0" cy="0"/>
+          <a:chOff x="0" y="0"/>
+          <a:chExt cx="0" cy="0"/>
+        </a:xfrm>
+      </p:grpSpPr>
+      <p:sp>
+        <p:nvSpPr>
+          <p:cNvPr id="4" name="Rectangle 3">
+            <a:extLst>
+              <a:ext uri="{FF2B5EF4-FFF2-40B4-BE49-F238E27FC236}">
+                <a16:creationId xmlns:a16="http://schemas.microsoft.com/office/drawing/2014/main" id="{DDC988FC-731D-48A0-ACE3-1BFBC7F28680}"/>
+              </a:ext>
+            </a:extLst>
+          </p:cNvPr>
+          <p:cNvSpPr/>
+          <p:nvPr/>
+        </p:nvSpPr>
+        <p:spPr>
+          <a:xfrm>
+            <a:off x="805344" y="1350627"/>
+            <a:ext cx="2298583" cy="3458923"/>
+          </a:xfrm>
+          <a:prstGeom prst="rect">
+            <a:avLst/>
+          </a:prstGeom>
+          <a:gradFill flip="none" rotWithShape="1">
+            <a:gsLst>
+              <a:gs pos="0">
+                <a:schemeClr val="accent1">
+                  <a:tint val="66000"/>
+                  <a:satMod val="160000"/>
+                </a:schemeClr>
+              </a:gs>
+              <a:gs pos="50000">
+                <a:schemeClr val="accent1">
+                  <a:tint val="44500"/>
+                  <a:satMod val="160000"/>
+                </a:schemeClr>
+              </a:gs>
+              <a:gs pos="100000">
+                <a:schemeClr val="accent1">
+                  <a:tint val="23500"/>
+                  <a:satMod val="160000"/>
+                </a:schemeClr>
+              </a:gs>
+            </a:gsLst>
+            <a:lin ang="5400000" scaled="1"/>
+            <a:tileRect/>
+          </a:gradFill>
+          <a:ln w="38100">
+            <a:solidFill>
+              <a:schemeClr val="tx1"/>
+            </a:solidFill>
+          </a:ln>
+        </p:spPr>
+        <p:style>
+          <a:lnRef idx="2">
+            <a:schemeClr val="accent1">
+              <a:shade val="50000"/>
+            </a:schemeClr>
+          </a:lnRef>
+          <a:fillRef idx="1">
+            <a:schemeClr val="accent1"/>
+          </a:fillRef>
+          <a:effectRef idx="0">
+            <a:schemeClr val="accent1"/>
+          </a:effectRef>
+          <a:fontRef idx="minor">
+            <a:schemeClr val="lt1"/>
+          </a:fontRef>
+        </p:style>
+        <p:txBody>
+          <a:bodyPr rtlCol="0" anchor="ctr"/>
+          <a:lstStyle/>
+          <a:p>
+            <a:pPr algn="ctr"/>
+            <a:endParaRPr lang="pt-BR"/>
+          </a:p>
+        </p:txBody>
+      </p:sp>
+      <p:cxnSp>
+        <p:nvCxnSpPr>
+          <p:cNvPr id="6" name="Straight Connector 5">
+            <a:extLst>
+              <a:ext uri="{FF2B5EF4-FFF2-40B4-BE49-F238E27FC236}">
+                <a16:creationId xmlns:a16="http://schemas.microsoft.com/office/drawing/2014/main" id="{21BAAC08-5A4F-42B9-AD3C-6AFDACD08391}"/>
+              </a:ext>
+            </a:extLst>
+          </p:cNvPr>
+          <p:cNvCxnSpPr/>
+          <p:nvPr/>
+        </p:nvCxnSpPr>
+        <p:spPr>
+          <a:xfrm>
+            <a:off x="805344" y="2600588"/>
+            <a:ext cx="2298583" cy="0"/>
+          </a:xfrm>
+          <a:prstGeom prst="line">
+            <a:avLst/>
+          </a:prstGeom>
+          <a:ln w="38100">
+            <a:solidFill>
+              <a:schemeClr val="tx1"/>
+            </a:solidFill>
+          </a:ln>
+        </p:spPr>
+        <p:style>
+          <a:lnRef idx="1">
+            <a:schemeClr val="accent1"/>
+          </a:lnRef>
+          <a:fillRef idx="0">
+            <a:schemeClr val="accent1"/>
+          </a:fillRef>
+          <a:effectRef idx="0">
+            <a:schemeClr val="accent1"/>
+          </a:effectRef>
+          <a:fontRef idx="minor">
+            <a:schemeClr val="tx1"/>
+          </a:fontRef>
+        </p:style>
+      </p:cxnSp>
+      <p:cxnSp>
+        <p:nvCxnSpPr>
+          <p:cNvPr id="7" name="Straight Connector 6">
+            <a:extLst>
+              <a:ext uri="{FF2B5EF4-FFF2-40B4-BE49-F238E27FC236}">
+                <a16:creationId xmlns:a16="http://schemas.microsoft.com/office/drawing/2014/main" id="{FB57D9EE-B9C5-47BD-AADE-080821F9470B}"/>
+              </a:ext>
+            </a:extLst>
+          </p:cNvPr>
+          <p:cNvCxnSpPr/>
+          <p:nvPr/>
+        </p:nvCxnSpPr>
+        <p:spPr>
+          <a:xfrm>
+            <a:off x="805344" y="3054991"/>
+            <a:ext cx="2298583" cy="0"/>
+          </a:xfrm>
+          <a:prstGeom prst="line">
+            <a:avLst/>
+          </a:prstGeom>
+          <a:ln w="38100">
+            <a:solidFill>
+              <a:schemeClr val="tx1"/>
+            </a:solidFill>
+          </a:ln>
+        </p:spPr>
+        <p:style>
+          <a:lnRef idx="1">
+            <a:schemeClr val="accent1"/>
+          </a:lnRef>
+          <a:fillRef idx="0">
+            <a:schemeClr val="accent1"/>
+          </a:fillRef>
+          <a:effectRef idx="0">
+            <a:schemeClr val="accent1"/>
+          </a:effectRef>
+          <a:fontRef idx="minor">
+            <a:schemeClr val="tx1"/>
+          </a:fontRef>
+        </p:style>
+      </p:cxnSp>
+      <p:cxnSp>
+        <p:nvCxnSpPr>
+          <p:cNvPr id="8" name="Straight Connector 7">
+            <a:extLst>
+              <a:ext uri="{FF2B5EF4-FFF2-40B4-BE49-F238E27FC236}">
+                <a16:creationId xmlns:a16="http://schemas.microsoft.com/office/drawing/2014/main" id="{5865FE1E-666C-499A-A999-416D272EF4A7}"/>
+              </a:ext>
+            </a:extLst>
+          </p:cNvPr>
+          <p:cNvCxnSpPr/>
+          <p:nvPr/>
+        </p:nvCxnSpPr>
+        <p:spPr>
+          <a:xfrm>
+            <a:off x="805344" y="3549942"/>
+            <a:ext cx="2298583" cy="0"/>
+          </a:xfrm>
+          <a:prstGeom prst="line">
+            <a:avLst/>
+          </a:prstGeom>
+          <a:ln w="38100">
+            <a:solidFill>
+              <a:schemeClr val="tx1"/>
+            </a:solidFill>
+          </a:ln>
+        </p:spPr>
+        <p:style>
+          <a:lnRef idx="1">
+            <a:schemeClr val="accent1"/>
+          </a:lnRef>
+          <a:fillRef idx="0">
+            <a:schemeClr val="accent1"/>
+          </a:fillRef>
+          <a:effectRef idx="0">
+            <a:schemeClr val="accent1"/>
+          </a:effectRef>
+          <a:fontRef idx="minor">
+            <a:schemeClr val="tx1"/>
+          </a:fontRef>
+        </p:style>
+      </p:cxnSp>
+      <p:sp>
+        <p:nvSpPr>
+          <p:cNvPr id="9" name="TextBox 8">
+            <a:extLst>
+              <a:ext uri="{FF2B5EF4-FFF2-40B4-BE49-F238E27FC236}">
+                <a16:creationId xmlns:a16="http://schemas.microsoft.com/office/drawing/2014/main" id="{BE1F5325-8F4F-423B-AF2F-6CDA4D6E9572}"/>
+              </a:ext>
+            </a:extLst>
+          </p:cNvPr>
+          <p:cNvSpPr txBox="1"/>
+          <p:nvPr/>
+        </p:nvSpPr>
+        <p:spPr>
+          <a:xfrm>
+            <a:off x="1253962" y="1831201"/>
+            <a:ext cx="1401346" cy="338554"/>
+          </a:xfrm>
+          <a:prstGeom prst="rect">
+            <a:avLst/>
+          </a:prstGeom>
+          <a:noFill/>
+        </p:spPr>
+        <p:txBody>
+          <a:bodyPr wrap="none" rtlCol="0">
+            <a:spAutoFit/>
+          </a:bodyPr>
+          <a:lstStyle/>
+          <a:p>
+            <a:r>
+              <a:rPr lang="pt-BR" sz="1600" b="1" dirty="0">
+                <a:latin typeface="Arial" panose="020B0604020202020204" pitchFamily="34" charset="0"/>
+                <a:cs typeface="Arial" panose="020B0604020202020204" pitchFamily="34" charset="0"/>
+              </a:rPr>
+              <a:t>APLICAÇÃO</a:t>
+            </a:r>
+          </a:p>
+        </p:txBody>
+      </p:sp>
+      <p:sp>
+        <p:nvSpPr>
+          <p:cNvPr id="10" name="TextBox 9">
+            <a:extLst>
+              <a:ext uri="{FF2B5EF4-FFF2-40B4-BE49-F238E27FC236}">
+                <a16:creationId xmlns:a16="http://schemas.microsoft.com/office/drawing/2014/main" id="{27352528-F266-461B-BA52-D4FA8BD37306}"/>
+              </a:ext>
+            </a:extLst>
+          </p:cNvPr>
+          <p:cNvSpPr txBox="1"/>
+          <p:nvPr/>
+        </p:nvSpPr>
+        <p:spPr>
+          <a:xfrm>
+            <a:off x="1157782" y="2660660"/>
+            <a:ext cx="1593706" cy="338554"/>
+          </a:xfrm>
+          <a:prstGeom prst="rect">
+            <a:avLst/>
+          </a:prstGeom>
+          <a:noFill/>
+        </p:spPr>
+        <p:txBody>
+          <a:bodyPr wrap="none" rtlCol="0">
+            <a:spAutoFit/>
+          </a:bodyPr>
+          <a:lstStyle/>
+          <a:p>
+            <a:r>
+              <a:rPr lang="pt-BR" sz="1600" b="1" dirty="0">
+                <a:latin typeface="Arial" panose="020B0604020202020204" pitchFamily="34" charset="0"/>
+                <a:cs typeface="Arial" panose="020B0604020202020204" pitchFamily="34" charset="0"/>
+              </a:rPr>
+              <a:t>TRANSPORTE</a:t>
+            </a:r>
+          </a:p>
+        </p:txBody>
+      </p:sp>
+      <p:sp>
+        <p:nvSpPr>
+          <p:cNvPr id="11" name="TextBox 10">
+            <a:extLst>
+              <a:ext uri="{FF2B5EF4-FFF2-40B4-BE49-F238E27FC236}">
+                <a16:creationId xmlns:a16="http://schemas.microsoft.com/office/drawing/2014/main" id="{7CBC8697-84E2-413A-834A-35CB0E619143}"/>
+              </a:ext>
+            </a:extLst>
+          </p:cNvPr>
+          <p:cNvSpPr txBox="1"/>
+          <p:nvPr/>
+        </p:nvSpPr>
+        <p:spPr>
+          <a:xfrm>
+            <a:off x="1350944" y="3120508"/>
+            <a:ext cx="1207382" cy="338554"/>
+          </a:xfrm>
+          <a:prstGeom prst="rect">
+            <a:avLst/>
+          </a:prstGeom>
+          <a:noFill/>
+        </p:spPr>
+        <p:txBody>
+          <a:bodyPr wrap="none" rtlCol="0">
+            <a:spAutoFit/>
+          </a:bodyPr>
+          <a:lstStyle/>
+          <a:p>
+            <a:r>
+              <a:rPr lang="pt-BR" sz="1600" b="1" dirty="0">
+                <a:latin typeface="Arial" panose="020B0604020202020204" pitchFamily="34" charset="0"/>
+                <a:cs typeface="Arial" panose="020B0604020202020204" pitchFamily="34" charset="0"/>
+              </a:rPr>
+              <a:t>INTERNET</a:t>
+            </a:r>
+          </a:p>
+        </p:txBody>
+      </p:sp>
+      <p:sp>
+        <p:nvSpPr>
+          <p:cNvPr id="12" name="TextBox 11">
+            <a:extLst>
+              <a:ext uri="{FF2B5EF4-FFF2-40B4-BE49-F238E27FC236}">
+                <a16:creationId xmlns:a16="http://schemas.microsoft.com/office/drawing/2014/main" id="{B580F6CE-C6DE-4D48-9D4E-84C5205EF7C5}"/>
+              </a:ext>
+            </a:extLst>
+          </p:cNvPr>
+          <p:cNvSpPr txBox="1"/>
+          <p:nvPr/>
+        </p:nvSpPr>
+        <p:spPr>
+          <a:xfrm>
+            <a:off x="1075468" y="3752505"/>
+            <a:ext cx="1758334" cy="584775"/>
+          </a:xfrm>
+          <a:prstGeom prst="rect">
+            <a:avLst/>
+          </a:prstGeom>
+          <a:noFill/>
+        </p:spPr>
+        <p:txBody>
+          <a:bodyPr wrap="square" rtlCol="0">
+            <a:spAutoFit/>
+          </a:bodyPr>
+          <a:lstStyle/>
+          <a:p>
+            <a:pPr algn="ctr"/>
+            <a:r>
+              <a:rPr lang="pt-BR" sz="1600" b="1" dirty="0">
+                <a:latin typeface="Arial" panose="020B0604020202020204" pitchFamily="34" charset="0"/>
+                <a:cs typeface="Arial" panose="020B0604020202020204" pitchFamily="34" charset="0"/>
+              </a:rPr>
+              <a:t>INTERFACE COM A REDE</a:t>
+            </a:r>
+          </a:p>
+        </p:txBody>
+      </p:sp>
+      <p:sp>
+        <p:nvSpPr>
+          <p:cNvPr id="13" name="Rectangle 12">
+            <a:extLst>
+              <a:ext uri="{FF2B5EF4-FFF2-40B4-BE49-F238E27FC236}">
+                <a16:creationId xmlns:a16="http://schemas.microsoft.com/office/drawing/2014/main" id="{A237F34B-CF11-4201-A0B8-65A404B4C370}"/>
+              </a:ext>
+            </a:extLst>
+          </p:cNvPr>
+          <p:cNvSpPr/>
+          <p:nvPr/>
+        </p:nvSpPr>
+        <p:spPr>
+          <a:xfrm>
+            <a:off x="4246229" y="1350628"/>
+            <a:ext cx="1517007" cy="527108"/>
+          </a:xfrm>
+          <a:prstGeom prst="rect">
+            <a:avLst/>
+          </a:prstGeom>
+          <a:gradFill flip="none" rotWithShape="1">
+            <a:gsLst>
+              <a:gs pos="0">
+                <a:schemeClr val="accent1">
+                  <a:tint val="66000"/>
+                  <a:satMod val="160000"/>
+                </a:schemeClr>
+              </a:gs>
+              <a:gs pos="50000">
+                <a:schemeClr val="accent1">
+                  <a:tint val="44500"/>
+                  <a:satMod val="160000"/>
+                </a:schemeClr>
+              </a:gs>
+              <a:gs pos="100000">
+                <a:schemeClr val="accent1">
+                  <a:tint val="23500"/>
+                  <a:satMod val="160000"/>
+                </a:schemeClr>
+              </a:gs>
+            </a:gsLst>
+            <a:lin ang="5400000" scaled="1"/>
+            <a:tileRect/>
+          </a:gradFill>
+          <a:ln w="38100">
+            <a:solidFill>
+              <a:schemeClr val="tx1"/>
+            </a:solidFill>
+          </a:ln>
+        </p:spPr>
+        <p:style>
+          <a:lnRef idx="2">
+            <a:schemeClr val="accent1">
+              <a:shade val="50000"/>
+            </a:schemeClr>
+          </a:lnRef>
+          <a:fillRef idx="1">
+            <a:schemeClr val="accent1"/>
+          </a:fillRef>
+          <a:effectRef idx="0">
+            <a:schemeClr val="accent1"/>
+          </a:effectRef>
+          <a:fontRef idx="minor">
+            <a:schemeClr val="lt1"/>
+          </a:fontRef>
+        </p:style>
+        <p:txBody>
+          <a:bodyPr rtlCol="0" anchor="ctr"/>
+          <a:lstStyle/>
+          <a:p>
+            <a:pPr algn="ctr"/>
+            <a:r>
+              <a:rPr lang="en-US" sz="1400" b="1" dirty="0">
+                <a:solidFill>
+                  <a:schemeClr val="tx1"/>
+                </a:solidFill>
+              </a:rPr>
+              <a:t>HTTP/FTP/DHCP</a:t>
+            </a:r>
+            <a:endParaRPr lang="pt-BR" sz="1400" b="1" dirty="0">
+              <a:solidFill>
+                <a:schemeClr val="tx1"/>
+              </a:solidFill>
+            </a:endParaRPr>
+          </a:p>
+        </p:txBody>
+      </p:sp>
+      <p:sp>
+        <p:nvSpPr>
+          <p:cNvPr id="14" name="Rectangle 13">
+            <a:extLst>
+              <a:ext uri="{FF2B5EF4-FFF2-40B4-BE49-F238E27FC236}">
+                <a16:creationId xmlns:a16="http://schemas.microsoft.com/office/drawing/2014/main" id="{1A3FCE3E-42A7-427A-A92E-4B3CED6AB1F7}"/>
+              </a:ext>
+            </a:extLst>
+          </p:cNvPr>
+          <p:cNvSpPr/>
+          <p:nvPr/>
+        </p:nvSpPr>
+        <p:spPr>
+          <a:xfrm>
+            <a:off x="6024695" y="1350628"/>
+            <a:ext cx="3228362" cy="527108"/>
+          </a:xfrm>
+          <a:prstGeom prst="rect">
+            <a:avLst/>
+          </a:prstGeom>
+          <a:gradFill flip="none" rotWithShape="1">
+            <a:gsLst>
+              <a:gs pos="0">
+                <a:schemeClr val="accent1">
+                  <a:tint val="66000"/>
+                  <a:satMod val="160000"/>
+                </a:schemeClr>
+              </a:gs>
+              <a:gs pos="50000">
+                <a:schemeClr val="accent1">
+                  <a:tint val="44500"/>
+                  <a:satMod val="160000"/>
+                </a:schemeClr>
+              </a:gs>
+              <a:gs pos="100000">
+                <a:schemeClr val="accent1">
+                  <a:tint val="23500"/>
+                  <a:satMod val="160000"/>
+                </a:schemeClr>
+              </a:gs>
+            </a:gsLst>
+            <a:lin ang="5400000" scaled="1"/>
+            <a:tileRect/>
+          </a:gradFill>
+          <a:ln w="38100">
+            <a:solidFill>
+              <a:schemeClr val="tx1"/>
+            </a:solidFill>
+          </a:ln>
+        </p:spPr>
+        <p:style>
+          <a:lnRef idx="2">
+            <a:schemeClr val="accent1">
+              <a:shade val="50000"/>
+            </a:schemeClr>
+          </a:lnRef>
+          <a:fillRef idx="1">
+            <a:schemeClr val="accent1"/>
+          </a:fillRef>
+          <a:effectRef idx="0">
+            <a:schemeClr val="accent1"/>
+          </a:effectRef>
+          <a:fontRef idx="minor">
+            <a:schemeClr val="lt1"/>
+          </a:fontRef>
+        </p:style>
+        <p:txBody>
+          <a:bodyPr rtlCol="0" anchor="ctr"/>
+          <a:lstStyle/>
+          <a:p>
+            <a:pPr algn="ctr"/>
+            <a:r>
+              <a:rPr lang="en-US" b="1" dirty="0">
+                <a:solidFill>
+                  <a:schemeClr val="tx1"/>
+                </a:solidFill>
+              </a:rPr>
+              <a:t>Stack Task</a:t>
+            </a:r>
+            <a:endParaRPr lang="pt-BR" b="1" dirty="0">
+              <a:solidFill>
+                <a:schemeClr val="tx1"/>
+              </a:solidFill>
+            </a:endParaRPr>
+          </a:p>
+        </p:txBody>
+      </p:sp>
+      <p:sp>
+        <p:nvSpPr>
+          <p:cNvPr id="15" name="Rectangle 14">
+            <a:extLst>
+              <a:ext uri="{FF2B5EF4-FFF2-40B4-BE49-F238E27FC236}">
+                <a16:creationId xmlns:a16="http://schemas.microsoft.com/office/drawing/2014/main" id="{5B5D4B05-2E70-42C5-A663-7CF401709499}"/>
+              </a:ext>
+            </a:extLst>
+          </p:cNvPr>
+          <p:cNvSpPr/>
+          <p:nvPr/>
+        </p:nvSpPr>
+        <p:spPr>
+          <a:xfrm>
+            <a:off x="4901968" y="2337034"/>
+            <a:ext cx="1517007" cy="527108"/>
+          </a:xfrm>
+          <a:prstGeom prst="rect">
+            <a:avLst/>
+          </a:prstGeom>
+          <a:gradFill flip="none" rotWithShape="1">
+            <a:gsLst>
+              <a:gs pos="0">
+                <a:schemeClr val="accent1">
+                  <a:tint val="66000"/>
+                  <a:satMod val="160000"/>
+                </a:schemeClr>
+              </a:gs>
+              <a:gs pos="50000">
+                <a:schemeClr val="accent1">
+                  <a:tint val="44500"/>
+                  <a:satMod val="160000"/>
+                </a:schemeClr>
+              </a:gs>
+              <a:gs pos="100000">
+                <a:schemeClr val="accent1">
+                  <a:tint val="23500"/>
+                  <a:satMod val="160000"/>
+                </a:schemeClr>
+              </a:gs>
+            </a:gsLst>
+            <a:lin ang="5400000" scaled="1"/>
+            <a:tileRect/>
+          </a:gradFill>
+          <a:ln w="38100">
+            <a:solidFill>
+              <a:schemeClr val="tx1"/>
+            </a:solidFill>
+          </a:ln>
+        </p:spPr>
+        <p:style>
+          <a:lnRef idx="2">
+            <a:schemeClr val="accent1">
+              <a:shade val="50000"/>
+            </a:schemeClr>
+          </a:lnRef>
+          <a:fillRef idx="1">
+            <a:schemeClr val="accent1"/>
+          </a:fillRef>
+          <a:effectRef idx="0">
+            <a:schemeClr val="accent1"/>
+          </a:effectRef>
+          <a:fontRef idx="minor">
+            <a:schemeClr val="lt1"/>
+          </a:fontRef>
+        </p:style>
+        <p:txBody>
+          <a:bodyPr rtlCol="0" anchor="ctr"/>
+          <a:lstStyle/>
+          <a:p>
+            <a:pPr algn="ctr"/>
+            <a:r>
+              <a:rPr lang="en-US" b="1" dirty="0">
+                <a:solidFill>
+                  <a:schemeClr val="tx1"/>
+                </a:solidFill>
+              </a:rPr>
+              <a:t>UDP/TCP</a:t>
+            </a:r>
+            <a:endParaRPr lang="pt-BR" b="1" dirty="0">
+              <a:solidFill>
+                <a:schemeClr val="tx1"/>
+              </a:solidFill>
+            </a:endParaRPr>
+          </a:p>
+        </p:txBody>
+      </p:sp>
+      <p:sp>
+        <p:nvSpPr>
+          <p:cNvPr id="16" name="Rectangle 15">
+            <a:extLst>
+              <a:ext uri="{FF2B5EF4-FFF2-40B4-BE49-F238E27FC236}">
+                <a16:creationId xmlns:a16="http://schemas.microsoft.com/office/drawing/2014/main" id="{CBF2E752-4831-472F-9E5C-E69DD2D11DB4}"/>
+              </a:ext>
+            </a:extLst>
+          </p:cNvPr>
+          <p:cNvSpPr/>
+          <p:nvPr/>
+        </p:nvSpPr>
+        <p:spPr>
+          <a:xfrm>
+            <a:off x="5232636" y="3248013"/>
+            <a:ext cx="1517007" cy="527108"/>
+          </a:xfrm>
+          <a:prstGeom prst="rect">
+            <a:avLst/>
+          </a:prstGeom>
+          <a:gradFill flip="none" rotWithShape="1">
+            <a:gsLst>
+              <a:gs pos="0">
+                <a:schemeClr val="accent1">
+                  <a:tint val="66000"/>
+                  <a:satMod val="160000"/>
+                </a:schemeClr>
+              </a:gs>
+              <a:gs pos="50000">
+                <a:schemeClr val="accent1">
+                  <a:tint val="44500"/>
+                  <a:satMod val="160000"/>
+                </a:schemeClr>
+              </a:gs>
+              <a:gs pos="100000">
+                <a:schemeClr val="accent1">
+                  <a:tint val="23500"/>
+                  <a:satMod val="160000"/>
+                </a:schemeClr>
+              </a:gs>
+            </a:gsLst>
+            <a:lin ang="5400000" scaled="1"/>
+            <a:tileRect/>
+          </a:gradFill>
+          <a:ln w="38100">
+            <a:solidFill>
+              <a:schemeClr val="tx1"/>
+            </a:solidFill>
+          </a:ln>
+        </p:spPr>
+        <p:style>
+          <a:lnRef idx="2">
+            <a:schemeClr val="accent1">
+              <a:shade val="50000"/>
+            </a:schemeClr>
+          </a:lnRef>
+          <a:fillRef idx="1">
+            <a:schemeClr val="accent1"/>
+          </a:fillRef>
+          <a:effectRef idx="0">
+            <a:schemeClr val="accent1"/>
+          </a:effectRef>
+          <a:fontRef idx="minor">
+            <a:schemeClr val="lt1"/>
+          </a:fontRef>
+        </p:style>
+        <p:txBody>
+          <a:bodyPr rtlCol="0" anchor="ctr"/>
+          <a:lstStyle/>
+          <a:p>
+            <a:pPr algn="ctr"/>
+            <a:r>
+              <a:rPr lang="en-US" b="1" dirty="0">
+                <a:solidFill>
+                  <a:schemeClr val="tx1"/>
+                </a:solidFill>
+              </a:rPr>
+              <a:t>IP</a:t>
+            </a:r>
+            <a:endParaRPr lang="pt-BR" b="1" dirty="0">
+              <a:solidFill>
+                <a:schemeClr val="tx1"/>
+              </a:solidFill>
+            </a:endParaRPr>
+          </a:p>
+        </p:txBody>
+      </p:sp>
+      <p:sp>
+        <p:nvSpPr>
+          <p:cNvPr id="18" name="Rectangle 17">
+            <a:extLst>
+              <a:ext uri="{FF2B5EF4-FFF2-40B4-BE49-F238E27FC236}">
+                <a16:creationId xmlns:a16="http://schemas.microsoft.com/office/drawing/2014/main" id="{B2E2280B-4ACC-4B23-8A3A-92ADB5106D21}"/>
+              </a:ext>
+            </a:extLst>
+          </p:cNvPr>
+          <p:cNvSpPr/>
+          <p:nvPr/>
+        </p:nvSpPr>
+        <p:spPr>
+          <a:xfrm>
+            <a:off x="4246229" y="4282455"/>
+            <a:ext cx="5006828" cy="527108"/>
+          </a:xfrm>
+          <a:prstGeom prst="rect">
+            <a:avLst/>
+          </a:prstGeom>
+          <a:gradFill flip="none" rotWithShape="1">
+            <a:gsLst>
+              <a:gs pos="0">
+                <a:schemeClr val="accent1">
+                  <a:tint val="66000"/>
+                  <a:satMod val="160000"/>
+                </a:schemeClr>
+              </a:gs>
+              <a:gs pos="50000">
+                <a:schemeClr val="accent1">
+                  <a:tint val="44500"/>
+                  <a:satMod val="160000"/>
+                </a:schemeClr>
+              </a:gs>
+              <a:gs pos="100000">
+                <a:schemeClr val="accent1">
+                  <a:tint val="23500"/>
+                  <a:satMod val="160000"/>
+                </a:schemeClr>
+              </a:gs>
+            </a:gsLst>
+            <a:lin ang="5400000" scaled="1"/>
+            <a:tileRect/>
+          </a:gradFill>
+          <a:ln w="38100">
+            <a:solidFill>
+              <a:schemeClr val="tx1"/>
+            </a:solidFill>
+          </a:ln>
+        </p:spPr>
+        <p:style>
+          <a:lnRef idx="2">
+            <a:schemeClr val="accent1">
+              <a:shade val="50000"/>
+            </a:schemeClr>
+          </a:lnRef>
+          <a:fillRef idx="1">
+            <a:schemeClr val="accent1"/>
+          </a:fillRef>
+          <a:effectRef idx="0">
+            <a:schemeClr val="accent1"/>
+          </a:effectRef>
+          <a:fontRef idx="minor">
+            <a:schemeClr val="lt1"/>
+          </a:fontRef>
+        </p:style>
+        <p:txBody>
+          <a:bodyPr rtlCol="0" anchor="ctr"/>
+          <a:lstStyle/>
+          <a:p>
+            <a:pPr algn="ctr"/>
+            <a:r>
+              <a:rPr lang="en-US" b="1" dirty="0">
+                <a:solidFill>
+                  <a:schemeClr val="tx1"/>
+                </a:solidFill>
+              </a:rPr>
+              <a:t>MAC</a:t>
+            </a:r>
+            <a:endParaRPr lang="pt-BR" b="1" dirty="0">
+              <a:solidFill>
+                <a:schemeClr val="tx1"/>
+              </a:solidFill>
+            </a:endParaRPr>
+          </a:p>
+        </p:txBody>
+      </p:sp>
+      <p:sp>
+        <p:nvSpPr>
+          <p:cNvPr id="19" name="Rectangle 18">
+            <a:extLst>
+              <a:ext uri="{FF2B5EF4-FFF2-40B4-BE49-F238E27FC236}">
+                <a16:creationId xmlns:a16="http://schemas.microsoft.com/office/drawing/2014/main" id="{020954D2-5CDD-4C7A-A4C7-7C86A63EC486}"/>
+              </a:ext>
+            </a:extLst>
+          </p:cNvPr>
+          <p:cNvSpPr/>
+          <p:nvPr/>
+        </p:nvSpPr>
+        <p:spPr>
+          <a:xfrm>
+            <a:off x="7031376" y="2572673"/>
+            <a:ext cx="879444" cy="395688"/>
+          </a:xfrm>
+          <a:prstGeom prst="rect">
+            <a:avLst/>
+          </a:prstGeom>
+          <a:gradFill flip="none" rotWithShape="1">
+            <a:gsLst>
+              <a:gs pos="0">
+                <a:schemeClr val="accent1">
+                  <a:tint val="66000"/>
+                  <a:satMod val="160000"/>
+                </a:schemeClr>
+              </a:gs>
+              <a:gs pos="50000">
+                <a:schemeClr val="accent1">
+                  <a:tint val="44500"/>
+                  <a:satMod val="160000"/>
+                </a:schemeClr>
+              </a:gs>
+              <a:gs pos="100000">
+                <a:schemeClr val="accent1">
+                  <a:tint val="23500"/>
+                  <a:satMod val="160000"/>
+                </a:schemeClr>
+              </a:gs>
+            </a:gsLst>
+            <a:lin ang="5400000" scaled="1"/>
+            <a:tileRect/>
+          </a:gradFill>
+          <a:ln w="38100">
+            <a:solidFill>
+              <a:schemeClr val="tx1"/>
+            </a:solidFill>
+          </a:ln>
+        </p:spPr>
+        <p:style>
+          <a:lnRef idx="2">
+            <a:schemeClr val="accent1">
+              <a:shade val="50000"/>
+            </a:schemeClr>
+          </a:lnRef>
+          <a:fillRef idx="1">
+            <a:schemeClr val="accent1"/>
+          </a:fillRef>
+          <a:effectRef idx="0">
+            <a:schemeClr val="accent1"/>
+          </a:effectRef>
+          <a:fontRef idx="minor">
+            <a:schemeClr val="lt1"/>
+          </a:fontRef>
+        </p:style>
+        <p:txBody>
+          <a:bodyPr rtlCol="0" anchor="ctr"/>
+          <a:lstStyle/>
+          <a:p>
+            <a:pPr algn="ctr"/>
+            <a:r>
+              <a:rPr lang="en-US" b="1" dirty="0">
+                <a:solidFill>
+                  <a:schemeClr val="tx1"/>
+                </a:solidFill>
+              </a:rPr>
+              <a:t>ICMP</a:t>
+            </a:r>
+            <a:endParaRPr lang="pt-BR" b="1" dirty="0">
+              <a:solidFill>
+                <a:schemeClr val="tx1"/>
+              </a:solidFill>
+            </a:endParaRPr>
+          </a:p>
+        </p:txBody>
+      </p:sp>
+      <p:sp>
+        <p:nvSpPr>
+          <p:cNvPr id="20" name="Rectangle 19">
+            <a:extLst>
+              <a:ext uri="{FF2B5EF4-FFF2-40B4-BE49-F238E27FC236}">
+                <a16:creationId xmlns:a16="http://schemas.microsoft.com/office/drawing/2014/main" id="{C434C6FB-0BC4-46B2-A0E2-F16BFD1A3EC9}"/>
+              </a:ext>
+            </a:extLst>
+          </p:cNvPr>
+          <p:cNvSpPr/>
+          <p:nvPr/>
+        </p:nvSpPr>
+        <p:spPr>
+          <a:xfrm>
+            <a:off x="8373613" y="3024184"/>
+            <a:ext cx="879444" cy="395688"/>
+          </a:xfrm>
+          <a:prstGeom prst="rect">
+            <a:avLst/>
+          </a:prstGeom>
+          <a:gradFill flip="none" rotWithShape="1">
+            <a:gsLst>
+              <a:gs pos="0">
+                <a:schemeClr val="accent1">
+                  <a:tint val="66000"/>
+                  <a:satMod val="160000"/>
+                </a:schemeClr>
+              </a:gs>
+              <a:gs pos="50000">
+                <a:schemeClr val="accent1">
+                  <a:tint val="44500"/>
+                  <a:satMod val="160000"/>
+                </a:schemeClr>
+              </a:gs>
+              <a:gs pos="100000">
+                <a:schemeClr val="accent1">
+                  <a:tint val="23500"/>
+                  <a:satMod val="160000"/>
+                </a:schemeClr>
+              </a:gs>
+            </a:gsLst>
+            <a:lin ang="5400000" scaled="1"/>
+            <a:tileRect/>
+          </a:gradFill>
+          <a:ln w="38100">
+            <a:solidFill>
+              <a:schemeClr val="tx1"/>
+            </a:solidFill>
+          </a:ln>
+        </p:spPr>
+        <p:style>
+          <a:lnRef idx="2">
+            <a:schemeClr val="accent1">
+              <a:shade val="50000"/>
+            </a:schemeClr>
+          </a:lnRef>
+          <a:fillRef idx="1">
+            <a:schemeClr val="accent1"/>
+          </a:fillRef>
+          <a:effectRef idx="0">
+            <a:schemeClr val="accent1"/>
+          </a:effectRef>
+          <a:fontRef idx="minor">
+            <a:schemeClr val="lt1"/>
+          </a:fontRef>
+        </p:style>
+        <p:txBody>
+          <a:bodyPr rtlCol="0" anchor="ctr"/>
+          <a:lstStyle/>
+          <a:p>
+            <a:pPr algn="ctr"/>
+            <a:r>
+              <a:rPr lang="pt-BR" sz="1600" b="1" dirty="0">
+                <a:solidFill>
+                  <a:schemeClr val="tx1"/>
+                </a:solidFill>
+              </a:rPr>
+              <a:t>ARPtask</a:t>
+            </a:r>
+          </a:p>
+        </p:txBody>
+      </p:sp>
+      <p:sp>
+        <p:nvSpPr>
+          <p:cNvPr id="21" name="Rectangle 20">
+            <a:extLst>
+              <a:ext uri="{FF2B5EF4-FFF2-40B4-BE49-F238E27FC236}">
+                <a16:creationId xmlns:a16="http://schemas.microsoft.com/office/drawing/2014/main" id="{37C0C035-211E-4A50-BCB9-A5238BD2B1EF}"/>
+              </a:ext>
+            </a:extLst>
+          </p:cNvPr>
+          <p:cNvSpPr/>
+          <p:nvPr/>
+        </p:nvSpPr>
+        <p:spPr>
+          <a:xfrm>
+            <a:off x="8373613" y="3450476"/>
+            <a:ext cx="879444" cy="395688"/>
+          </a:xfrm>
+          <a:prstGeom prst="rect">
+            <a:avLst/>
+          </a:prstGeom>
+          <a:gradFill flip="none" rotWithShape="1">
+            <a:gsLst>
+              <a:gs pos="0">
+                <a:schemeClr val="accent1">
+                  <a:tint val="66000"/>
+                  <a:satMod val="160000"/>
+                </a:schemeClr>
+              </a:gs>
+              <a:gs pos="50000">
+                <a:schemeClr val="accent1">
+                  <a:tint val="44500"/>
+                  <a:satMod val="160000"/>
+                </a:schemeClr>
+              </a:gs>
+              <a:gs pos="100000">
+                <a:schemeClr val="accent1">
+                  <a:tint val="23500"/>
+                  <a:satMod val="160000"/>
+                </a:schemeClr>
+              </a:gs>
+            </a:gsLst>
+            <a:lin ang="5400000" scaled="1"/>
+            <a:tileRect/>
+          </a:gradFill>
+          <a:ln w="38100">
+            <a:solidFill>
+              <a:schemeClr val="tx1"/>
+            </a:solidFill>
+          </a:ln>
+        </p:spPr>
+        <p:style>
+          <a:lnRef idx="2">
+            <a:schemeClr val="accent1">
+              <a:shade val="50000"/>
+            </a:schemeClr>
+          </a:lnRef>
+          <a:fillRef idx="1">
+            <a:schemeClr val="accent1"/>
+          </a:fillRef>
+          <a:effectRef idx="0">
+            <a:schemeClr val="accent1"/>
+          </a:effectRef>
+          <a:fontRef idx="minor">
+            <a:schemeClr val="lt1"/>
+          </a:fontRef>
+        </p:style>
+        <p:txBody>
+          <a:bodyPr rtlCol="0" anchor="ctr"/>
+          <a:lstStyle/>
+          <a:p>
+            <a:pPr algn="ctr"/>
+            <a:r>
+              <a:rPr lang="en-US" b="1" dirty="0">
+                <a:solidFill>
+                  <a:schemeClr val="tx1"/>
+                </a:solidFill>
+              </a:rPr>
+              <a:t>ARP</a:t>
+            </a:r>
+            <a:endParaRPr lang="pt-BR" b="1" dirty="0">
+              <a:solidFill>
+                <a:schemeClr val="tx1"/>
+              </a:solidFill>
+            </a:endParaRPr>
+          </a:p>
+        </p:txBody>
+      </p:sp>
+      <p:cxnSp>
+        <p:nvCxnSpPr>
+          <p:cNvPr id="3" name="Straight Arrow Connector 2">
+            <a:extLst>
+              <a:ext uri="{FF2B5EF4-FFF2-40B4-BE49-F238E27FC236}">
+                <a16:creationId xmlns:a16="http://schemas.microsoft.com/office/drawing/2014/main" id="{72AA497A-D08B-4BFE-A723-475F3D7C85CD}"/>
+              </a:ext>
+            </a:extLst>
+          </p:cNvPr>
+          <p:cNvCxnSpPr/>
+          <p:nvPr/>
+        </p:nvCxnSpPr>
+        <p:spPr>
+          <a:xfrm>
+            <a:off x="3330429" y="1702965"/>
+            <a:ext cx="629175" cy="0"/>
+          </a:xfrm>
+          <a:prstGeom prst="straightConnector1">
+            <a:avLst/>
+          </a:prstGeom>
+          <a:ln w="38100">
+            <a:solidFill>
+              <a:schemeClr val="tx1"/>
+            </a:solidFill>
+            <a:tailEnd type="triangle"/>
+          </a:ln>
+        </p:spPr>
+        <p:style>
+          <a:lnRef idx="1">
+            <a:schemeClr val="accent1"/>
+          </a:lnRef>
+          <a:fillRef idx="0">
+            <a:schemeClr val="accent1"/>
+          </a:fillRef>
+          <a:effectRef idx="0">
+            <a:schemeClr val="accent1"/>
+          </a:effectRef>
+          <a:fontRef idx="minor">
+            <a:schemeClr val="tx1"/>
+          </a:fontRef>
+        </p:style>
+      </p:cxnSp>
+      <p:cxnSp>
+        <p:nvCxnSpPr>
+          <p:cNvPr id="22" name="Straight Arrow Connector 21">
+            <a:extLst>
+              <a:ext uri="{FF2B5EF4-FFF2-40B4-BE49-F238E27FC236}">
+                <a16:creationId xmlns:a16="http://schemas.microsoft.com/office/drawing/2014/main" id="{34DFA006-4D8A-479E-BA70-722C9E9E1CC5}"/>
+              </a:ext>
+            </a:extLst>
+          </p:cNvPr>
+          <p:cNvCxnSpPr/>
+          <p:nvPr/>
+        </p:nvCxnSpPr>
+        <p:spPr>
+          <a:xfrm>
+            <a:off x="3222770" y="2755137"/>
+            <a:ext cx="629175" cy="0"/>
+          </a:xfrm>
+          <a:prstGeom prst="straightConnector1">
+            <a:avLst/>
+          </a:prstGeom>
+          <a:ln w="38100">
+            <a:solidFill>
+              <a:schemeClr val="tx1"/>
+            </a:solidFill>
+            <a:tailEnd type="triangle"/>
+          </a:ln>
+        </p:spPr>
+        <p:style>
+          <a:lnRef idx="1">
+            <a:schemeClr val="accent1"/>
+          </a:lnRef>
+          <a:fillRef idx="0">
+            <a:schemeClr val="accent1"/>
+          </a:fillRef>
+          <a:effectRef idx="0">
+            <a:schemeClr val="accent1"/>
+          </a:effectRef>
+          <a:fontRef idx="minor">
+            <a:schemeClr val="tx1"/>
+          </a:fontRef>
+        </p:style>
+      </p:cxnSp>
+      <p:cxnSp>
+        <p:nvCxnSpPr>
+          <p:cNvPr id="23" name="Straight Arrow Connector 22">
+            <a:extLst>
+              <a:ext uri="{FF2B5EF4-FFF2-40B4-BE49-F238E27FC236}">
+                <a16:creationId xmlns:a16="http://schemas.microsoft.com/office/drawing/2014/main" id="{8C99FFDD-418E-476E-A9A7-5DDF4C9B3098}"/>
+              </a:ext>
+            </a:extLst>
+          </p:cNvPr>
+          <p:cNvCxnSpPr/>
+          <p:nvPr/>
+        </p:nvCxnSpPr>
+        <p:spPr>
+          <a:xfrm>
+            <a:off x="3222769" y="3289785"/>
+            <a:ext cx="629175" cy="0"/>
+          </a:xfrm>
+          <a:prstGeom prst="straightConnector1">
+            <a:avLst/>
+          </a:prstGeom>
+          <a:ln w="38100">
+            <a:solidFill>
+              <a:schemeClr val="tx1"/>
+            </a:solidFill>
+            <a:tailEnd type="triangle"/>
+          </a:ln>
+        </p:spPr>
+        <p:style>
+          <a:lnRef idx="1">
+            <a:schemeClr val="accent1"/>
+          </a:lnRef>
+          <a:fillRef idx="0">
+            <a:schemeClr val="accent1"/>
+          </a:fillRef>
+          <a:effectRef idx="0">
+            <a:schemeClr val="accent1"/>
+          </a:effectRef>
+          <a:fontRef idx="minor">
+            <a:schemeClr val="tx1"/>
+          </a:fontRef>
+        </p:style>
+      </p:cxnSp>
+      <p:cxnSp>
+        <p:nvCxnSpPr>
+          <p:cNvPr id="24" name="Straight Arrow Connector 23">
+            <a:extLst>
+              <a:ext uri="{FF2B5EF4-FFF2-40B4-BE49-F238E27FC236}">
+                <a16:creationId xmlns:a16="http://schemas.microsoft.com/office/drawing/2014/main" id="{723FEB5D-5151-47DB-96E4-F62F38750405}"/>
+              </a:ext>
+            </a:extLst>
+          </p:cNvPr>
+          <p:cNvCxnSpPr/>
+          <p:nvPr/>
+        </p:nvCxnSpPr>
+        <p:spPr>
+          <a:xfrm>
+            <a:off x="3222768" y="4488684"/>
+            <a:ext cx="629175" cy="0"/>
+          </a:xfrm>
+          <a:prstGeom prst="straightConnector1">
+            <a:avLst/>
+          </a:prstGeom>
+          <a:ln w="38100">
+            <a:solidFill>
+              <a:schemeClr val="tx1"/>
+            </a:solidFill>
+            <a:tailEnd type="triangle"/>
+          </a:ln>
+        </p:spPr>
+        <p:style>
+          <a:lnRef idx="1">
+            <a:schemeClr val="accent1"/>
+          </a:lnRef>
+          <a:fillRef idx="0">
+            <a:schemeClr val="accent1"/>
+          </a:fillRef>
+          <a:effectRef idx="0">
+            <a:schemeClr val="accent1"/>
+          </a:effectRef>
+          <a:fontRef idx="minor">
+            <a:schemeClr val="tx1"/>
+          </a:fontRef>
+        </p:style>
+      </p:cxnSp>
+      <p:cxnSp>
+        <p:nvCxnSpPr>
+          <p:cNvPr id="25" name="Straight Arrow Connector 24">
+            <a:extLst>
+              <a:ext uri="{FF2B5EF4-FFF2-40B4-BE49-F238E27FC236}">
+                <a16:creationId xmlns:a16="http://schemas.microsoft.com/office/drawing/2014/main" id="{DF6C932F-4A51-491D-A6AA-5EA23FAE5E3A}"/>
+              </a:ext>
+            </a:extLst>
+          </p:cNvPr>
+          <p:cNvCxnSpPr>
+            <a:cxnSpLocks/>
+            <a:endCxn id="15" idx="0"/>
+          </p:cNvCxnSpPr>
+          <p:nvPr/>
+        </p:nvCxnSpPr>
+        <p:spPr>
+          <a:xfrm>
+            <a:off x="5660471" y="1885031"/>
+            <a:ext cx="1" cy="452003"/>
+          </a:xfrm>
+          <a:prstGeom prst="straightConnector1">
+            <a:avLst/>
+          </a:prstGeom>
+          <a:ln w="38100">
+            <a:solidFill>
+              <a:schemeClr val="tx1"/>
+            </a:solidFill>
+            <a:tailEnd type="triangle"/>
+          </a:ln>
+        </p:spPr>
+        <p:style>
+          <a:lnRef idx="1">
+            <a:schemeClr val="accent1"/>
+          </a:lnRef>
+          <a:fillRef idx="0">
+            <a:schemeClr val="accent1"/>
+          </a:fillRef>
+          <a:effectRef idx="0">
+            <a:schemeClr val="accent1"/>
+          </a:effectRef>
+          <a:fontRef idx="minor">
+            <a:schemeClr val="tx1"/>
+          </a:fontRef>
+        </p:style>
+      </p:cxnSp>
+      <p:cxnSp>
+        <p:nvCxnSpPr>
+          <p:cNvPr id="27" name="Straight Arrow Connector 26">
+            <a:extLst>
+              <a:ext uri="{FF2B5EF4-FFF2-40B4-BE49-F238E27FC236}">
+                <a16:creationId xmlns:a16="http://schemas.microsoft.com/office/drawing/2014/main" id="{E78C1454-EB68-483F-B431-CDF8C3473A32}"/>
+              </a:ext>
+            </a:extLst>
+          </p:cNvPr>
+          <p:cNvCxnSpPr>
+            <a:cxnSpLocks/>
+          </p:cNvCxnSpPr>
+          <p:nvPr/>
+        </p:nvCxnSpPr>
+        <p:spPr>
+          <a:xfrm>
+            <a:off x="6156819" y="1885031"/>
+            <a:ext cx="1" cy="452003"/>
+          </a:xfrm>
+          <a:prstGeom prst="straightConnector1">
+            <a:avLst/>
+          </a:prstGeom>
+          <a:ln w="38100">
+            <a:solidFill>
+              <a:schemeClr val="tx1"/>
+            </a:solidFill>
+            <a:tailEnd type="triangle"/>
+          </a:ln>
+        </p:spPr>
+        <p:style>
+          <a:lnRef idx="1">
+            <a:schemeClr val="accent1"/>
+          </a:lnRef>
+          <a:fillRef idx="0">
+            <a:schemeClr val="accent1"/>
+          </a:fillRef>
+          <a:effectRef idx="0">
+            <a:schemeClr val="accent1"/>
+          </a:effectRef>
+          <a:fontRef idx="minor">
+            <a:schemeClr val="tx1"/>
+          </a:fontRef>
+        </p:style>
+      </p:cxnSp>
+      <p:cxnSp>
+        <p:nvCxnSpPr>
+          <p:cNvPr id="28" name="Straight Arrow Connector 27">
+            <a:extLst>
+              <a:ext uri="{FF2B5EF4-FFF2-40B4-BE49-F238E27FC236}">
+                <a16:creationId xmlns:a16="http://schemas.microsoft.com/office/drawing/2014/main" id="{7F6FBFE3-00D9-4483-9170-98B3C7E399B6}"/>
+              </a:ext>
+            </a:extLst>
+          </p:cNvPr>
+          <p:cNvCxnSpPr>
+            <a:cxnSpLocks/>
+          </p:cNvCxnSpPr>
+          <p:nvPr/>
+        </p:nvCxnSpPr>
+        <p:spPr>
+          <a:xfrm>
+            <a:off x="5763236" y="2843199"/>
+            <a:ext cx="0" cy="404814"/>
+          </a:xfrm>
+          <a:prstGeom prst="straightConnector1">
+            <a:avLst/>
+          </a:prstGeom>
+          <a:ln w="38100">
+            <a:solidFill>
+              <a:schemeClr val="tx1"/>
+            </a:solidFill>
+            <a:tailEnd type="triangle"/>
+          </a:ln>
+        </p:spPr>
+        <p:style>
+          <a:lnRef idx="1">
+            <a:schemeClr val="accent1"/>
+          </a:lnRef>
+          <a:fillRef idx="0">
+            <a:schemeClr val="accent1"/>
+          </a:fillRef>
+          <a:effectRef idx="0">
+            <a:schemeClr val="accent1"/>
+          </a:effectRef>
+          <a:fontRef idx="minor">
+            <a:schemeClr val="tx1"/>
+          </a:fontRef>
+        </p:style>
+      </p:cxnSp>
+      <p:cxnSp>
+        <p:nvCxnSpPr>
+          <p:cNvPr id="31" name="Straight Arrow Connector 30">
+            <a:extLst>
+              <a:ext uri="{FF2B5EF4-FFF2-40B4-BE49-F238E27FC236}">
+                <a16:creationId xmlns:a16="http://schemas.microsoft.com/office/drawing/2014/main" id="{07C8CB90-5DCE-4DEB-8299-78D7EA14A6A7}"/>
+              </a:ext>
+            </a:extLst>
+          </p:cNvPr>
+          <p:cNvCxnSpPr>
+            <a:cxnSpLocks/>
+          </p:cNvCxnSpPr>
+          <p:nvPr/>
+        </p:nvCxnSpPr>
+        <p:spPr>
+          <a:xfrm>
+            <a:off x="6632893" y="1874081"/>
+            <a:ext cx="0" cy="1373932"/>
+          </a:xfrm>
+          <a:prstGeom prst="straightConnector1">
+            <a:avLst/>
+          </a:prstGeom>
+          <a:ln w="38100">
+            <a:solidFill>
+              <a:schemeClr val="tx1"/>
+            </a:solidFill>
+            <a:tailEnd type="triangle"/>
+          </a:ln>
+        </p:spPr>
+        <p:style>
+          <a:lnRef idx="1">
+            <a:schemeClr val="accent1"/>
+          </a:lnRef>
+          <a:fillRef idx="0">
+            <a:schemeClr val="accent1"/>
+          </a:fillRef>
+          <a:effectRef idx="0">
+            <a:schemeClr val="accent1"/>
+          </a:effectRef>
+          <a:fontRef idx="minor">
+            <a:schemeClr val="tx1"/>
+          </a:fontRef>
+        </p:style>
+      </p:cxnSp>
+      <p:cxnSp>
+        <p:nvCxnSpPr>
+          <p:cNvPr id="37" name="Straight Arrow Connector 36">
+            <a:extLst>
+              <a:ext uri="{FF2B5EF4-FFF2-40B4-BE49-F238E27FC236}">
+                <a16:creationId xmlns:a16="http://schemas.microsoft.com/office/drawing/2014/main" id="{4DD4547A-1E40-424C-80A7-4C62150A45DF}"/>
+              </a:ext>
+            </a:extLst>
+          </p:cNvPr>
+          <p:cNvCxnSpPr>
+            <a:cxnSpLocks/>
+            <a:endCxn id="19" idx="0"/>
+          </p:cNvCxnSpPr>
+          <p:nvPr/>
+        </p:nvCxnSpPr>
+        <p:spPr>
+          <a:xfrm flipH="1">
+            <a:off x="7471098" y="1881383"/>
+            <a:ext cx="7688" cy="691290"/>
+          </a:xfrm>
+          <a:prstGeom prst="straightConnector1">
+            <a:avLst/>
+          </a:prstGeom>
+          <a:ln w="38100">
+            <a:solidFill>
+              <a:schemeClr val="tx1"/>
+            </a:solidFill>
+            <a:tailEnd type="triangle"/>
+          </a:ln>
+        </p:spPr>
+        <p:style>
+          <a:lnRef idx="1">
+            <a:schemeClr val="accent1"/>
+          </a:lnRef>
+          <a:fillRef idx="0">
+            <a:schemeClr val="accent1"/>
+          </a:fillRef>
+          <a:effectRef idx="0">
+            <a:schemeClr val="accent1"/>
+          </a:effectRef>
+          <a:fontRef idx="minor">
+            <a:schemeClr val="tx1"/>
+          </a:fontRef>
+        </p:style>
+      </p:cxnSp>
+      <p:cxnSp>
+        <p:nvCxnSpPr>
+          <p:cNvPr id="39" name="Straight Arrow Connector 38">
+            <a:extLst>
+              <a:ext uri="{FF2B5EF4-FFF2-40B4-BE49-F238E27FC236}">
+                <a16:creationId xmlns:a16="http://schemas.microsoft.com/office/drawing/2014/main" id="{0CD6FEFA-48A3-4ADA-9ABD-3B2995AEFF4E}"/>
+              </a:ext>
+            </a:extLst>
+          </p:cNvPr>
+          <p:cNvCxnSpPr>
+            <a:cxnSpLocks/>
+          </p:cNvCxnSpPr>
+          <p:nvPr/>
+        </p:nvCxnSpPr>
+        <p:spPr>
+          <a:xfrm>
+            <a:off x="7507093" y="2968361"/>
+            <a:ext cx="0" cy="1314094"/>
+          </a:xfrm>
+          <a:prstGeom prst="straightConnector1">
+            <a:avLst/>
+          </a:prstGeom>
+          <a:ln w="38100">
+            <a:solidFill>
+              <a:schemeClr val="tx1"/>
+            </a:solidFill>
+            <a:tailEnd type="triangle"/>
+          </a:ln>
+        </p:spPr>
+        <p:style>
+          <a:lnRef idx="1">
+            <a:schemeClr val="accent1"/>
+          </a:lnRef>
+          <a:fillRef idx="0">
+            <a:schemeClr val="accent1"/>
+          </a:fillRef>
+          <a:effectRef idx="0">
+            <a:schemeClr val="accent1"/>
+          </a:effectRef>
+          <a:fontRef idx="minor">
+            <a:schemeClr val="tx1"/>
+          </a:fontRef>
+        </p:style>
+      </p:cxnSp>
+      <p:cxnSp>
+        <p:nvCxnSpPr>
+          <p:cNvPr id="41" name="Straight Arrow Connector 40">
+            <a:extLst>
+              <a:ext uri="{FF2B5EF4-FFF2-40B4-BE49-F238E27FC236}">
+                <a16:creationId xmlns:a16="http://schemas.microsoft.com/office/drawing/2014/main" id="{B6B31163-9135-4420-A6DF-A6D898FEE8CB}"/>
+              </a:ext>
+            </a:extLst>
+          </p:cNvPr>
+          <p:cNvCxnSpPr>
+            <a:cxnSpLocks/>
+          </p:cNvCxnSpPr>
+          <p:nvPr/>
+        </p:nvCxnSpPr>
+        <p:spPr>
+          <a:xfrm>
+            <a:off x="8087331" y="1874081"/>
+            <a:ext cx="0" cy="2408374"/>
+          </a:xfrm>
+          <a:prstGeom prst="straightConnector1">
+            <a:avLst/>
+          </a:prstGeom>
+          <a:ln w="38100">
+            <a:solidFill>
+              <a:schemeClr val="tx1"/>
+            </a:solidFill>
+            <a:tailEnd type="triangle"/>
+          </a:ln>
+        </p:spPr>
+        <p:style>
+          <a:lnRef idx="1">
+            <a:schemeClr val="accent1"/>
+          </a:lnRef>
+          <a:fillRef idx="0">
+            <a:schemeClr val="accent1"/>
+          </a:fillRef>
+          <a:effectRef idx="0">
+            <a:schemeClr val="accent1"/>
+          </a:effectRef>
+          <a:fontRef idx="minor">
+            <a:schemeClr val="tx1"/>
+          </a:fontRef>
+        </p:style>
+      </p:cxnSp>
+      <p:cxnSp>
+        <p:nvCxnSpPr>
+          <p:cNvPr id="43" name="Straight Arrow Connector 42">
+            <a:extLst>
+              <a:ext uri="{FF2B5EF4-FFF2-40B4-BE49-F238E27FC236}">
+                <a16:creationId xmlns:a16="http://schemas.microsoft.com/office/drawing/2014/main" id="{0D5E0B29-95EA-440C-BCA8-17B759A01C41}"/>
+              </a:ext>
+            </a:extLst>
+          </p:cNvPr>
+          <p:cNvCxnSpPr>
+            <a:cxnSpLocks/>
+            <a:endCxn id="20" idx="0"/>
+          </p:cNvCxnSpPr>
+          <p:nvPr/>
+        </p:nvCxnSpPr>
+        <p:spPr>
+          <a:xfrm>
+            <a:off x="8813335" y="1874081"/>
+            <a:ext cx="0" cy="1150103"/>
+          </a:xfrm>
+          <a:prstGeom prst="straightConnector1">
+            <a:avLst/>
+          </a:prstGeom>
+          <a:ln w="38100">
+            <a:solidFill>
+              <a:schemeClr val="tx1"/>
+            </a:solidFill>
+            <a:tailEnd type="triangle"/>
+          </a:ln>
+        </p:spPr>
+        <p:style>
+          <a:lnRef idx="1">
+            <a:schemeClr val="accent1"/>
+          </a:lnRef>
+          <a:fillRef idx="0">
+            <a:schemeClr val="accent1"/>
+          </a:fillRef>
+          <a:effectRef idx="0">
+            <a:schemeClr val="accent1"/>
+          </a:effectRef>
+          <a:fontRef idx="minor">
+            <a:schemeClr val="tx1"/>
+          </a:fontRef>
+        </p:style>
+      </p:cxnSp>
+      <p:cxnSp>
+        <p:nvCxnSpPr>
+          <p:cNvPr id="45" name="Straight Arrow Connector 44">
+            <a:extLst>
+              <a:ext uri="{FF2B5EF4-FFF2-40B4-BE49-F238E27FC236}">
+                <a16:creationId xmlns:a16="http://schemas.microsoft.com/office/drawing/2014/main" id="{6D1C7C80-AF17-422B-9F7B-4C3E6F634B65}"/>
+              </a:ext>
+            </a:extLst>
+          </p:cNvPr>
+          <p:cNvCxnSpPr>
+            <a:cxnSpLocks/>
+          </p:cNvCxnSpPr>
+          <p:nvPr/>
+        </p:nvCxnSpPr>
+        <p:spPr>
+          <a:xfrm>
+            <a:off x="8825045" y="3842509"/>
+            <a:ext cx="1" cy="452003"/>
+          </a:xfrm>
+          <a:prstGeom prst="straightConnector1">
+            <a:avLst/>
+          </a:prstGeom>
+          <a:ln w="38100">
+            <a:solidFill>
+              <a:schemeClr val="tx1"/>
+            </a:solidFill>
+            <a:tailEnd type="triangle"/>
+          </a:ln>
+        </p:spPr>
+        <p:style>
+          <a:lnRef idx="1">
+            <a:schemeClr val="accent1"/>
+          </a:lnRef>
+          <a:fillRef idx="0">
+            <a:schemeClr val="accent1"/>
+          </a:fillRef>
+          <a:effectRef idx="0">
+            <a:schemeClr val="accent1"/>
+          </a:effectRef>
+          <a:fontRef idx="minor">
+            <a:schemeClr val="tx1"/>
+          </a:fontRef>
+        </p:style>
+      </p:cxnSp>
+      <p:cxnSp>
+        <p:nvCxnSpPr>
+          <p:cNvPr id="46" name="Straight Arrow Connector 45">
+            <a:extLst>
+              <a:ext uri="{FF2B5EF4-FFF2-40B4-BE49-F238E27FC236}">
+                <a16:creationId xmlns:a16="http://schemas.microsoft.com/office/drawing/2014/main" id="{4D860D6F-D372-4261-8485-3C8F75B04F28}"/>
+              </a:ext>
+            </a:extLst>
+          </p:cNvPr>
+          <p:cNvCxnSpPr>
+            <a:cxnSpLocks/>
+          </p:cNvCxnSpPr>
+          <p:nvPr/>
+        </p:nvCxnSpPr>
+        <p:spPr>
+          <a:xfrm>
+            <a:off x="6091870" y="3797982"/>
+            <a:ext cx="2796" cy="484473"/>
+          </a:xfrm>
+          <a:prstGeom prst="straightConnector1">
+            <a:avLst/>
+          </a:prstGeom>
+          <a:ln w="38100">
+            <a:solidFill>
+              <a:schemeClr val="tx1"/>
+            </a:solidFill>
+            <a:tailEnd type="triangle"/>
+          </a:ln>
+        </p:spPr>
+        <p:style>
+          <a:lnRef idx="1">
+            <a:schemeClr val="accent1"/>
+          </a:lnRef>
+          <a:fillRef idx="0">
+            <a:schemeClr val="accent1"/>
+          </a:fillRef>
+          <a:effectRef idx="0">
+            <a:schemeClr val="accent1"/>
+          </a:effectRef>
+          <a:fontRef idx="minor">
+            <a:schemeClr val="tx1"/>
+          </a:fontRef>
+        </p:style>
+      </p:cxnSp>
+      <p:sp>
+        <p:nvSpPr>
+          <p:cNvPr id="50" name="TextBox 49">
+            <a:extLst>
+              <a:ext uri="{FF2B5EF4-FFF2-40B4-BE49-F238E27FC236}">
+                <a16:creationId xmlns:a16="http://schemas.microsoft.com/office/drawing/2014/main" id="{E411D037-0BD2-4B26-83C7-CCEB55D8D9FA}"/>
+              </a:ext>
+            </a:extLst>
+          </p:cNvPr>
+          <p:cNvSpPr txBox="1"/>
+          <p:nvPr/>
+        </p:nvSpPr>
+        <p:spPr>
+          <a:xfrm>
+            <a:off x="4854188" y="938827"/>
+            <a:ext cx="3790910" cy="369332"/>
+          </a:xfrm>
+          <a:prstGeom prst="rect">
+            <a:avLst/>
+          </a:prstGeom>
+          <a:noFill/>
+        </p:spPr>
+        <p:txBody>
+          <a:bodyPr wrap="none" rtlCol="0">
+            <a:spAutoFit/>
+          </a:bodyPr>
+          <a:lstStyle/>
+          <a:p>
+            <a:r>
+              <a:rPr lang="en-US" b="1" dirty="0"/>
+              <a:t>Implementa</a:t>
+            </a:r>
+            <a:r>
+              <a:rPr lang="pt-BR" b="1" dirty="0"/>
+              <a:t>ção da Pilha da Microchip</a:t>
+            </a:r>
+          </a:p>
+        </p:txBody>
+      </p:sp>
+      <p:sp>
+        <p:nvSpPr>
+          <p:cNvPr id="51" name="TextBox 50">
+            <a:extLst>
+              <a:ext uri="{FF2B5EF4-FFF2-40B4-BE49-F238E27FC236}">
+                <a16:creationId xmlns:a16="http://schemas.microsoft.com/office/drawing/2014/main" id="{97DD8AE8-7B6E-4234-9F93-CE5541463AE0}"/>
+              </a:ext>
+            </a:extLst>
+          </p:cNvPr>
+          <p:cNvSpPr txBox="1"/>
+          <p:nvPr/>
+        </p:nvSpPr>
+        <p:spPr>
+          <a:xfrm>
+            <a:off x="968467" y="950546"/>
+            <a:ext cx="1972335" cy="369332"/>
+          </a:xfrm>
+          <a:prstGeom prst="rect">
+            <a:avLst/>
+          </a:prstGeom>
+          <a:noFill/>
+        </p:spPr>
+        <p:txBody>
+          <a:bodyPr wrap="none" rtlCol="0">
+            <a:spAutoFit/>
+          </a:bodyPr>
+          <a:lstStyle/>
+          <a:p>
+            <a:r>
+              <a:rPr lang="pt-BR" b="1" dirty="0"/>
+              <a:t>Arquitetura TCP/IP</a:t>
+            </a:r>
+          </a:p>
+        </p:txBody>
+      </p:sp>
+    </p:spTree>
+    <p:extLst>
+      <p:ext uri="{BB962C8B-B14F-4D97-AF65-F5344CB8AC3E}">
+        <p14:creationId xmlns:p14="http://schemas.microsoft.com/office/powerpoint/2010/main" val="3883866353"/>
+      </p:ext>
+    </p:extLst>
+  </p:cSld>
+  <p:clrMapOvr>
+    <a:masterClrMapping/>
+  </p:clrMapOvr>
+</p:sld>
+</file>
+
+<file path=ppt/slides/slide4.xml><?xml version="1.0" encoding="utf-8"?>
+<p:sld xmlns:a="http://schemas.openxmlformats.org/drawingml/2006/main" xmlns:r="http://schemas.openxmlformats.org/officeDocument/2006/relationships" xmlns:p="http://schemas.openxmlformats.org/presentationml/2006/main">
+  <p:cSld>
+    <p:spTree>
+      <p:nvGrpSpPr>
+        <p:cNvPr id="1" name=""/>
+        <p:cNvGrpSpPr/>
+        <p:nvPr/>
+      </p:nvGrpSpPr>
+      <p:grpSpPr>
+        <a:xfrm>
+          <a:off x="0" y="0"/>
+          <a:ext cx="0" cy="0"/>
+          <a:chOff x="0" y="0"/>
+          <a:chExt cx="0" cy="0"/>
+        </a:xfrm>
+      </p:grpSpPr>
+      <p:sp>
+        <p:nvSpPr>
+          <p:cNvPr id="4" name="Rectangle 3">
+            <a:extLst>
+              <a:ext uri="{FF2B5EF4-FFF2-40B4-BE49-F238E27FC236}">
+                <a16:creationId xmlns:a16="http://schemas.microsoft.com/office/drawing/2014/main" id="{471BF0A9-BAE1-4747-88A4-4AAF21B25ED9}"/>
+              </a:ext>
+            </a:extLst>
+          </p:cNvPr>
+          <p:cNvSpPr/>
+          <p:nvPr/>
+        </p:nvSpPr>
+        <p:spPr>
+          <a:xfrm>
+            <a:off x="2751584" y="1535185"/>
+            <a:ext cx="2298583" cy="4187711"/>
+          </a:xfrm>
+          <a:prstGeom prst="rect">
+            <a:avLst/>
+          </a:prstGeom>
+          <a:gradFill flip="none" rotWithShape="1">
+            <a:gsLst>
+              <a:gs pos="0">
+                <a:schemeClr val="accent1">
+                  <a:tint val="66000"/>
+                  <a:satMod val="160000"/>
+                </a:schemeClr>
+              </a:gs>
+              <a:gs pos="50000">
+                <a:schemeClr val="accent1">
+                  <a:tint val="44500"/>
+                  <a:satMod val="160000"/>
+                </a:schemeClr>
+              </a:gs>
+              <a:gs pos="100000">
+                <a:schemeClr val="accent1">
+                  <a:tint val="23500"/>
+                  <a:satMod val="160000"/>
+                </a:schemeClr>
+              </a:gs>
+            </a:gsLst>
+            <a:lin ang="5400000" scaled="1"/>
+            <a:tileRect/>
+          </a:gradFill>
+          <a:ln w="38100">
+            <a:solidFill>
+              <a:schemeClr val="tx1"/>
+            </a:solidFill>
+          </a:ln>
+        </p:spPr>
+        <p:style>
+          <a:lnRef idx="2">
+            <a:schemeClr val="accent1">
+              <a:shade val="50000"/>
+            </a:schemeClr>
+          </a:lnRef>
+          <a:fillRef idx="1">
+            <a:schemeClr val="accent1"/>
+          </a:fillRef>
+          <a:effectRef idx="0">
+            <a:schemeClr val="accent1"/>
+          </a:effectRef>
+          <a:fontRef idx="minor">
+            <a:schemeClr val="lt1"/>
+          </a:fontRef>
+        </p:style>
+        <p:txBody>
+          <a:bodyPr rtlCol="0" anchor="ctr"/>
+          <a:lstStyle/>
+          <a:p>
+            <a:pPr algn="ctr"/>
+            <a:endParaRPr lang="pt-BR" dirty="0"/>
+          </a:p>
+        </p:txBody>
+      </p:sp>
+      <p:cxnSp>
+        <p:nvCxnSpPr>
+          <p:cNvPr id="5" name="Straight Connector 4">
+            <a:extLst>
+              <a:ext uri="{FF2B5EF4-FFF2-40B4-BE49-F238E27FC236}">
+                <a16:creationId xmlns:a16="http://schemas.microsoft.com/office/drawing/2014/main" id="{1F77ADFF-D96B-42E5-95E8-3763FF877BEB}"/>
+              </a:ext>
+            </a:extLst>
+          </p:cNvPr>
+          <p:cNvCxnSpPr/>
+          <p:nvPr/>
+        </p:nvCxnSpPr>
+        <p:spPr>
+          <a:xfrm>
+            <a:off x="2751587" y="2457975"/>
+            <a:ext cx="2298583" cy="0"/>
+          </a:xfrm>
+          <a:prstGeom prst="line">
+            <a:avLst/>
+          </a:prstGeom>
+          <a:ln w="38100">
+            <a:solidFill>
+              <a:schemeClr val="tx1"/>
+            </a:solidFill>
+          </a:ln>
+        </p:spPr>
+        <p:style>
+          <a:lnRef idx="1">
+            <a:schemeClr val="accent1"/>
+          </a:lnRef>
+          <a:fillRef idx="0">
+            <a:schemeClr val="accent1"/>
+          </a:fillRef>
+          <a:effectRef idx="0">
+            <a:schemeClr val="accent1"/>
+          </a:effectRef>
+          <a:fontRef idx="minor">
+            <a:schemeClr val="tx1"/>
+          </a:fontRef>
+        </p:style>
+      </p:cxnSp>
+      <p:cxnSp>
+        <p:nvCxnSpPr>
+          <p:cNvPr id="6" name="Straight Connector 5">
+            <a:extLst>
+              <a:ext uri="{FF2B5EF4-FFF2-40B4-BE49-F238E27FC236}">
+                <a16:creationId xmlns:a16="http://schemas.microsoft.com/office/drawing/2014/main" id="{B9D3A6CE-96A3-462C-8789-8902A50F4722}"/>
+              </a:ext>
+            </a:extLst>
+          </p:cNvPr>
+          <p:cNvCxnSpPr/>
+          <p:nvPr/>
+        </p:nvCxnSpPr>
+        <p:spPr>
+          <a:xfrm>
+            <a:off x="2751586" y="3063884"/>
+            <a:ext cx="2298583" cy="0"/>
+          </a:xfrm>
+          <a:prstGeom prst="line">
+            <a:avLst/>
+          </a:prstGeom>
+          <a:ln w="38100">
+            <a:solidFill>
+              <a:schemeClr val="tx1"/>
+            </a:solidFill>
+          </a:ln>
+        </p:spPr>
+        <p:style>
+          <a:lnRef idx="1">
+            <a:schemeClr val="accent1"/>
+          </a:lnRef>
+          <a:fillRef idx="0">
+            <a:schemeClr val="accent1"/>
+          </a:fillRef>
+          <a:effectRef idx="0">
+            <a:schemeClr val="accent1"/>
+          </a:effectRef>
+          <a:fontRef idx="minor">
+            <a:schemeClr val="tx1"/>
+          </a:fontRef>
+        </p:style>
+      </p:cxnSp>
+      <p:cxnSp>
+        <p:nvCxnSpPr>
+          <p:cNvPr id="7" name="Straight Connector 6">
+            <a:extLst>
+              <a:ext uri="{FF2B5EF4-FFF2-40B4-BE49-F238E27FC236}">
+                <a16:creationId xmlns:a16="http://schemas.microsoft.com/office/drawing/2014/main" id="{E32B430F-F3B4-43C6-A4D0-53F8D358E945}"/>
+              </a:ext>
+            </a:extLst>
+          </p:cNvPr>
+          <p:cNvCxnSpPr/>
+          <p:nvPr/>
+        </p:nvCxnSpPr>
+        <p:spPr>
+          <a:xfrm>
+            <a:off x="2751585" y="3528882"/>
+            <a:ext cx="2298583" cy="0"/>
+          </a:xfrm>
+          <a:prstGeom prst="line">
+            <a:avLst/>
+          </a:prstGeom>
+          <a:ln w="38100">
+            <a:solidFill>
+              <a:schemeClr val="tx1"/>
+            </a:solidFill>
+          </a:ln>
+        </p:spPr>
+        <p:style>
+          <a:lnRef idx="1">
+            <a:schemeClr val="accent1"/>
+          </a:lnRef>
+          <a:fillRef idx="0">
+            <a:schemeClr val="accent1"/>
+          </a:fillRef>
+          <a:effectRef idx="0">
+            <a:schemeClr val="accent1"/>
+          </a:effectRef>
+          <a:fontRef idx="minor">
+            <a:schemeClr val="tx1"/>
+          </a:fontRef>
+        </p:style>
+      </p:cxnSp>
+      <p:sp>
+        <p:nvSpPr>
+          <p:cNvPr id="8" name="TextBox 7">
+            <a:extLst>
+              <a:ext uri="{FF2B5EF4-FFF2-40B4-BE49-F238E27FC236}">
+                <a16:creationId xmlns:a16="http://schemas.microsoft.com/office/drawing/2014/main" id="{6553AD74-828F-4307-8318-CC54CF2B3CC7}"/>
+              </a:ext>
+            </a:extLst>
+          </p:cNvPr>
+          <p:cNvSpPr txBox="1"/>
+          <p:nvPr/>
+        </p:nvSpPr>
+        <p:spPr>
+          <a:xfrm>
+            <a:off x="3200203" y="1875254"/>
+            <a:ext cx="1401346" cy="338554"/>
+          </a:xfrm>
+          <a:prstGeom prst="rect">
+            <a:avLst/>
+          </a:prstGeom>
+          <a:noFill/>
+        </p:spPr>
+        <p:txBody>
+          <a:bodyPr wrap="none" rtlCol="0">
+            <a:spAutoFit/>
+          </a:bodyPr>
+          <a:lstStyle/>
+          <a:p>
+            <a:r>
+              <a:rPr lang="pt-BR" sz="1600" b="1" dirty="0">
+                <a:latin typeface="Arial" panose="020B0604020202020204" pitchFamily="34" charset="0"/>
+                <a:cs typeface="Arial" panose="020B0604020202020204" pitchFamily="34" charset="0"/>
+              </a:rPr>
+              <a:t>APLICAÇÃO</a:t>
+            </a:r>
+          </a:p>
+        </p:txBody>
+      </p:sp>
+      <p:sp>
+        <p:nvSpPr>
+          <p:cNvPr id="9" name="TextBox 8">
+            <a:extLst>
+              <a:ext uri="{FF2B5EF4-FFF2-40B4-BE49-F238E27FC236}">
+                <a16:creationId xmlns:a16="http://schemas.microsoft.com/office/drawing/2014/main" id="{B57F7546-1272-47F7-91C0-3811EE30ED8C}"/>
+              </a:ext>
+            </a:extLst>
+          </p:cNvPr>
+          <p:cNvSpPr txBox="1"/>
+          <p:nvPr/>
+        </p:nvSpPr>
+        <p:spPr>
+          <a:xfrm>
+            <a:off x="3104024" y="2588407"/>
+            <a:ext cx="1593706" cy="338554"/>
+          </a:xfrm>
+          <a:prstGeom prst="rect">
+            <a:avLst/>
+          </a:prstGeom>
+          <a:noFill/>
+        </p:spPr>
+        <p:txBody>
+          <a:bodyPr wrap="none" rtlCol="0">
+            <a:spAutoFit/>
+          </a:bodyPr>
+          <a:lstStyle/>
+          <a:p>
+            <a:r>
+              <a:rPr lang="pt-BR" sz="1600" b="1" dirty="0">
+                <a:latin typeface="Arial" panose="020B0604020202020204" pitchFamily="34" charset="0"/>
+                <a:cs typeface="Arial" panose="020B0604020202020204" pitchFamily="34" charset="0"/>
+              </a:rPr>
+              <a:t>TRANSPORTE</a:t>
+            </a:r>
+          </a:p>
+        </p:txBody>
+      </p:sp>
+      <p:sp>
+        <p:nvSpPr>
+          <p:cNvPr id="10" name="TextBox 9">
+            <a:extLst>
+              <a:ext uri="{FF2B5EF4-FFF2-40B4-BE49-F238E27FC236}">
+                <a16:creationId xmlns:a16="http://schemas.microsoft.com/office/drawing/2014/main" id="{3B59BEC2-AB25-44A2-A27E-6AEE4DBABC2C}"/>
+              </a:ext>
+            </a:extLst>
+          </p:cNvPr>
+          <p:cNvSpPr txBox="1"/>
+          <p:nvPr/>
+        </p:nvSpPr>
+        <p:spPr>
+          <a:xfrm>
+            <a:off x="3297185" y="3140813"/>
+            <a:ext cx="1207382" cy="338554"/>
+          </a:xfrm>
+          <a:prstGeom prst="rect">
+            <a:avLst/>
+          </a:prstGeom>
+          <a:noFill/>
+        </p:spPr>
+        <p:txBody>
+          <a:bodyPr wrap="none" rtlCol="0">
+            <a:spAutoFit/>
+          </a:bodyPr>
+          <a:lstStyle/>
+          <a:p>
+            <a:r>
+              <a:rPr lang="pt-BR" sz="1600" b="1" dirty="0">
+                <a:latin typeface="Arial" panose="020B0604020202020204" pitchFamily="34" charset="0"/>
+                <a:cs typeface="Arial" panose="020B0604020202020204" pitchFamily="34" charset="0"/>
+              </a:rPr>
+              <a:t>INTERNET</a:t>
+            </a:r>
+          </a:p>
+        </p:txBody>
+      </p:sp>
+      <p:cxnSp>
+        <p:nvCxnSpPr>
+          <p:cNvPr id="13" name="Straight Connector 12">
+            <a:extLst>
+              <a:ext uri="{FF2B5EF4-FFF2-40B4-BE49-F238E27FC236}">
+                <a16:creationId xmlns:a16="http://schemas.microsoft.com/office/drawing/2014/main" id="{4776850B-7B60-439A-8A3A-FFE8F14FE749}"/>
+              </a:ext>
+            </a:extLst>
+          </p:cNvPr>
+          <p:cNvCxnSpPr/>
+          <p:nvPr/>
+        </p:nvCxnSpPr>
+        <p:spPr>
+          <a:xfrm>
+            <a:off x="2751583" y="4344012"/>
+            <a:ext cx="2298583" cy="0"/>
+          </a:xfrm>
+          <a:prstGeom prst="line">
+            <a:avLst/>
+          </a:prstGeom>
+          <a:ln w="38100">
+            <a:solidFill>
+              <a:schemeClr val="tx1"/>
+            </a:solidFill>
+          </a:ln>
+        </p:spPr>
+        <p:style>
+          <a:lnRef idx="1">
+            <a:schemeClr val="accent1"/>
+          </a:lnRef>
+          <a:fillRef idx="0">
+            <a:schemeClr val="accent1"/>
+          </a:fillRef>
+          <a:effectRef idx="0">
+            <a:schemeClr val="accent1"/>
+          </a:effectRef>
+          <a:fontRef idx="minor">
+            <a:schemeClr val="tx1"/>
+          </a:fontRef>
+        </p:style>
+      </p:cxnSp>
+      <p:sp>
+        <p:nvSpPr>
+          <p:cNvPr id="14" name="TextBox 13">
+            <a:extLst>
+              <a:ext uri="{FF2B5EF4-FFF2-40B4-BE49-F238E27FC236}">
+                <a16:creationId xmlns:a16="http://schemas.microsoft.com/office/drawing/2014/main" id="{2D65F4D9-97DD-4619-890A-0F69A862DFEF}"/>
+              </a:ext>
+            </a:extLst>
+          </p:cNvPr>
+          <p:cNvSpPr txBox="1"/>
+          <p:nvPr/>
+        </p:nvSpPr>
+        <p:spPr>
+          <a:xfrm>
+            <a:off x="2883477" y="3515366"/>
+            <a:ext cx="2034793" cy="1077218"/>
+          </a:xfrm>
+          <a:prstGeom prst="rect">
+            <a:avLst/>
+          </a:prstGeom>
+          <a:noFill/>
+        </p:spPr>
+        <p:txBody>
+          <a:bodyPr wrap="square" rtlCol="0">
+            <a:spAutoFit/>
+          </a:bodyPr>
+          <a:lstStyle/>
+          <a:p>
+            <a:pPr algn="ctr"/>
+            <a:r>
+              <a:rPr lang="pt-BR" sz="1600" b="1" dirty="0"/>
+              <a:t>Controle </a:t>
+            </a:r>
+          </a:p>
+          <a:p>
+            <a:pPr algn="ctr"/>
+            <a:r>
+              <a:rPr lang="pt-BR" sz="1600" b="1" dirty="0"/>
+              <a:t>do Link Lógico (LLC) – IEEE 802.2</a:t>
+            </a:r>
+          </a:p>
+          <a:p>
+            <a:pPr algn="ctr"/>
+            <a:endParaRPr lang="pt-BR" sz="1600" b="1" dirty="0"/>
+          </a:p>
+        </p:txBody>
+      </p:sp>
+      <p:sp>
+        <p:nvSpPr>
+          <p:cNvPr id="15" name="TextBox 14">
+            <a:extLst>
+              <a:ext uri="{FF2B5EF4-FFF2-40B4-BE49-F238E27FC236}">
+                <a16:creationId xmlns:a16="http://schemas.microsoft.com/office/drawing/2014/main" id="{A80B63D5-601C-4364-BDDD-32122B2EFCB9}"/>
+              </a:ext>
+            </a:extLst>
+          </p:cNvPr>
+          <p:cNvSpPr txBox="1"/>
+          <p:nvPr/>
+        </p:nvSpPr>
+        <p:spPr>
+          <a:xfrm>
+            <a:off x="2852254" y="4339568"/>
+            <a:ext cx="2034793" cy="1077218"/>
+          </a:xfrm>
+          <a:prstGeom prst="rect">
+            <a:avLst/>
+          </a:prstGeom>
+          <a:noFill/>
+        </p:spPr>
+        <p:txBody>
+          <a:bodyPr wrap="square" rtlCol="0">
+            <a:spAutoFit/>
+          </a:bodyPr>
+          <a:lstStyle/>
+          <a:p>
+            <a:pPr algn="ctr"/>
+            <a:r>
+              <a:rPr lang="pt-BR" sz="1600" b="1" dirty="0"/>
+              <a:t>Controle </a:t>
+            </a:r>
+          </a:p>
+          <a:p>
+            <a:pPr algn="ctr"/>
+            <a:r>
+              <a:rPr lang="pt-BR" sz="1600" b="1" dirty="0"/>
+              <a:t>de Acesso ao Meio (MAC) – IEEE 802.3</a:t>
+            </a:r>
+          </a:p>
+          <a:p>
+            <a:pPr algn="ctr"/>
+            <a:endParaRPr lang="pt-BR" sz="1600" b="1" dirty="0"/>
+          </a:p>
+        </p:txBody>
+      </p:sp>
+      <p:cxnSp>
+        <p:nvCxnSpPr>
+          <p:cNvPr id="16" name="Straight Connector 15">
+            <a:extLst>
+              <a:ext uri="{FF2B5EF4-FFF2-40B4-BE49-F238E27FC236}">
+                <a16:creationId xmlns:a16="http://schemas.microsoft.com/office/drawing/2014/main" id="{B5F7F063-D23F-4B0C-9873-2387F73E8D73}"/>
+              </a:ext>
+            </a:extLst>
+          </p:cNvPr>
+          <p:cNvCxnSpPr/>
+          <p:nvPr/>
+        </p:nvCxnSpPr>
+        <p:spPr>
+          <a:xfrm>
+            <a:off x="2751581" y="5187697"/>
+            <a:ext cx="2298583" cy="0"/>
+          </a:xfrm>
+          <a:prstGeom prst="line">
+            <a:avLst/>
+          </a:prstGeom>
+          <a:ln w="38100">
+            <a:solidFill>
+              <a:schemeClr val="tx1"/>
+            </a:solidFill>
+          </a:ln>
+        </p:spPr>
+        <p:style>
+          <a:lnRef idx="1">
+            <a:schemeClr val="accent1"/>
+          </a:lnRef>
+          <a:fillRef idx="0">
+            <a:schemeClr val="accent1"/>
+          </a:fillRef>
+          <a:effectRef idx="0">
+            <a:schemeClr val="accent1"/>
+          </a:effectRef>
+          <a:fontRef idx="minor">
+            <a:schemeClr val="tx1"/>
+          </a:fontRef>
+        </p:style>
+      </p:cxnSp>
+      <p:sp>
+        <p:nvSpPr>
+          <p:cNvPr id="18" name="TextBox 17">
+            <a:extLst>
+              <a:ext uri="{FF2B5EF4-FFF2-40B4-BE49-F238E27FC236}">
+                <a16:creationId xmlns:a16="http://schemas.microsoft.com/office/drawing/2014/main" id="{4AC29AE8-5F76-49C8-9024-4497AFE87254}"/>
+              </a:ext>
+            </a:extLst>
+          </p:cNvPr>
+          <p:cNvSpPr txBox="1"/>
+          <p:nvPr/>
+        </p:nvSpPr>
+        <p:spPr>
+          <a:xfrm>
+            <a:off x="3472709" y="5262432"/>
+            <a:ext cx="856325" cy="338554"/>
+          </a:xfrm>
+          <a:prstGeom prst="rect">
+            <a:avLst/>
+          </a:prstGeom>
+          <a:noFill/>
+        </p:spPr>
+        <p:txBody>
+          <a:bodyPr wrap="none" rtlCol="0">
+            <a:spAutoFit/>
+          </a:bodyPr>
+          <a:lstStyle/>
+          <a:p>
+            <a:r>
+              <a:rPr lang="pt-BR" sz="1600" b="1" dirty="0">
+                <a:latin typeface="Arial" panose="020B0604020202020204" pitchFamily="34" charset="0"/>
+                <a:cs typeface="Arial" panose="020B0604020202020204" pitchFamily="34" charset="0"/>
+              </a:rPr>
+              <a:t>FÍSICA</a:t>
+            </a:r>
+          </a:p>
+        </p:txBody>
+      </p:sp>
+      <p:sp>
+        <p:nvSpPr>
+          <p:cNvPr id="19" name="Right Brace 18">
+            <a:extLst>
+              <a:ext uri="{FF2B5EF4-FFF2-40B4-BE49-F238E27FC236}">
+                <a16:creationId xmlns:a16="http://schemas.microsoft.com/office/drawing/2014/main" id="{F2CB6F6A-614C-4FE6-B3CA-2FE73C27FE62}"/>
+              </a:ext>
+            </a:extLst>
+          </p:cNvPr>
+          <p:cNvSpPr/>
+          <p:nvPr/>
+        </p:nvSpPr>
+        <p:spPr>
+          <a:xfrm>
+            <a:off x="5150834" y="3528882"/>
+            <a:ext cx="545284" cy="2194014"/>
+          </a:xfrm>
+          <a:prstGeom prst="rightBrace">
+            <a:avLst/>
+          </a:prstGeom>
+          <a:ln w="12700">
+            <a:solidFill>
+              <a:schemeClr val="tx1"/>
+            </a:solidFill>
+          </a:ln>
+        </p:spPr>
+        <p:style>
+          <a:lnRef idx="1">
+            <a:schemeClr val="accent1"/>
+          </a:lnRef>
+          <a:fillRef idx="0">
+            <a:schemeClr val="accent1"/>
+          </a:fillRef>
+          <a:effectRef idx="0">
+            <a:schemeClr val="accent1"/>
+          </a:effectRef>
+          <a:fontRef idx="minor">
+            <a:schemeClr val="tx1"/>
+          </a:fontRef>
+        </p:style>
+        <p:txBody>
+          <a:bodyPr rtlCol="0" anchor="ctr"/>
+          <a:lstStyle/>
+          <a:p>
+            <a:pPr algn="ctr"/>
+            <a:endParaRPr lang="pt-BR"/>
+          </a:p>
+        </p:txBody>
+      </p:sp>
+      <p:sp>
+        <p:nvSpPr>
+          <p:cNvPr id="20" name="Right Brace 19">
+            <a:extLst>
+              <a:ext uri="{FF2B5EF4-FFF2-40B4-BE49-F238E27FC236}">
+                <a16:creationId xmlns:a16="http://schemas.microsoft.com/office/drawing/2014/main" id="{EFA010B8-BCC6-4A43-A7A3-424515459993}"/>
+              </a:ext>
+            </a:extLst>
+          </p:cNvPr>
+          <p:cNvSpPr/>
+          <p:nvPr/>
+        </p:nvSpPr>
+        <p:spPr>
+          <a:xfrm>
+            <a:off x="5150834" y="1535185"/>
+            <a:ext cx="545284" cy="1993686"/>
+          </a:xfrm>
+          <a:prstGeom prst="rightBrace">
+            <a:avLst/>
+          </a:prstGeom>
+          <a:ln w="12700">
+            <a:solidFill>
+              <a:schemeClr val="tx1"/>
+            </a:solidFill>
+          </a:ln>
+        </p:spPr>
+        <p:style>
+          <a:lnRef idx="1">
+            <a:schemeClr val="accent1"/>
+          </a:lnRef>
+          <a:fillRef idx="0">
+            <a:schemeClr val="accent1"/>
+          </a:fillRef>
+          <a:effectRef idx="0">
+            <a:schemeClr val="accent1"/>
+          </a:effectRef>
+          <a:fontRef idx="minor">
+            <a:schemeClr val="tx1"/>
+          </a:fontRef>
+        </p:style>
+        <p:txBody>
+          <a:bodyPr rtlCol="0" anchor="ctr"/>
+          <a:lstStyle/>
+          <a:p>
+            <a:pPr algn="ctr"/>
+            <a:endParaRPr lang="pt-BR" dirty="0"/>
+          </a:p>
+        </p:txBody>
+      </p:sp>
+      <p:sp>
+        <p:nvSpPr>
+          <p:cNvPr id="21" name="TextBox 20">
+            <a:extLst>
+              <a:ext uri="{FF2B5EF4-FFF2-40B4-BE49-F238E27FC236}">
+                <a16:creationId xmlns:a16="http://schemas.microsoft.com/office/drawing/2014/main" id="{ACE15F08-53D9-495F-A719-516E45AC9FF3}"/>
+              </a:ext>
+            </a:extLst>
+          </p:cNvPr>
+          <p:cNvSpPr txBox="1"/>
+          <p:nvPr/>
+        </p:nvSpPr>
+        <p:spPr>
+          <a:xfrm>
+            <a:off x="5796782" y="2337221"/>
+            <a:ext cx="812851" cy="369332"/>
+          </a:xfrm>
+          <a:prstGeom prst="rect">
+            <a:avLst/>
+          </a:prstGeom>
+          <a:noFill/>
+        </p:spPr>
+        <p:txBody>
+          <a:bodyPr wrap="square" rtlCol="0">
+            <a:spAutoFit/>
+          </a:bodyPr>
+          <a:lstStyle/>
+          <a:p>
+            <a:r>
+              <a:rPr lang="pt-BR" b="1" dirty="0"/>
+              <a:t>TCP/IP</a:t>
+            </a:r>
+          </a:p>
+        </p:txBody>
+      </p:sp>
+      <p:sp>
+        <p:nvSpPr>
+          <p:cNvPr id="22" name="TextBox 21">
+            <a:extLst>
+              <a:ext uri="{FF2B5EF4-FFF2-40B4-BE49-F238E27FC236}">
+                <a16:creationId xmlns:a16="http://schemas.microsoft.com/office/drawing/2014/main" id="{61FB7BA8-8DC6-4863-8E24-8B74A0064925}"/>
+              </a:ext>
+            </a:extLst>
+          </p:cNvPr>
+          <p:cNvSpPr txBox="1"/>
+          <p:nvPr/>
+        </p:nvSpPr>
+        <p:spPr>
+          <a:xfrm>
+            <a:off x="5740864" y="4441223"/>
+            <a:ext cx="1020663" cy="369332"/>
+          </a:xfrm>
+          <a:prstGeom prst="rect">
+            <a:avLst/>
+          </a:prstGeom>
+          <a:noFill/>
+        </p:spPr>
+        <p:txBody>
+          <a:bodyPr wrap="square" rtlCol="0">
+            <a:spAutoFit/>
+          </a:bodyPr>
+          <a:lstStyle/>
+          <a:p>
+            <a:r>
+              <a:rPr lang="pt-BR" b="1" dirty="0"/>
+              <a:t>Ethernet</a:t>
+            </a:r>
+          </a:p>
+        </p:txBody>
+      </p:sp>
+    </p:spTree>
+    <p:extLst>
+      <p:ext uri="{BB962C8B-B14F-4D97-AF65-F5344CB8AC3E}">
+        <p14:creationId xmlns:p14="http://schemas.microsoft.com/office/powerpoint/2010/main" val="1701482794"/>
+      </p:ext>
+    </p:extLst>
+  </p:cSld>
+  <p:clrMapOvr>
+    <a:masterClrMapping/>
+  </p:clrMapOvr>
+</p:sld>
+</file>
+
+<file path=ppt/slides/slide5.xml><?xml version="1.0" encoding="utf-8"?>
+<p:sld xmlns:a="http://schemas.openxmlformats.org/drawingml/2006/main" xmlns:r="http://schemas.openxmlformats.org/officeDocument/2006/relationships" xmlns:p="http://schemas.openxmlformats.org/presentationml/2006/main">
+  <p:cSld>
+    <p:spTree>
+      <p:nvGrpSpPr>
+        <p:cNvPr id="1" name=""/>
+        <p:cNvGrpSpPr/>
+        <p:nvPr/>
+      </p:nvGrpSpPr>
+      <p:grpSpPr>
+        <a:xfrm>
+          <a:off x="0" y="0"/>
+          <a:ext cx="0" cy="0"/>
+          <a:chOff x="0" y="0"/>
+          <a:chExt cx="0" cy="0"/>
+        </a:xfrm>
+      </p:grpSpPr>
+      <p:sp>
+        <p:nvSpPr>
+          <p:cNvPr id="16" name="Rectangle 15">
+            <a:extLst>
+              <a:ext uri="{FF2B5EF4-FFF2-40B4-BE49-F238E27FC236}">
+                <a16:creationId xmlns:a16="http://schemas.microsoft.com/office/drawing/2014/main" id="{9BBE8117-9E01-4B64-BD97-07527657463F}"/>
+              </a:ext>
+            </a:extLst>
+          </p:cNvPr>
+          <p:cNvSpPr/>
+          <p:nvPr/>
+        </p:nvSpPr>
+        <p:spPr>
+          <a:xfrm>
+            <a:off x="3375178" y="3242782"/>
+            <a:ext cx="2030136" cy="872698"/>
+          </a:xfrm>
+          <a:prstGeom prst="rect">
+            <a:avLst/>
+          </a:prstGeom>
+          <a:gradFill flip="none" rotWithShape="1">
+            <a:gsLst>
+              <a:gs pos="0">
+                <a:schemeClr val="accent1">
+                  <a:tint val="66000"/>
+                  <a:satMod val="160000"/>
+                </a:schemeClr>
+              </a:gs>
+              <a:gs pos="50000">
+                <a:schemeClr val="accent1">
+                  <a:tint val="44500"/>
+                  <a:satMod val="160000"/>
+                </a:schemeClr>
+              </a:gs>
+              <a:gs pos="100000">
+                <a:schemeClr val="accent1">
+                  <a:tint val="23500"/>
+                  <a:satMod val="160000"/>
+                </a:schemeClr>
+              </a:gs>
+            </a:gsLst>
+            <a:lin ang="5400000" scaled="1"/>
+            <a:tileRect/>
+          </a:gradFill>
+          <a:ln w="38100">
+            <a:solidFill>
+              <a:schemeClr val="tx1"/>
+            </a:solidFill>
+          </a:ln>
+        </p:spPr>
+        <p:style>
+          <a:lnRef idx="2">
+            <a:schemeClr val="accent1">
+              <a:shade val="50000"/>
+            </a:schemeClr>
+          </a:lnRef>
+          <a:fillRef idx="1">
+            <a:schemeClr val="accent1"/>
+          </a:fillRef>
+          <a:effectRef idx="0">
+            <a:schemeClr val="accent1"/>
+          </a:effectRef>
+          <a:fontRef idx="minor">
+            <a:schemeClr val="lt1"/>
+          </a:fontRef>
+        </p:style>
+        <p:txBody>
+          <a:bodyPr rtlCol="0" anchor="ctr"/>
+          <a:lstStyle/>
+          <a:p>
+            <a:pPr algn="ctr"/>
+            <a:r>
+              <a:rPr lang="pt-BR" b="1" dirty="0">
+                <a:solidFill>
+                  <a:schemeClr val="tx1"/>
+                </a:solidFill>
+              </a:rPr>
+              <a:t>Transmite dados solicitados</a:t>
+            </a:r>
+          </a:p>
+        </p:txBody>
+      </p:sp>
+      <p:sp>
+        <p:nvSpPr>
+          <p:cNvPr id="17" name="Rectangle 16">
+            <a:extLst>
+              <a:ext uri="{FF2B5EF4-FFF2-40B4-BE49-F238E27FC236}">
+                <a16:creationId xmlns:a16="http://schemas.microsoft.com/office/drawing/2014/main" id="{1B5EC31D-ED3B-43AC-B790-C0601CA1BED2}"/>
+              </a:ext>
+            </a:extLst>
+          </p:cNvPr>
+          <p:cNvSpPr/>
+          <p:nvPr/>
+        </p:nvSpPr>
+        <p:spPr>
+          <a:xfrm>
+            <a:off x="1918283" y="1855616"/>
+            <a:ext cx="2030136" cy="872708"/>
+          </a:xfrm>
+          <a:prstGeom prst="rect">
+            <a:avLst/>
+          </a:prstGeom>
+          <a:gradFill flip="none" rotWithShape="1">
+            <a:gsLst>
+              <a:gs pos="0">
+                <a:schemeClr val="accent1">
+                  <a:tint val="66000"/>
+                  <a:satMod val="160000"/>
+                </a:schemeClr>
+              </a:gs>
+              <a:gs pos="50000">
+                <a:schemeClr val="accent1">
+                  <a:tint val="44500"/>
+                  <a:satMod val="160000"/>
+                </a:schemeClr>
+              </a:gs>
+              <a:gs pos="100000">
+                <a:schemeClr val="accent1">
+                  <a:tint val="23500"/>
+                  <a:satMod val="160000"/>
+                </a:schemeClr>
+              </a:gs>
+            </a:gsLst>
+            <a:lin ang="5400000" scaled="1"/>
+            <a:tileRect/>
+          </a:gradFill>
+          <a:ln w="38100">
+            <a:solidFill>
+              <a:schemeClr val="tx1"/>
+            </a:solidFill>
+          </a:ln>
+        </p:spPr>
+        <p:style>
+          <a:lnRef idx="2">
+            <a:schemeClr val="accent1">
+              <a:shade val="50000"/>
+            </a:schemeClr>
+          </a:lnRef>
+          <a:fillRef idx="1">
+            <a:schemeClr val="accent1"/>
+          </a:fillRef>
+          <a:effectRef idx="0">
+            <a:schemeClr val="accent1"/>
+          </a:effectRef>
+          <a:fontRef idx="minor">
+            <a:schemeClr val="lt1"/>
+          </a:fontRef>
+        </p:style>
+        <p:txBody>
+          <a:bodyPr rtlCol="0" anchor="ctr"/>
+          <a:lstStyle/>
+          <a:p>
+            <a:pPr algn="ctr"/>
+            <a:r>
+              <a:rPr lang="en-US" b="1" dirty="0">
+                <a:solidFill>
+                  <a:schemeClr val="tx1"/>
+                </a:solidFill>
+              </a:rPr>
+              <a:t>Conex</a:t>
+            </a:r>
+            <a:r>
+              <a:rPr lang="pt-BR" b="1" dirty="0">
+                <a:solidFill>
+                  <a:schemeClr val="tx1"/>
+                </a:solidFill>
+              </a:rPr>
+              <a:t>ão Ethernet estabelecida?</a:t>
+            </a:r>
+          </a:p>
+        </p:txBody>
+      </p:sp>
+      <p:sp>
+        <p:nvSpPr>
+          <p:cNvPr id="18" name="Rectangle 17">
+            <a:extLst>
+              <a:ext uri="{FF2B5EF4-FFF2-40B4-BE49-F238E27FC236}">
+                <a16:creationId xmlns:a16="http://schemas.microsoft.com/office/drawing/2014/main" id="{65DF40B9-E13D-44CF-9FAE-D7574D45B3D9}"/>
+              </a:ext>
+            </a:extLst>
+          </p:cNvPr>
+          <p:cNvSpPr/>
+          <p:nvPr/>
+        </p:nvSpPr>
+        <p:spPr>
+          <a:xfrm>
+            <a:off x="4563611" y="1855616"/>
+            <a:ext cx="2030136" cy="872708"/>
+          </a:xfrm>
+          <a:prstGeom prst="rect">
+            <a:avLst/>
+          </a:prstGeom>
+          <a:gradFill flip="none" rotWithShape="1">
+            <a:gsLst>
+              <a:gs pos="0">
+                <a:schemeClr val="accent1">
+                  <a:tint val="66000"/>
+                  <a:satMod val="160000"/>
+                </a:schemeClr>
+              </a:gs>
+              <a:gs pos="50000">
+                <a:schemeClr val="accent1">
+                  <a:tint val="44500"/>
+                  <a:satMod val="160000"/>
+                </a:schemeClr>
+              </a:gs>
+              <a:gs pos="100000">
+                <a:schemeClr val="accent1">
+                  <a:tint val="23500"/>
+                  <a:satMod val="160000"/>
+                </a:schemeClr>
+              </a:gs>
+            </a:gsLst>
+            <a:lin ang="5400000" scaled="1"/>
+            <a:tileRect/>
+          </a:gradFill>
+          <a:ln w="38100">
+            <a:solidFill>
+              <a:schemeClr val="tx1"/>
+            </a:solidFill>
+          </a:ln>
+        </p:spPr>
+        <p:style>
+          <a:lnRef idx="2">
+            <a:schemeClr val="accent1">
+              <a:shade val="50000"/>
+            </a:schemeClr>
+          </a:lnRef>
+          <a:fillRef idx="1">
+            <a:schemeClr val="accent1"/>
+          </a:fillRef>
+          <a:effectRef idx="0">
+            <a:schemeClr val="accent1"/>
+          </a:effectRef>
+          <a:fontRef idx="minor">
+            <a:schemeClr val="lt1"/>
+          </a:fontRef>
+        </p:style>
+        <p:txBody>
+          <a:bodyPr rtlCol="0" anchor="ctr"/>
+          <a:lstStyle/>
+          <a:p>
+            <a:pPr algn="ctr"/>
+            <a:r>
+              <a:rPr lang="pt-BR" b="1" dirty="0">
+                <a:solidFill>
+                  <a:schemeClr val="tx1"/>
+                </a:solidFill>
+              </a:rPr>
+              <a:t>Informação solicitada pelo “cliente”?</a:t>
+            </a:r>
+          </a:p>
+        </p:txBody>
+      </p:sp>
+      <p:cxnSp>
+        <p:nvCxnSpPr>
+          <p:cNvPr id="48" name="Straight Arrow Connector 47">
+            <a:extLst>
+              <a:ext uri="{FF2B5EF4-FFF2-40B4-BE49-F238E27FC236}">
+                <a16:creationId xmlns:a16="http://schemas.microsoft.com/office/drawing/2014/main" id="{C87792F4-3D7F-47FA-8DFE-AA7D203EA1EA}"/>
+              </a:ext>
+            </a:extLst>
+          </p:cNvPr>
+          <p:cNvCxnSpPr>
+            <a:cxnSpLocks/>
+          </p:cNvCxnSpPr>
+          <p:nvPr/>
+        </p:nvCxnSpPr>
+        <p:spPr>
+          <a:xfrm>
+            <a:off x="3937241" y="2302134"/>
+            <a:ext cx="626370" cy="0"/>
+          </a:xfrm>
+          <a:prstGeom prst="straightConnector1">
+            <a:avLst/>
+          </a:prstGeom>
+          <a:ln w="38100">
+            <a:solidFill>
+              <a:schemeClr val="tx1"/>
+            </a:solidFill>
+            <a:tailEnd type="triangle"/>
+          </a:ln>
+        </p:spPr>
+        <p:style>
+          <a:lnRef idx="1">
+            <a:schemeClr val="accent1"/>
+          </a:lnRef>
+          <a:fillRef idx="0">
+            <a:schemeClr val="accent1"/>
+          </a:fillRef>
+          <a:effectRef idx="0">
+            <a:schemeClr val="accent1"/>
+          </a:effectRef>
+          <a:fontRef idx="minor">
+            <a:schemeClr val="tx1"/>
+          </a:fontRef>
+        </p:style>
+      </p:cxnSp>
+      <p:sp>
+        <p:nvSpPr>
+          <p:cNvPr id="49" name="TextBox 48">
+            <a:extLst>
+              <a:ext uri="{FF2B5EF4-FFF2-40B4-BE49-F238E27FC236}">
+                <a16:creationId xmlns:a16="http://schemas.microsoft.com/office/drawing/2014/main" id="{C0DFB7A7-7732-46D7-AA7D-DFFD16AF970A}"/>
+              </a:ext>
+            </a:extLst>
+          </p:cNvPr>
+          <p:cNvSpPr txBox="1"/>
+          <p:nvPr/>
+        </p:nvSpPr>
+        <p:spPr>
+          <a:xfrm>
+            <a:off x="3948419" y="1991525"/>
+            <a:ext cx="567657" cy="369332"/>
+          </a:xfrm>
+          <a:prstGeom prst="rect">
+            <a:avLst/>
+          </a:prstGeom>
+          <a:noFill/>
+        </p:spPr>
+        <p:txBody>
+          <a:bodyPr wrap="square" rtlCol="0">
+            <a:spAutoFit/>
+          </a:bodyPr>
+          <a:lstStyle/>
+          <a:p>
+            <a:r>
+              <a:rPr lang="pt-BR" b="1" dirty="0"/>
+              <a:t>Sim</a:t>
+            </a:r>
+          </a:p>
+        </p:txBody>
+      </p:sp>
+      <p:cxnSp>
+        <p:nvCxnSpPr>
+          <p:cNvPr id="51" name="Straight Arrow Connector 50">
+            <a:extLst>
+              <a:ext uri="{FF2B5EF4-FFF2-40B4-BE49-F238E27FC236}">
+                <a16:creationId xmlns:a16="http://schemas.microsoft.com/office/drawing/2014/main" id="{FCD5E074-FBCC-4AC0-9762-EE073B0FA8B6}"/>
+              </a:ext>
+            </a:extLst>
+          </p:cNvPr>
+          <p:cNvCxnSpPr>
+            <a:cxnSpLocks/>
+          </p:cNvCxnSpPr>
+          <p:nvPr/>
+        </p:nvCxnSpPr>
+        <p:spPr>
+          <a:xfrm>
+            <a:off x="5103311" y="2728324"/>
+            <a:ext cx="0" cy="514458"/>
+          </a:xfrm>
+          <a:prstGeom prst="straightConnector1">
+            <a:avLst/>
+          </a:prstGeom>
+          <a:ln w="38100">
+            <a:solidFill>
+              <a:schemeClr val="tx1"/>
+            </a:solidFill>
+            <a:tailEnd type="triangle"/>
+          </a:ln>
+        </p:spPr>
+        <p:style>
+          <a:lnRef idx="1">
+            <a:schemeClr val="accent1"/>
+          </a:lnRef>
+          <a:fillRef idx="0">
+            <a:schemeClr val="accent1"/>
+          </a:fillRef>
+          <a:effectRef idx="0">
+            <a:schemeClr val="accent1"/>
+          </a:effectRef>
+          <a:fontRef idx="minor">
+            <a:schemeClr val="tx1"/>
+          </a:fontRef>
+        </p:style>
+      </p:cxnSp>
+      <p:sp>
+        <p:nvSpPr>
+          <p:cNvPr id="54" name="TextBox 53">
+            <a:extLst>
+              <a:ext uri="{FF2B5EF4-FFF2-40B4-BE49-F238E27FC236}">
+                <a16:creationId xmlns:a16="http://schemas.microsoft.com/office/drawing/2014/main" id="{02490D53-D300-4130-A561-03076A7895EC}"/>
+              </a:ext>
+            </a:extLst>
+          </p:cNvPr>
+          <p:cNvSpPr txBox="1"/>
+          <p:nvPr/>
+        </p:nvSpPr>
+        <p:spPr>
+          <a:xfrm>
+            <a:off x="5075355" y="2795341"/>
+            <a:ext cx="567657" cy="369332"/>
+          </a:xfrm>
+          <a:prstGeom prst="rect">
+            <a:avLst/>
+          </a:prstGeom>
+          <a:noFill/>
+        </p:spPr>
+        <p:txBody>
+          <a:bodyPr wrap="square" rtlCol="0">
+            <a:spAutoFit/>
+          </a:bodyPr>
+          <a:lstStyle/>
+          <a:p>
+            <a:r>
+              <a:rPr lang="pt-BR" b="1" dirty="0"/>
+              <a:t>Sim</a:t>
+            </a:r>
+          </a:p>
+        </p:txBody>
+      </p:sp>
+      <p:cxnSp>
+        <p:nvCxnSpPr>
+          <p:cNvPr id="59" name="Straight Connector 58">
+            <a:extLst>
+              <a:ext uri="{FF2B5EF4-FFF2-40B4-BE49-F238E27FC236}">
+                <a16:creationId xmlns:a16="http://schemas.microsoft.com/office/drawing/2014/main" id="{4A6E1C7C-6155-4D4D-80B7-0DB99624B90B}"/>
+              </a:ext>
+            </a:extLst>
+          </p:cNvPr>
+          <p:cNvCxnSpPr>
+            <a:cxnSpLocks/>
+          </p:cNvCxnSpPr>
+          <p:nvPr/>
+        </p:nvCxnSpPr>
+        <p:spPr>
+          <a:xfrm flipH="1" flipV="1">
+            <a:off x="4674067" y="1438275"/>
+            <a:ext cx="1405" cy="417343"/>
+          </a:xfrm>
+          <a:prstGeom prst="line">
+            <a:avLst/>
+          </a:prstGeom>
+          <a:ln w="38100">
+            <a:solidFill>
+              <a:schemeClr val="tx1"/>
+            </a:solidFill>
+          </a:ln>
+        </p:spPr>
+        <p:style>
+          <a:lnRef idx="1">
+            <a:schemeClr val="accent1"/>
+          </a:lnRef>
+          <a:fillRef idx="0">
+            <a:schemeClr val="accent1"/>
+          </a:fillRef>
+          <a:effectRef idx="0">
+            <a:schemeClr val="accent1"/>
+          </a:effectRef>
+          <a:fontRef idx="minor">
+            <a:schemeClr val="tx1"/>
+          </a:fontRef>
+        </p:style>
+      </p:cxnSp>
+      <p:cxnSp>
+        <p:nvCxnSpPr>
+          <p:cNvPr id="61" name="Straight Connector 60">
+            <a:extLst>
+              <a:ext uri="{FF2B5EF4-FFF2-40B4-BE49-F238E27FC236}">
+                <a16:creationId xmlns:a16="http://schemas.microsoft.com/office/drawing/2014/main" id="{12D7F564-4614-4ED1-A486-CA22F0A9FD7F}"/>
+              </a:ext>
+            </a:extLst>
+          </p:cNvPr>
+          <p:cNvCxnSpPr>
+            <a:cxnSpLocks/>
+          </p:cNvCxnSpPr>
+          <p:nvPr/>
+        </p:nvCxnSpPr>
+        <p:spPr>
+          <a:xfrm>
+            <a:off x="3222770" y="1460500"/>
+            <a:ext cx="1451297" cy="0"/>
+          </a:xfrm>
+          <a:prstGeom prst="line">
+            <a:avLst/>
+          </a:prstGeom>
+          <a:ln w="38100">
+            <a:solidFill>
+              <a:schemeClr val="tx1"/>
+            </a:solidFill>
+          </a:ln>
+        </p:spPr>
+        <p:style>
+          <a:lnRef idx="1">
+            <a:schemeClr val="accent1"/>
+          </a:lnRef>
+          <a:fillRef idx="0">
+            <a:schemeClr val="accent1"/>
+          </a:fillRef>
+          <a:effectRef idx="0">
+            <a:schemeClr val="accent1"/>
+          </a:effectRef>
+          <a:fontRef idx="minor">
+            <a:schemeClr val="tx1"/>
+          </a:fontRef>
+        </p:style>
+      </p:cxnSp>
+      <p:cxnSp>
+        <p:nvCxnSpPr>
+          <p:cNvPr id="65" name="Straight Arrow Connector 64">
+            <a:extLst>
+              <a:ext uri="{FF2B5EF4-FFF2-40B4-BE49-F238E27FC236}">
+                <a16:creationId xmlns:a16="http://schemas.microsoft.com/office/drawing/2014/main" id="{43886C89-62D1-41ED-9B59-448FC26DE492}"/>
+              </a:ext>
+            </a:extLst>
+          </p:cNvPr>
+          <p:cNvCxnSpPr>
+            <a:cxnSpLocks/>
+          </p:cNvCxnSpPr>
+          <p:nvPr/>
+        </p:nvCxnSpPr>
+        <p:spPr>
+          <a:xfrm>
+            <a:off x="3238150" y="1460500"/>
+            <a:ext cx="0" cy="395116"/>
+          </a:xfrm>
+          <a:prstGeom prst="straightConnector1">
+            <a:avLst/>
+          </a:prstGeom>
+          <a:ln w="38100">
+            <a:solidFill>
+              <a:schemeClr val="tx1"/>
+            </a:solidFill>
+            <a:tailEnd type="triangle"/>
+          </a:ln>
+        </p:spPr>
+        <p:style>
+          <a:lnRef idx="1">
+            <a:schemeClr val="accent1"/>
+          </a:lnRef>
+          <a:fillRef idx="0">
+            <a:schemeClr val="accent1"/>
+          </a:fillRef>
+          <a:effectRef idx="0">
+            <a:schemeClr val="accent1"/>
+          </a:effectRef>
+          <a:fontRef idx="minor">
+            <a:schemeClr val="tx1"/>
+          </a:fontRef>
+        </p:style>
+      </p:cxnSp>
+      <p:sp>
+        <p:nvSpPr>
+          <p:cNvPr id="71" name="TextBox 70">
+            <a:extLst>
+              <a:ext uri="{FF2B5EF4-FFF2-40B4-BE49-F238E27FC236}">
+                <a16:creationId xmlns:a16="http://schemas.microsoft.com/office/drawing/2014/main" id="{688177AF-A777-44B6-A533-D71B37ECCA11}"/>
+              </a:ext>
+            </a:extLst>
+          </p:cNvPr>
+          <p:cNvSpPr txBox="1"/>
+          <p:nvPr/>
+        </p:nvSpPr>
+        <p:spPr>
+          <a:xfrm>
+            <a:off x="3611120" y="1151871"/>
+            <a:ext cx="752115" cy="369332"/>
+          </a:xfrm>
+          <a:prstGeom prst="rect">
+            <a:avLst/>
+          </a:prstGeom>
+          <a:noFill/>
+        </p:spPr>
+        <p:txBody>
+          <a:bodyPr wrap="square" rtlCol="0">
+            <a:spAutoFit/>
+          </a:bodyPr>
+          <a:lstStyle/>
+          <a:p>
+            <a:r>
+              <a:rPr lang="pt-BR" b="1" dirty="0"/>
+              <a:t>Não</a:t>
+            </a:r>
+          </a:p>
+        </p:txBody>
+      </p:sp>
+      <p:cxnSp>
+        <p:nvCxnSpPr>
+          <p:cNvPr id="72" name="Straight Connector 71">
+            <a:extLst>
+              <a:ext uri="{FF2B5EF4-FFF2-40B4-BE49-F238E27FC236}">
+                <a16:creationId xmlns:a16="http://schemas.microsoft.com/office/drawing/2014/main" id="{73F644EC-4591-46E2-B1EA-77566B571EF2}"/>
+              </a:ext>
+            </a:extLst>
+          </p:cNvPr>
+          <p:cNvCxnSpPr>
+            <a:cxnSpLocks/>
+          </p:cNvCxnSpPr>
+          <p:nvPr/>
+        </p:nvCxnSpPr>
+        <p:spPr>
+          <a:xfrm flipH="1" flipV="1">
+            <a:off x="2007377" y="2732863"/>
+            <a:ext cx="1405" cy="417343"/>
+          </a:xfrm>
+          <a:prstGeom prst="line">
+            <a:avLst/>
+          </a:prstGeom>
+          <a:ln w="38100">
+            <a:solidFill>
+              <a:schemeClr val="tx1"/>
+            </a:solidFill>
+          </a:ln>
+        </p:spPr>
+        <p:style>
+          <a:lnRef idx="1">
+            <a:schemeClr val="accent1"/>
+          </a:lnRef>
+          <a:fillRef idx="0">
+            <a:schemeClr val="accent1"/>
+          </a:fillRef>
+          <a:effectRef idx="0">
+            <a:schemeClr val="accent1"/>
+          </a:effectRef>
+          <a:fontRef idx="minor">
+            <a:schemeClr val="tx1"/>
+          </a:fontRef>
+        </p:style>
+      </p:cxnSp>
+      <p:cxnSp>
+        <p:nvCxnSpPr>
+          <p:cNvPr id="73" name="Straight Connector 72">
+            <a:extLst>
+              <a:ext uri="{FF2B5EF4-FFF2-40B4-BE49-F238E27FC236}">
+                <a16:creationId xmlns:a16="http://schemas.microsoft.com/office/drawing/2014/main" id="{44F8C69E-248D-4C66-8531-67855DE604D6}"/>
+              </a:ext>
+            </a:extLst>
+          </p:cNvPr>
+          <p:cNvCxnSpPr>
+            <a:cxnSpLocks/>
+          </p:cNvCxnSpPr>
+          <p:nvPr/>
+        </p:nvCxnSpPr>
+        <p:spPr>
+          <a:xfrm flipH="1">
+            <a:off x="2007377" y="3144864"/>
+            <a:ext cx="503468" cy="1"/>
+          </a:xfrm>
+          <a:prstGeom prst="line">
+            <a:avLst/>
+          </a:prstGeom>
+          <a:ln w="38100">
+            <a:solidFill>
+              <a:schemeClr val="tx1"/>
+            </a:solidFill>
+          </a:ln>
+        </p:spPr>
+        <p:style>
+          <a:lnRef idx="1">
+            <a:schemeClr val="accent1"/>
+          </a:lnRef>
+          <a:fillRef idx="0">
+            <a:schemeClr val="accent1"/>
+          </a:fillRef>
+          <a:effectRef idx="0">
+            <a:schemeClr val="accent1"/>
+          </a:effectRef>
+          <a:fontRef idx="minor">
+            <a:schemeClr val="tx1"/>
+          </a:fontRef>
+        </p:style>
+      </p:cxnSp>
+      <p:cxnSp>
+        <p:nvCxnSpPr>
+          <p:cNvPr id="75" name="Straight Arrow Connector 74">
+            <a:extLst>
+              <a:ext uri="{FF2B5EF4-FFF2-40B4-BE49-F238E27FC236}">
+                <a16:creationId xmlns:a16="http://schemas.microsoft.com/office/drawing/2014/main" id="{C160612E-CB5D-4C1B-BD6D-43ECE94DE703}"/>
+              </a:ext>
+            </a:extLst>
+          </p:cNvPr>
+          <p:cNvCxnSpPr>
+            <a:cxnSpLocks/>
+          </p:cNvCxnSpPr>
+          <p:nvPr/>
+        </p:nvCxnSpPr>
+        <p:spPr>
+          <a:xfrm flipV="1">
+            <a:off x="2475673" y="2728324"/>
+            <a:ext cx="0" cy="417343"/>
+          </a:xfrm>
+          <a:prstGeom prst="straightConnector1">
+            <a:avLst/>
+          </a:prstGeom>
+          <a:ln w="38100">
+            <a:solidFill>
+              <a:schemeClr val="tx1"/>
+            </a:solidFill>
+            <a:tailEnd type="triangle"/>
+          </a:ln>
+        </p:spPr>
+        <p:style>
+          <a:lnRef idx="1">
+            <a:schemeClr val="accent1"/>
+          </a:lnRef>
+          <a:fillRef idx="0">
+            <a:schemeClr val="accent1"/>
+          </a:fillRef>
+          <a:effectRef idx="0">
+            <a:schemeClr val="accent1"/>
+          </a:effectRef>
+          <a:fontRef idx="minor">
+            <a:schemeClr val="tx1"/>
+          </a:fontRef>
+        </p:style>
+      </p:cxnSp>
+      <p:sp>
+        <p:nvSpPr>
+          <p:cNvPr id="77" name="TextBox 76">
+            <a:extLst>
+              <a:ext uri="{FF2B5EF4-FFF2-40B4-BE49-F238E27FC236}">
+                <a16:creationId xmlns:a16="http://schemas.microsoft.com/office/drawing/2014/main" id="{51439D91-30D5-48DE-871E-D5E429B765D0}"/>
+              </a:ext>
+            </a:extLst>
+          </p:cNvPr>
+          <p:cNvSpPr txBox="1"/>
+          <p:nvPr/>
+        </p:nvSpPr>
+        <p:spPr>
+          <a:xfrm>
+            <a:off x="1977156" y="3098039"/>
+            <a:ext cx="752115" cy="369332"/>
+          </a:xfrm>
+          <a:prstGeom prst="rect">
+            <a:avLst/>
+          </a:prstGeom>
+          <a:noFill/>
+        </p:spPr>
+        <p:txBody>
+          <a:bodyPr wrap="square" rtlCol="0">
+            <a:spAutoFit/>
+          </a:bodyPr>
+          <a:lstStyle/>
+          <a:p>
+            <a:r>
+              <a:rPr lang="pt-BR" b="1" dirty="0"/>
+              <a:t>Não</a:t>
+            </a:r>
+          </a:p>
+        </p:txBody>
+      </p:sp>
+    </p:spTree>
+    <p:extLst>
+      <p:ext uri="{BB962C8B-B14F-4D97-AF65-F5344CB8AC3E}">
+        <p14:creationId xmlns:p14="http://schemas.microsoft.com/office/powerpoint/2010/main" val="3999453963"/>
+      </p:ext>
+    </p:extLst>
+  </p:cSld>
+  <p:clrMapOvr>
+    <a:masterClrMapping/>
+  </p:clrMapOvr>
+</p:sld>
+</file>
+
 <file path=ppt/theme/theme1.xml><?xml version="1.0" encoding="utf-8"?>
 <a:theme xmlns:a="http://schemas.openxmlformats.org/drawingml/2006/main" name="Office Theme">
   <a:themeElements>

</xml_diff>

<commit_message>
Capítulos 3, 4 e 5
</commit_message>
<xml_diff>
--- a/Figuras/Presentation1.pptx
+++ b/Figuras/Presentation1.pptx
@@ -10,10 +10,11 @@
     <p:sldId id="258" r:id="rId4"/>
     <p:sldId id="259" r:id="rId5"/>
     <p:sldId id="260" r:id="rId6"/>
-    <p:sldId id="261" r:id="rId7"/>
-    <p:sldId id="262" r:id="rId8"/>
-    <p:sldId id="263" r:id="rId9"/>
-    <p:sldId id="264" r:id="rId10"/>
+    <p:sldId id="265" r:id="rId7"/>
+    <p:sldId id="261" r:id="rId8"/>
+    <p:sldId id="262" r:id="rId9"/>
+    <p:sldId id="263" r:id="rId10"/>
+    <p:sldId id="264" r:id="rId11"/>
   </p:sldIdLst>
   <p:sldSz cx="12192000" cy="6858000"/>
   <p:notesSz cx="6858000" cy="9144000"/>
@@ -3867,6 +3868,334 @@
 </p:sld>
 </file>
 
+<file path=ppt/slides/slide10.xml><?xml version="1.0" encoding="utf-8"?>
+<p:sld xmlns:a="http://schemas.openxmlformats.org/drawingml/2006/main" xmlns:r="http://schemas.openxmlformats.org/officeDocument/2006/relationships" xmlns:p="http://schemas.openxmlformats.org/presentationml/2006/main">
+  <p:cSld>
+    <p:spTree>
+      <p:nvGrpSpPr>
+        <p:cNvPr id="1" name=""/>
+        <p:cNvGrpSpPr/>
+        <p:nvPr/>
+      </p:nvGrpSpPr>
+      <p:grpSpPr>
+        <a:xfrm>
+          <a:off x="0" y="0"/>
+          <a:ext cx="0" cy="0"/>
+          <a:chOff x="0" y="0"/>
+          <a:chExt cx="0" cy="0"/>
+        </a:xfrm>
+      </p:grpSpPr>
+      <p:pic>
+        <p:nvPicPr>
+          <p:cNvPr id="10" name="Picture 9">
+            <a:extLst>
+              <a:ext uri="{FF2B5EF4-FFF2-40B4-BE49-F238E27FC236}">
+                <a16:creationId xmlns:a16="http://schemas.microsoft.com/office/drawing/2014/main" id="{1676D98F-BA3A-4E88-9522-43AE7F87E1EF}"/>
+              </a:ext>
+            </a:extLst>
+          </p:cNvPr>
+          <p:cNvPicPr>
+            <a:picLocks noChangeAspect="1"/>
+          </p:cNvPicPr>
+          <p:nvPr/>
+        </p:nvPicPr>
+        <p:blipFill>
+          <a:blip r:embed="rId2">
+            <a:extLst>
+              <a:ext uri="{28A0092B-C50C-407E-A947-70E740481C1C}">
+                <a14:useLocalDpi xmlns:a14="http://schemas.microsoft.com/office/drawing/2010/main" val="0"/>
+              </a:ext>
+            </a:extLst>
+          </a:blip>
+          <a:stretch>
+            <a:fillRect/>
+          </a:stretch>
+        </p:blipFill>
+        <p:spPr>
+          <a:xfrm>
+            <a:off x="3494087" y="274637"/>
+            <a:ext cx="5419725" cy="4810125"/>
+          </a:xfrm>
+          <a:prstGeom prst="rect">
+            <a:avLst/>
+          </a:prstGeom>
+        </p:spPr>
+      </p:pic>
+      <p:sp>
+        <p:nvSpPr>
+          <p:cNvPr id="11" name="Rectangle 10">
+            <a:extLst>
+              <a:ext uri="{FF2B5EF4-FFF2-40B4-BE49-F238E27FC236}">
+                <a16:creationId xmlns:a16="http://schemas.microsoft.com/office/drawing/2014/main" id="{1B718B4A-46FF-4E7D-9B8C-73D64F810642}"/>
+              </a:ext>
+            </a:extLst>
+          </p:cNvPr>
+          <p:cNvSpPr/>
+          <p:nvPr/>
+        </p:nvSpPr>
+        <p:spPr>
+          <a:xfrm>
+            <a:off x="3562350" y="1111250"/>
+            <a:ext cx="412750" cy="450850"/>
+          </a:xfrm>
+          <a:prstGeom prst="rect">
+            <a:avLst/>
+          </a:prstGeom>
+          <a:noFill/>
+          <a:ln>
+            <a:solidFill>
+              <a:schemeClr val="tx1"/>
+            </a:solidFill>
+          </a:ln>
+        </p:spPr>
+        <p:style>
+          <a:lnRef idx="2">
+            <a:schemeClr val="accent1">
+              <a:shade val="50000"/>
+            </a:schemeClr>
+          </a:lnRef>
+          <a:fillRef idx="1">
+            <a:schemeClr val="accent1"/>
+          </a:fillRef>
+          <a:effectRef idx="0">
+            <a:schemeClr val="accent1"/>
+          </a:effectRef>
+          <a:fontRef idx="minor">
+            <a:schemeClr val="lt1"/>
+          </a:fontRef>
+        </p:style>
+        <p:txBody>
+          <a:bodyPr rtlCol="0" anchor="ctr"/>
+          <a:lstStyle/>
+          <a:p>
+            <a:pPr algn="ctr"/>
+            <a:endParaRPr lang="pt-BR"/>
+          </a:p>
+        </p:txBody>
+      </p:sp>
+      <p:sp>
+        <p:nvSpPr>
+          <p:cNvPr id="12" name="Rectangle 11">
+            <a:extLst>
+              <a:ext uri="{FF2B5EF4-FFF2-40B4-BE49-F238E27FC236}">
+                <a16:creationId xmlns:a16="http://schemas.microsoft.com/office/drawing/2014/main" id="{4655E23D-3F68-448D-B0F3-09635C8AF536}"/>
+              </a:ext>
+            </a:extLst>
+          </p:cNvPr>
+          <p:cNvSpPr/>
+          <p:nvPr/>
+        </p:nvSpPr>
+        <p:spPr>
+          <a:xfrm>
+            <a:off x="3562350" y="1562100"/>
+            <a:ext cx="1454150" cy="476250"/>
+          </a:xfrm>
+          <a:prstGeom prst="rect">
+            <a:avLst/>
+          </a:prstGeom>
+          <a:noFill/>
+          <a:ln>
+            <a:solidFill>
+              <a:schemeClr val="tx1"/>
+            </a:solidFill>
+          </a:ln>
+        </p:spPr>
+        <p:style>
+          <a:lnRef idx="2">
+            <a:schemeClr val="accent1">
+              <a:shade val="50000"/>
+            </a:schemeClr>
+          </a:lnRef>
+          <a:fillRef idx="1">
+            <a:schemeClr val="accent1"/>
+          </a:fillRef>
+          <a:effectRef idx="0">
+            <a:schemeClr val="accent1"/>
+          </a:effectRef>
+          <a:fontRef idx="minor">
+            <a:schemeClr val="lt1"/>
+          </a:fontRef>
+        </p:style>
+        <p:txBody>
+          <a:bodyPr rtlCol="0" anchor="ctr"/>
+          <a:lstStyle/>
+          <a:p>
+            <a:pPr algn="ctr"/>
+            <a:endParaRPr lang="pt-BR"/>
+          </a:p>
+        </p:txBody>
+      </p:sp>
+      <p:cxnSp>
+        <p:nvCxnSpPr>
+          <p:cNvPr id="14" name="Straight Arrow Connector 13">
+            <a:extLst>
+              <a:ext uri="{FF2B5EF4-FFF2-40B4-BE49-F238E27FC236}">
+                <a16:creationId xmlns:a16="http://schemas.microsoft.com/office/drawing/2014/main" id="{1E6DD13F-3BC6-45F4-9612-FCD35719926B}"/>
+              </a:ext>
+            </a:extLst>
+          </p:cNvPr>
+          <p:cNvCxnSpPr>
+            <a:cxnSpLocks/>
+          </p:cNvCxnSpPr>
+          <p:nvPr/>
+        </p:nvCxnSpPr>
+        <p:spPr>
+          <a:xfrm flipH="1">
+            <a:off x="3238500" y="1336675"/>
+            <a:ext cx="323850" cy="0"/>
+          </a:xfrm>
+          <a:prstGeom prst="straightConnector1">
+            <a:avLst/>
+          </a:prstGeom>
+          <a:ln>
+            <a:solidFill>
+              <a:schemeClr val="tx1"/>
+            </a:solidFill>
+            <a:tailEnd type="triangle"/>
+          </a:ln>
+        </p:spPr>
+        <p:style>
+          <a:lnRef idx="1">
+            <a:schemeClr val="accent1"/>
+          </a:lnRef>
+          <a:fillRef idx="0">
+            <a:schemeClr val="accent1"/>
+          </a:fillRef>
+          <a:effectRef idx="0">
+            <a:schemeClr val="accent1"/>
+          </a:effectRef>
+          <a:fontRef idx="minor">
+            <a:schemeClr val="tx1"/>
+          </a:fontRef>
+        </p:style>
+      </p:cxnSp>
+      <p:sp>
+        <p:nvSpPr>
+          <p:cNvPr id="15" name="TextBox 14">
+            <a:extLst>
+              <a:ext uri="{FF2B5EF4-FFF2-40B4-BE49-F238E27FC236}">
+                <a16:creationId xmlns:a16="http://schemas.microsoft.com/office/drawing/2014/main" id="{1105A116-C056-4705-9604-2929B86C370B}"/>
+              </a:ext>
+            </a:extLst>
+          </p:cNvPr>
+          <p:cNvSpPr txBox="1"/>
+          <p:nvPr/>
+        </p:nvSpPr>
+        <p:spPr>
+          <a:xfrm>
+            <a:off x="1386894" y="1048134"/>
+            <a:ext cx="2013531" cy="577081"/>
+          </a:xfrm>
+          <a:prstGeom prst="rect">
+            <a:avLst/>
+          </a:prstGeom>
+          <a:noFill/>
+        </p:spPr>
+        <p:txBody>
+          <a:bodyPr wrap="square" rtlCol="0">
+            <a:spAutoFit/>
+          </a:bodyPr>
+          <a:lstStyle/>
+          <a:p>
+            <a:r>
+              <a:rPr lang="en-US" sz="1050" b="1" dirty="0"/>
+              <a:t>Resposta “NO” enviada pelo dispositivo, indicando que não ocorreram eventos de VTCD</a:t>
+            </a:r>
+            <a:endParaRPr lang="pt-BR" sz="1050" b="1" dirty="0"/>
+          </a:p>
+        </p:txBody>
+      </p:sp>
+      <p:cxnSp>
+        <p:nvCxnSpPr>
+          <p:cNvPr id="18" name="Straight Arrow Connector 17">
+            <a:extLst>
+              <a:ext uri="{FF2B5EF4-FFF2-40B4-BE49-F238E27FC236}">
+                <a16:creationId xmlns:a16="http://schemas.microsoft.com/office/drawing/2014/main" id="{C22707F0-FBCD-4C64-924C-BF35D389F499}"/>
+              </a:ext>
+            </a:extLst>
+          </p:cNvPr>
+          <p:cNvCxnSpPr/>
+          <p:nvPr/>
+        </p:nvCxnSpPr>
+        <p:spPr>
+          <a:xfrm>
+            <a:off x="4432300" y="2038350"/>
+            <a:ext cx="0" cy="292100"/>
+          </a:xfrm>
+          <a:prstGeom prst="straightConnector1">
+            <a:avLst/>
+          </a:prstGeom>
+          <a:ln>
+            <a:solidFill>
+              <a:schemeClr val="tx1"/>
+            </a:solidFill>
+            <a:tailEnd type="triangle"/>
+          </a:ln>
+        </p:spPr>
+        <p:style>
+          <a:lnRef idx="1">
+            <a:schemeClr val="accent1"/>
+          </a:lnRef>
+          <a:fillRef idx="0">
+            <a:schemeClr val="accent1"/>
+          </a:fillRef>
+          <a:effectRef idx="0">
+            <a:schemeClr val="accent1"/>
+          </a:effectRef>
+          <a:fontRef idx="minor">
+            <a:schemeClr val="tx1"/>
+          </a:fontRef>
+        </p:style>
+      </p:cxnSp>
+      <p:sp>
+        <p:nvSpPr>
+          <p:cNvPr id="19" name="TextBox 18">
+            <a:extLst>
+              <a:ext uri="{FF2B5EF4-FFF2-40B4-BE49-F238E27FC236}">
+                <a16:creationId xmlns:a16="http://schemas.microsoft.com/office/drawing/2014/main" id="{40B6560D-89DE-49FE-9BB1-1017ED39C4B8}"/>
+              </a:ext>
+            </a:extLst>
+          </p:cNvPr>
+          <p:cNvSpPr txBox="1"/>
+          <p:nvPr/>
+        </p:nvSpPr>
+        <p:spPr>
+          <a:xfrm>
+            <a:off x="3676650" y="2292925"/>
+            <a:ext cx="2330446" cy="646331"/>
+          </a:xfrm>
+          <a:prstGeom prst="rect">
+            <a:avLst/>
+          </a:prstGeom>
+          <a:noFill/>
+        </p:spPr>
+        <p:txBody>
+          <a:bodyPr wrap="square" rtlCol="0">
+            <a:spAutoFit/>
+          </a:bodyPr>
+          <a:lstStyle/>
+          <a:p>
+            <a:r>
+              <a:rPr lang="en-US" sz="1200" b="1" dirty="0"/>
+              <a:t>Após a ocorrência, o Sistema retorna data, hora e tipo do ultimo evento</a:t>
+            </a:r>
+            <a:endParaRPr lang="pt-BR" sz="1200" b="1" dirty="0"/>
+          </a:p>
+        </p:txBody>
+      </p:sp>
+    </p:spTree>
+    <p:extLst>
+      <p:ext uri="{BB962C8B-B14F-4D97-AF65-F5344CB8AC3E}">
+        <p14:creationId xmlns:p14="http://schemas.microsoft.com/office/powerpoint/2010/main" val="1348513737"/>
+      </p:ext>
+    </p:extLst>
+  </p:cSld>
+  <p:clrMapOvr>
+    <a:masterClrMapping/>
+  </p:clrMapOvr>
+</p:sld>
+</file>
+
 <file path=ppt/slides/slide2.xml><?xml version="1.0" encoding="utf-8"?>
 <p:sld xmlns:a="http://schemas.openxmlformats.org/drawingml/2006/main" xmlns:r="http://schemas.openxmlformats.org/officeDocument/2006/relationships" xmlns:p="http://schemas.openxmlformats.org/presentationml/2006/main">
   <p:cSld>
@@ -7499,47 +7828,12 @@
           <a:chExt cx="0" cy="0"/>
         </a:xfrm>
       </p:grpSpPr>
-      <p:pic>
-        <p:nvPicPr>
-          <p:cNvPr id="5" name="Content Placeholder 4">
-            <a:extLst>
-              <a:ext uri="{FF2B5EF4-FFF2-40B4-BE49-F238E27FC236}">
-                <a16:creationId xmlns:a16="http://schemas.microsoft.com/office/drawing/2014/main" id="{E49F0F35-3FC5-4544-BDB8-6F57195B2D76}"/>
-              </a:ext>
-            </a:extLst>
-          </p:cNvPr>
-          <p:cNvPicPr>
-            <a:picLocks noGrp="1" noChangeAspect="1"/>
-          </p:cNvPicPr>
-          <p:nvPr>
-            <p:ph idx="1"/>
-          </p:nvPr>
-        </p:nvPicPr>
-        <p:blipFill>
-          <a:blip r:embed="rId2">
-            <a:extLst>
-              <a:ext uri="{28A0092B-C50C-407E-A947-70E740481C1C}">
-                <a14:useLocalDpi xmlns:a14="http://schemas.microsoft.com/office/drawing/2010/main" val="0"/>
-              </a:ext>
-            </a:extLst>
-          </a:blip>
-          <a:stretch>
-            <a:fillRect/>
-          </a:stretch>
-        </p:blipFill>
-        <p:spPr>
-          <a:xfrm>
-            <a:off x="2577997" y="749074"/>
-            <a:ext cx="4645157" cy="4150095"/>
-          </a:xfrm>
-        </p:spPr>
-      </p:pic>
-      <p:sp>
-        <p:nvSpPr>
-          <p:cNvPr id="7" name="Rectangle 6">
-            <a:extLst>
-              <a:ext uri="{FF2B5EF4-FFF2-40B4-BE49-F238E27FC236}">
-                <a16:creationId xmlns:a16="http://schemas.microsoft.com/office/drawing/2014/main" id="{C1B4FC52-1D59-449E-88DC-0AC081B489F1}"/>
+      <p:sp>
+        <p:nvSpPr>
+          <p:cNvPr id="4" name="Rectangle 3">
+            <a:extLst>
+              <a:ext uri="{FF2B5EF4-FFF2-40B4-BE49-F238E27FC236}">
+                <a16:creationId xmlns:a16="http://schemas.microsoft.com/office/drawing/2014/main" id="{78F0F379-A6CD-4E38-BEB0-D1FED3EE3CBF}"/>
               </a:ext>
             </a:extLst>
           </p:cNvPr>
@@ -7548,14 +7842,37 @@
         </p:nvSpPr>
         <p:spPr>
           <a:xfrm>
-            <a:off x="2659310" y="3598877"/>
-            <a:ext cx="2978092" cy="1182848"/>
+            <a:off x="2151079" y="4332133"/>
+            <a:ext cx="2196514" cy="989645"/>
           </a:xfrm>
           <a:prstGeom prst="rect">
             <a:avLst/>
           </a:prstGeom>
-          <a:noFill/>
-          <a:ln w="28575">
+          <a:gradFill flip="none" rotWithShape="1">
+            <a:gsLst>
+              <a:gs pos="0">
+                <a:schemeClr val="accent1">
+                  <a:tint val="66000"/>
+                  <a:satMod val="160000"/>
+                </a:schemeClr>
+              </a:gs>
+              <a:gs pos="50000">
+                <a:schemeClr val="accent1">
+                  <a:tint val="44500"/>
+                  <a:satMod val="160000"/>
+                </a:schemeClr>
+              </a:gs>
+              <a:gs pos="100000">
+                <a:schemeClr val="accent1">
+                  <a:tint val="23500"/>
+                  <a:satMod val="160000"/>
+                </a:schemeClr>
+              </a:gs>
+            </a:gsLst>
+            <a:lin ang="5400000" scaled="1"/>
+            <a:tileRect/>
+          </a:gradFill>
+          <a:ln w="38100">
             <a:solidFill>
               <a:schemeClr val="tx1"/>
             </a:solidFill>
@@ -7582,16 +7899,23 @@
           <a:lstStyle/>
           <a:p>
             <a:pPr algn="ctr"/>
-            <a:endParaRPr lang="pt-BR"/>
-          </a:p>
-        </p:txBody>
-      </p:sp>
-      <p:sp>
-        <p:nvSpPr>
-          <p:cNvPr id="8" name="Rectangle 7">
-            <a:extLst>
-              <a:ext uri="{FF2B5EF4-FFF2-40B4-BE49-F238E27FC236}">
-                <a16:creationId xmlns:a16="http://schemas.microsoft.com/office/drawing/2014/main" id="{D93BAD24-E617-4D75-A2AD-01F5F7024BAB}"/>
+            <a:r>
+              <a:rPr lang="pt-BR" sz="1600" b="1" dirty="0">
+                <a:solidFill>
+                  <a:schemeClr val="tx1"/>
+                </a:solidFill>
+              </a:rPr>
+              <a:t>Sistema faz o cálculo da frequência e da tensão RMS para as três fases da rede</a:t>
+            </a:r>
+          </a:p>
+        </p:txBody>
+      </p:sp>
+      <p:sp>
+        <p:nvSpPr>
+          <p:cNvPr id="5" name="Rectangle 4">
+            <a:extLst>
+              <a:ext uri="{FF2B5EF4-FFF2-40B4-BE49-F238E27FC236}">
+                <a16:creationId xmlns:a16="http://schemas.microsoft.com/office/drawing/2014/main" id="{ABD9547C-8511-478C-BC06-191CFF5D33CA}"/>
               </a:ext>
             </a:extLst>
           </p:cNvPr>
@@ -7600,14 +7924,37 @@
         </p:nvSpPr>
         <p:spPr>
           <a:xfrm>
-            <a:off x="5058562" y="1426128"/>
-            <a:ext cx="2030136" cy="1015068"/>
+            <a:off x="2428143" y="1275536"/>
+            <a:ext cx="1642386" cy="755642"/>
           </a:xfrm>
           <a:prstGeom prst="rect">
             <a:avLst/>
           </a:prstGeom>
-          <a:noFill/>
-          <a:ln w="28575">
+          <a:gradFill flip="none" rotWithShape="1">
+            <a:gsLst>
+              <a:gs pos="0">
+                <a:schemeClr val="accent1">
+                  <a:tint val="66000"/>
+                  <a:satMod val="160000"/>
+                </a:schemeClr>
+              </a:gs>
+              <a:gs pos="50000">
+                <a:schemeClr val="accent1">
+                  <a:tint val="44500"/>
+                  <a:satMod val="160000"/>
+                </a:schemeClr>
+              </a:gs>
+              <a:gs pos="100000">
+                <a:schemeClr val="accent1">
+                  <a:tint val="23500"/>
+                  <a:satMod val="160000"/>
+                </a:schemeClr>
+              </a:gs>
+            </a:gsLst>
+            <a:lin ang="5400000" scaled="1"/>
+            <a:tileRect/>
+          </a:gradFill>
+          <a:ln w="38100">
             <a:solidFill>
               <a:schemeClr val="tx1"/>
             </a:solidFill>
@@ -7634,33 +7981,448 @@
           <a:lstStyle/>
           <a:p>
             <a:pPr algn="ctr"/>
-            <a:endParaRPr lang="pt-BR"/>
+            <a:r>
+              <a:rPr lang="pt-BR" sz="1600" b="1" dirty="0">
+                <a:solidFill>
+                  <a:schemeClr val="tx1"/>
+                </a:solidFill>
+              </a:rPr>
+              <a:t>Usuário configura data e hora do sistema </a:t>
+            </a:r>
+          </a:p>
+        </p:txBody>
+      </p:sp>
+      <p:sp>
+        <p:nvSpPr>
+          <p:cNvPr id="6" name="Rectangle 5">
+            <a:extLst>
+              <a:ext uri="{FF2B5EF4-FFF2-40B4-BE49-F238E27FC236}">
+                <a16:creationId xmlns:a16="http://schemas.microsoft.com/office/drawing/2014/main" id="{E3EE69DA-8426-465F-9020-4DBC4D6C0B06}"/>
+              </a:ext>
+            </a:extLst>
+          </p:cNvPr>
+          <p:cNvSpPr/>
+          <p:nvPr/>
+        </p:nvSpPr>
+        <p:spPr>
+          <a:xfrm>
+            <a:off x="2216549" y="2686833"/>
+            <a:ext cx="2088821" cy="989645"/>
+          </a:xfrm>
+          <a:prstGeom prst="rect">
+            <a:avLst/>
+          </a:prstGeom>
+          <a:gradFill flip="none" rotWithShape="1">
+            <a:gsLst>
+              <a:gs pos="0">
+                <a:schemeClr val="accent1">
+                  <a:tint val="66000"/>
+                  <a:satMod val="160000"/>
+                </a:schemeClr>
+              </a:gs>
+              <a:gs pos="50000">
+                <a:schemeClr val="accent1">
+                  <a:tint val="44500"/>
+                  <a:satMod val="160000"/>
+                </a:schemeClr>
+              </a:gs>
+              <a:gs pos="100000">
+                <a:schemeClr val="accent1">
+                  <a:tint val="23500"/>
+                  <a:satMod val="160000"/>
+                </a:schemeClr>
+              </a:gs>
+            </a:gsLst>
+            <a:lin ang="5400000" scaled="1"/>
+            <a:tileRect/>
+          </a:gradFill>
+          <a:ln w="38100">
+            <a:solidFill>
+              <a:schemeClr val="tx1"/>
+            </a:solidFill>
+          </a:ln>
+        </p:spPr>
+        <p:style>
+          <a:lnRef idx="2">
+            <a:schemeClr val="accent1">
+              <a:shade val="50000"/>
+            </a:schemeClr>
+          </a:lnRef>
+          <a:fillRef idx="1">
+            <a:schemeClr val="accent1"/>
+          </a:fillRef>
+          <a:effectRef idx="0">
+            <a:schemeClr val="accent1"/>
+          </a:effectRef>
+          <a:fontRef idx="minor">
+            <a:schemeClr val="lt1"/>
+          </a:fontRef>
+        </p:style>
+        <p:txBody>
+          <a:bodyPr rtlCol="0" anchor="ctr"/>
+          <a:lstStyle/>
+          <a:p>
+            <a:pPr algn="ctr"/>
+            <a:r>
+              <a:rPr lang="pt-BR" sz="1600" b="1" dirty="0">
+                <a:solidFill>
+                  <a:schemeClr val="tx1"/>
+                </a:solidFill>
+              </a:rPr>
+              <a:t>Placa de medição trifásica coleta sinais de tensão das três fases da rede elétrica </a:t>
+            </a:r>
+          </a:p>
+        </p:txBody>
+      </p:sp>
+      <p:sp>
+        <p:nvSpPr>
+          <p:cNvPr id="19" name="Rectangle 18">
+            <a:extLst>
+              <a:ext uri="{FF2B5EF4-FFF2-40B4-BE49-F238E27FC236}">
+                <a16:creationId xmlns:a16="http://schemas.microsoft.com/office/drawing/2014/main" id="{14BC8BFE-21C7-41EC-97CA-D8AF5D805916}"/>
+              </a:ext>
+            </a:extLst>
+          </p:cNvPr>
+          <p:cNvSpPr/>
+          <p:nvPr/>
+        </p:nvSpPr>
+        <p:spPr>
+          <a:xfrm>
+            <a:off x="5050172" y="4295393"/>
+            <a:ext cx="2423017" cy="1063123"/>
+          </a:xfrm>
+          <a:prstGeom prst="rect">
+            <a:avLst/>
+          </a:prstGeom>
+          <a:gradFill flip="none" rotWithShape="1">
+            <a:gsLst>
+              <a:gs pos="0">
+                <a:schemeClr val="accent1">
+                  <a:tint val="66000"/>
+                  <a:satMod val="160000"/>
+                </a:schemeClr>
+              </a:gs>
+              <a:gs pos="50000">
+                <a:schemeClr val="accent1">
+                  <a:tint val="44500"/>
+                  <a:satMod val="160000"/>
+                </a:schemeClr>
+              </a:gs>
+              <a:gs pos="100000">
+                <a:schemeClr val="accent1">
+                  <a:tint val="23500"/>
+                  <a:satMod val="160000"/>
+                </a:schemeClr>
+              </a:gs>
+            </a:gsLst>
+            <a:lin ang="5400000" scaled="1"/>
+            <a:tileRect/>
+          </a:gradFill>
+          <a:ln w="38100">
+            <a:solidFill>
+              <a:schemeClr val="tx1"/>
+            </a:solidFill>
+          </a:ln>
+        </p:spPr>
+        <p:style>
+          <a:lnRef idx="2">
+            <a:schemeClr val="accent1">
+              <a:shade val="50000"/>
+            </a:schemeClr>
+          </a:lnRef>
+          <a:fillRef idx="1">
+            <a:schemeClr val="accent1"/>
+          </a:fillRef>
+          <a:effectRef idx="0">
+            <a:schemeClr val="accent1"/>
+          </a:effectRef>
+          <a:fontRef idx="minor">
+            <a:schemeClr val="lt1"/>
+          </a:fontRef>
+        </p:style>
+        <p:txBody>
+          <a:bodyPr rtlCol="0" anchor="ctr"/>
+          <a:lstStyle/>
+          <a:p>
+            <a:pPr algn="ctr"/>
+            <a:r>
+              <a:rPr lang="pt-BR" sz="1600" b="1" dirty="0">
+                <a:solidFill>
+                  <a:schemeClr val="tx1"/>
+                </a:solidFill>
+              </a:rPr>
+              <a:t>Microcontrolador monitora o valor RMS da tensão para detectar possíveis eventos de VTCD</a:t>
+            </a:r>
+          </a:p>
+        </p:txBody>
+      </p:sp>
+      <p:sp>
+        <p:nvSpPr>
+          <p:cNvPr id="20" name="Rectangle 19">
+            <a:extLst>
+              <a:ext uri="{FF2B5EF4-FFF2-40B4-BE49-F238E27FC236}">
+                <a16:creationId xmlns:a16="http://schemas.microsoft.com/office/drawing/2014/main" id="{17F0B19D-A756-4453-B04A-B80B41739ABA}"/>
+              </a:ext>
+            </a:extLst>
+          </p:cNvPr>
+          <p:cNvSpPr/>
+          <p:nvPr/>
+        </p:nvSpPr>
+        <p:spPr>
+          <a:xfrm>
+            <a:off x="4826448" y="2352187"/>
+            <a:ext cx="2539103" cy="1482572"/>
+          </a:xfrm>
+          <a:prstGeom prst="rect">
+            <a:avLst/>
+          </a:prstGeom>
+          <a:gradFill flip="none" rotWithShape="1">
+            <a:gsLst>
+              <a:gs pos="0">
+                <a:schemeClr val="accent1">
+                  <a:tint val="66000"/>
+                  <a:satMod val="160000"/>
+                </a:schemeClr>
+              </a:gs>
+              <a:gs pos="50000">
+                <a:schemeClr val="accent1">
+                  <a:tint val="44500"/>
+                  <a:satMod val="160000"/>
+                </a:schemeClr>
+              </a:gs>
+              <a:gs pos="100000">
+                <a:schemeClr val="accent1">
+                  <a:tint val="23500"/>
+                  <a:satMod val="160000"/>
+                </a:schemeClr>
+              </a:gs>
+            </a:gsLst>
+            <a:lin ang="5400000" scaled="1"/>
+            <a:tileRect/>
+          </a:gradFill>
+          <a:ln w="38100">
+            <a:solidFill>
+              <a:schemeClr val="tx1"/>
+            </a:solidFill>
+          </a:ln>
+        </p:spPr>
+        <p:style>
+          <a:lnRef idx="2">
+            <a:schemeClr val="accent1">
+              <a:shade val="50000"/>
+            </a:schemeClr>
+          </a:lnRef>
+          <a:fillRef idx="1">
+            <a:schemeClr val="accent1"/>
+          </a:fillRef>
+          <a:effectRef idx="0">
+            <a:schemeClr val="accent1"/>
+          </a:effectRef>
+          <a:fontRef idx="minor">
+            <a:schemeClr val="lt1"/>
+          </a:fontRef>
+        </p:style>
+        <p:txBody>
+          <a:bodyPr rtlCol="0" anchor="ctr"/>
+          <a:lstStyle/>
+          <a:p>
+            <a:pPr algn="ctr"/>
+            <a:r>
+              <a:rPr lang="pt-BR" sz="1600" b="1" dirty="0">
+                <a:solidFill>
+                  <a:schemeClr val="tx1"/>
+                </a:solidFill>
+              </a:rPr>
+              <a:t>Caso o valor RMS da tensão saia dos limites programados, os Timers do microcontrolador são ativados para determinar a duração do evento</a:t>
+            </a:r>
+          </a:p>
+        </p:txBody>
+      </p:sp>
+      <p:sp>
+        <p:nvSpPr>
+          <p:cNvPr id="21" name="Rectangle 20">
+            <a:extLst>
+              <a:ext uri="{FF2B5EF4-FFF2-40B4-BE49-F238E27FC236}">
+                <a16:creationId xmlns:a16="http://schemas.microsoft.com/office/drawing/2014/main" id="{2674569B-3F6E-4B29-AEEB-98541CC4B2CA}"/>
+              </a:ext>
+            </a:extLst>
+          </p:cNvPr>
+          <p:cNvSpPr/>
+          <p:nvPr/>
+        </p:nvSpPr>
+        <p:spPr>
+          <a:xfrm>
+            <a:off x="4799881" y="829725"/>
+            <a:ext cx="2539103" cy="1071512"/>
+          </a:xfrm>
+          <a:prstGeom prst="rect">
+            <a:avLst/>
+          </a:prstGeom>
+          <a:gradFill flip="none" rotWithShape="1">
+            <a:gsLst>
+              <a:gs pos="0">
+                <a:schemeClr val="accent1">
+                  <a:tint val="66000"/>
+                  <a:satMod val="160000"/>
+                </a:schemeClr>
+              </a:gs>
+              <a:gs pos="50000">
+                <a:schemeClr val="accent1">
+                  <a:tint val="44500"/>
+                  <a:satMod val="160000"/>
+                </a:schemeClr>
+              </a:gs>
+              <a:gs pos="100000">
+                <a:schemeClr val="accent1">
+                  <a:tint val="23500"/>
+                  <a:satMod val="160000"/>
+                </a:schemeClr>
+              </a:gs>
+            </a:gsLst>
+            <a:lin ang="5400000" scaled="1"/>
+            <a:tileRect/>
+          </a:gradFill>
+          <a:ln w="38100">
+            <a:solidFill>
+              <a:schemeClr val="tx1"/>
+            </a:solidFill>
+          </a:ln>
+        </p:spPr>
+        <p:style>
+          <a:lnRef idx="2">
+            <a:schemeClr val="accent1">
+              <a:shade val="50000"/>
+            </a:schemeClr>
+          </a:lnRef>
+          <a:fillRef idx="1">
+            <a:schemeClr val="accent1"/>
+          </a:fillRef>
+          <a:effectRef idx="0">
+            <a:schemeClr val="accent1"/>
+          </a:effectRef>
+          <a:fontRef idx="minor">
+            <a:schemeClr val="lt1"/>
+          </a:fontRef>
+        </p:style>
+        <p:txBody>
+          <a:bodyPr rtlCol="0" anchor="ctr"/>
+          <a:lstStyle/>
+          <a:p>
+            <a:pPr algn="ctr"/>
+            <a:r>
+              <a:rPr lang="pt-BR" sz="1600" b="1" dirty="0">
+                <a:solidFill>
+                  <a:schemeClr val="tx1"/>
+                </a:solidFill>
+              </a:rPr>
+              <a:t>Ao fim do evento de VTCD, a data, hora e o tipo da ocorrência são salvos em um buffer rotativo</a:t>
+            </a:r>
+          </a:p>
+        </p:txBody>
+      </p:sp>
+      <p:sp>
+        <p:nvSpPr>
+          <p:cNvPr id="22" name="Rectangle 21">
+            <a:extLst>
+              <a:ext uri="{FF2B5EF4-FFF2-40B4-BE49-F238E27FC236}">
+                <a16:creationId xmlns:a16="http://schemas.microsoft.com/office/drawing/2014/main" id="{8232103B-D991-4A94-A452-379704B26F5F}"/>
+              </a:ext>
+            </a:extLst>
+          </p:cNvPr>
+          <p:cNvSpPr/>
+          <p:nvPr/>
+        </p:nvSpPr>
+        <p:spPr>
+          <a:xfrm>
+            <a:off x="7843706" y="935717"/>
+            <a:ext cx="2034381" cy="931956"/>
+          </a:xfrm>
+          <a:prstGeom prst="rect">
+            <a:avLst/>
+          </a:prstGeom>
+          <a:gradFill flip="none" rotWithShape="1">
+            <a:gsLst>
+              <a:gs pos="0">
+                <a:schemeClr val="accent1">
+                  <a:tint val="66000"/>
+                  <a:satMod val="160000"/>
+                </a:schemeClr>
+              </a:gs>
+              <a:gs pos="50000">
+                <a:schemeClr val="accent1">
+                  <a:tint val="44500"/>
+                  <a:satMod val="160000"/>
+                </a:schemeClr>
+              </a:gs>
+              <a:gs pos="100000">
+                <a:schemeClr val="accent1">
+                  <a:tint val="23500"/>
+                  <a:satMod val="160000"/>
+                </a:schemeClr>
+              </a:gs>
+            </a:gsLst>
+            <a:lin ang="5400000" scaled="1"/>
+            <a:tileRect/>
+          </a:gradFill>
+          <a:ln w="38100">
+            <a:solidFill>
+              <a:schemeClr val="tx1"/>
+            </a:solidFill>
+          </a:ln>
+        </p:spPr>
+        <p:style>
+          <a:lnRef idx="2">
+            <a:schemeClr val="accent1">
+              <a:shade val="50000"/>
+            </a:schemeClr>
+          </a:lnRef>
+          <a:fillRef idx="1">
+            <a:schemeClr val="accent1"/>
+          </a:fillRef>
+          <a:effectRef idx="0">
+            <a:schemeClr val="accent1"/>
+          </a:effectRef>
+          <a:fontRef idx="minor">
+            <a:schemeClr val="lt1"/>
+          </a:fontRef>
+        </p:style>
+        <p:txBody>
+          <a:bodyPr rtlCol="0" anchor="ctr"/>
+          <a:lstStyle/>
+          <a:p>
+            <a:pPr algn="ctr"/>
+            <a:r>
+              <a:rPr lang="pt-BR" sz="1600" b="1" dirty="0">
+                <a:solidFill>
+                  <a:schemeClr val="tx1"/>
+                </a:solidFill>
+              </a:rPr>
+              <a:t>As informações referentes ao evento são salvas em um buffer rotativo</a:t>
+            </a:r>
           </a:p>
         </p:txBody>
       </p:sp>
       <p:cxnSp>
         <p:nvCxnSpPr>
-          <p:cNvPr id="10" name="Straight Arrow Connector 9">
-            <a:extLst>
-              <a:ext uri="{FF2B5EF4-FFF2-40B4-BE49-F238E27FC236}">
-                <a16:creationId xmlns:a16="http://schemas.microsoft.com/office/drawing/2014/main" id="{C270121D-0A49-495E-899A-D534C8CFE102}"/>
-              </a:ext>
-            </a:extLst>
-          </p:cNvPr>
-          <p:cNvCxnSpPr>
-            <a:cxnSpLocks/>
-          </p:cNvCxnSpPr>
+          <p:cNvPr id="24" name="Straight Arrow Connector 23">
+            <a:extLst>
+              <a:ext uri="{FF2B5EF4-FFF2-40B4-BE49-F238E27FC236}">
+                <a16:creationId xmlns:a16="http://schemas.microsoft.com/office/drawing/2014/main" id="{3FD2EB93-B9DE-458A-A47A-57BDAF80183C}"/>
+              </a:ext>
+            </a:extLst>
+          </p:cNvPr>
+          <p:cNvCxnSpPr/>
           <p:nvPr/>
         </p:nvCxnSpPr>
         <p:spPr>
           <a:xfrm>
-            <a:off x="5637402" y="4307747"/>
-            <a:ext cx="1753299" cy="0"/>
+            <a:off x="3260959" y="2031178"/>
+            <a:ext cx="0" cy="655655"/>
           </a:xfrm>
           <a:prstGeom prst="straightConnector1">
             <a:avLst/>
           </a:prstGeom>
-          <a:ln w="19050">
+          <a:ln w="57150">
             <a:solidFill>
               <a:schemeClr val="tx1"/>
             </a:solidFill>
@@ -7684,121 +8446,25 @@
       </p:cxnSp>
       <p:cxnSp>
         <p:nvCxnSpPr>
-          <p:cNvPr id="11" name="Straight Arrow Connector 10">
-            <a:extLst>
-              <a:ext uri="{FF2B5EF4-FFF2-40B4-BE49-F238E27FC236}">
-                <a16:creationId xmlns:a16="http://schemas.microsoft.com/office/drawing/2014/main" id="{73C356B1-56B0-4939-AE47-3534D3235BD8}"/>
-              </a:ext>
-            </a:extLst>
-          </p:cNvPr>
-          <p:cNvCxnSpPr>
-            <a:cxnSpLocks/>
-          </p:cNvCxnSpPr>
+          <p:cNvPr id="25" name="Straight Arrow Connector 24">
+            <a:extLst>
+              <a:ext uri="{FF2B5EF4-FFF2-40B4-BE49-F238E27FC236}">
+                <a16:creationId xmlns:a16="http://schemas.microsoft.com/office/drawing/2014/main" id="{530FF37E-2344-4ABA-B184-45202E350B62}"/>
+              </a:ext>
+            </a:extLst>
+          </p:cNvPr>
+          <p:cNvCxnSpPr/>
           <p:nvPr/>
         </p:nvCxnSpPr>
         <p:spPr>
           <a:xfrm>
-            <a:off x="7088698" y="1863754"/>
-            <a:ext cx="446016" cy="0"/>
+            <a:off x="3263512" y="3676478"/>
+            <a:ext cx="0" cy="655655"/>
           </a:xfrm>
           <a:prstGeom prst="straightConnector1">
             <a:avLst/>
           </a:prstGeom>
-          <a:ln w="19050">
-            <a:solidFill>
-              <a:schemeClr val="tx1"/>
-            </a:solidFill>
-            <a:tailEnd type="triangle"/>
-          </a:ln>
-        </p:spPr>
-        <p:style>
-          <a:lnRef idx="1">
-            <a:schemeClr val="accent1"/>
-          </a:lnRef>
-          <a:fillRef idx="0">
-            <a:schemeClr val="accent1"/>
-          </a:fillRef>
-          <a:effectRef idx="0">
-            <a:schemeClr val="accent1"/>
-          </a:effectRef>
-          <a:fontRef idx="minor">
-            <a:schemeClr val="tx1"/>
-          </a:fontRef>
-        </p:style>
-      </p:cxnSp>
-      <p:sp>
-        <p:nvSpPr>
-          <p:cNvPr id="13" name="Rectangle 12">
-            <a:extLst>
-              <a:ext uri="{FF2B5EF4-FFF2-40B4-BE49-F238E27FC236}">
-                <a16:creationId xmlns:a16="http://schemas.microsoft.com/office/drawing/2014/main" id="{9AAD12D9-A44F-4394-BED1-967227ECE111}"/>
-              </a:ext>
-            </a:extLst>
-          </p:cNvPr>
-          <p:cNvSpPr/>
-          <p:nvPr/>
-        </p:nvSpPr>
-        <p:spPr>
-          <a:xfrm>
-            <a:off x="2659310" y="1132514"/>
-            <a:ext cx="4051883" cy="226504"/>
-          </a:xfrm>
-          <a:prstGeom prst="rect">
-            <a:avLst/>
-          </a:prstGeom>
-          <a:noFill/>
-          <a:ln w="28575">
-            <a:solidFill>
-              <a:schemeClr val="tx1"/>
-            </a:solidFill>
-          </a:ln>
-        </p:spPr>
-        <p:style>
-          <a:lnRef idx="2">
-            <a:schemeClr val="accent1">
-              <a:shade val="50000"/>
-            </a:schemeClr>
-          </a:lnRef>
-          <a:fillRef idx="1">
-            <a:schemeClr val="accent1"/>
-          </a:fillRef>
-          <a:effectRef idx="0">
-            <a:schemeClr val="accent1"/>
-          </a:effectRef>
-          <a:fontRef idx="minor">
-            <a:schemeClr val="lt1"/>
-          </a:fontRef>
-        </p:style>
-        <p:txBody>
-          <a:bodyPr rtlCol="0" anchor="ctr"/>
-          <a:lstStyle/>
-          <a:p>
-            <a:pPr algn="ctr"/>
-            <a:endParaRPr lang="pt-BR"/>
-          </a:p>
-        </p:txBody>
-      </p:sp>
-      <p:cxnSp>
-        <p:nvCxnSpPr>
-          <p:cNvPr id="14" name="Straight Arrow Connector 13">
-            <a:extLst>
-              <a:ext uri="{FF2B5EF4-FFF2-40B4-BE49-F238E27FC236}">
-                <a16:creationId xmlns:a16="http://schemas.microsoft.com/office/drawing/2014/main" id="{450BCEB9-4DB8-4E99-A151-0B5FAB500D76}"/>
-              </a:ext>
-            </a:extLst>
-          </p:cNvPr>
-          <p:cNvCxnSpPr/>
-          <p:nvPr/>
-        </p:nvCxnSpPr>
-        <p:spPr>
-          <a:xfrm flipH="1">
-            <a:off x="2223083" y="1251358"/>
-            <a:ext cx="436227" cy="0"/>
-          </a:xfrm>
-          <a:prstGeom prst="straightConnector1">
-            <a:avLst/>
-          </a:prstGeom>
-          <a:ln w="19050">
+          <a:ln w="57150">
             <a:solidFill>
               <a:schemeClr val="tx1"/>
             </a:solidFill>
@@ -7822,10 +8488,10 @@
       </p:cxnSp>
       <p:cxnSp>
         <p:nvCxnSpPr>
-          <p:cNvPr id="15" name="Straight Arrow Connector 14">
-            <a:extLst>
-              <a:ext uri="{FF2B5EF4-FFF2-40B4-BE49-F238E27FC236}">
-                <a16:creationId xmlns:a16="http://schemas.microsoft.com/office/drawing/2014/main" id="{7EDCCE8D-A8FB-4A74-AD14-7A9C98028411}"/>
+          <p:cNvPr id="26" name="Straight Arrow Connector 25">
+            <a:extLst>
+              <a:ext uri="{FF2B5EF4-FFF2-40B4-BE49-F238E27FC236}">
+                <a16:creationId xmlns:a16="http://schemas.microsoft.com/office/drawing/2014/main" id="{3D6F4F4E-3228-4287-A697-00CBA78173C2}"/>
               </a:ext>
             </a:extLst>
           </p:cNvPr>
@@ -7835,14 +8501,14 @@
           <p:nvPr/>
         </p:nvCxnSpPr>
         <p:spPr>
-          <a:xfrm flipH="1">
-            <a:off x="2223083" y="3214381"/>
-            <a:ext cx="573028" cy="0"/>
+          <a:xfrm>
+            <a:off x="4347593" y="4835053"/>
+            <a:ext cx="702579" cy="0"/>
           </a:xfrm>
           <a:prstGeom prst="straightConnector1">
             <a:avLst/>
           </a:prstGeom>
-          <a:ln w="19050">
+          <a:ln w="57150">
             <a:solidFill>
               <a:schemeClr val="tx1"/>
             </a:solidFill>
@@ -7864,154 +8530,266 @@
           </a:fontRef>
         </p:style>
       </p:cxnSp>
-      <p:sp>
-        <p:nvSpPr>
-          <p:cNvPr id="17" name="TextBox 16">
-            <a:extLst>
-              <a:ext uri="{FF2B5EF4-FFF2-40B4-BE49-F238E27FC236}">
-                <a16:creationId xmlns:a16="http://schemas.microsoft.com/office/drawing/2014/main" id="{B608A3A5-3FA2-412A-8FE7-B63B196E6FF2}"/>
-              </a:ext>
-            </a:extLst>
-          </p:cNvPr>
-          <p:cNvSpPr txBox="1"/>
-          <p:nvPr/>
-        </p:nvSpPr>
-        <p:spPr>
-          <a:xfrm>
-            <a:off x="837012" y="1066630"/>
-            <a:ext cx="1672585" cy="584775"/>
+      <p:cxnSp>
+        <p:nvCxnSpPr>
+          <p:cNvPr id="29" name="Straight Arrow Connector 28">
+            <a:extLst>
+              <a:ext uri="{FF2B5EF4-FFF2-40B4-BE49-F238E27FC236}">
+                <a16:creationId xmlns:a16="http://schemas.microsoft.com/office/drawing/2014/main" id="{011A05A1-E64C-41AC-B113-C674C073DA45}"/>
+              </a:ext>
+            </a:extLst>
+          </p:cNvPr>
+          <p:cNvCxnSpPr>
+            <a:cxnSpLocks/>
+          </p:cNvCxnSpPr>
+          <p:nvPr/>
+        </p:nvCxnSpPr>
+        <p:spPr>
+          <a:xfrm flipV="1">
+            <a:off x="6096000" y="3840490"/>
+            <a:ext cx="0" cy="454903"/>
+          </a:xfrm>
+          <a:prstGeom prst="straightConnector1">
+            <a:avLst/>
+          </a:prstGeom>
+          <a:ln w="57150">
+            <a:solidFill>
+              <a:schemeClr val="tx1"/>
+            </a:solidFill>
+            <a:tailEnd type="triangle"/>
+          </a:ln>
+        </p:spPr>
+        <p:style>
+          <a:lnRef idx="1">
+            <a:schemeClr val="accent1"/>
+          </a:lnRef>
+          <a:fillRef idx="0">
+            <a:schemeClr val="accent1"/>
+          </a:fillRef>
+          <a:effectRef idx="0">
+            <a:schemeClr val="accent1"/>
+          </a:effectRef>
+          <a:fontRef idx="minor">
+            <a:schemeClr val="tx1"/>
+          </a:fontRef>
+        </p:style>
+      </p:cxnSp>
+      <p:cxnSp>
+        <p:nvCxnSpPr>
+          <p:cNvPr id="31" name="Straight Arrow Connector 30">
+            <a:extLst>
+              <a:ext uri="{FF2B5EF4-FFF2-40B4-BE49-F238E27FC236}">
+                <a16:creationId xmlns:a16="http://schemas.microsoft.com/office/drawing/2014/main" id="{AEE485D8-550C-4B62-9292-ED81BE59D3D9}"/>
+              </a:ext>
+            </a:extLst>
+          </p:cNvPr>
+          <p:cNvCxnSpPr>
+            <a:cxnSpLocks/>
+          </p:cNvCxnSpPr>
+          <p:nvPr/>
+        </p:nvCxnSpPr>
+        <p:spPr>
+          <a:xfrm flipV="1">
+            <a:off x="6069433" y="1904102"/>
+            <a:ext cx="0" cy="454903"/>
+          </a:xfrm>
+          <a:prstGeom prst="straightConnector1">
+            <a:avLst/>
+          </a:prstGeom>
+          <a:ln w="57150">
+            <a:solidFill>
+              <a:schemeClr val="tx1"/>
+            </a:solidFill>
+            <a:tailEnd type="triangle"/>
+          </a:ln>
+        </p:spPr>
+        <p:style>
+          <a:lnRef idx="1">
+            <a:schemeClr val="accent1"/>
+          </a:lnRef>
+          <a:fillRef idx="0">
+            <a:schemeClr val="accent1"/>
+          </a:fillRef>
+          <a:effectRef idx="0">
+            <a:schemeClr val="accent1"/>
+          </a:effectRef>
+          <a:fontRef idx="minor">
+            <a:schemeClr val="tx1"/>
+          </a:fontRef>
+        </p:style>
+      </p:cxnSp>
+      <p:cxnSp>
+        <p:nvCxnSpPr>
+          <p:cNvPr id="32" name="Straight Arrow Connector 31">
+            <a:extLst>
+              <a:ext uri="{FF2B5EF4-FFF2-40B4-BE49-F238E27FC236}">
+                <a16:creationId xmlns:a16="http://schemas.microsoft.com/office/drawing/2014/main" id="{7561E8A2-124F-4A4B-A67A-86FB7B62101F}"/>
+              </a:ext>
+            </a:extLst>
+          </p:cNvPr>
+          <p:cNvCxnSpPr>
+            <a:cxnSpLocks/>
+          </p:cNvCxnSpPr>
+          <p:nvPr/>
+        </p:nvCxnSpPr>
+        <p:spPr>
+          <a:xfrm>
+            <a:off x="7338984" y="1514410"/>
+            <a:ext cx="504722" cy="0"/>
+          </a:xfrm>
+          <a:prstGeom prst="straightConnector1">
+            <a:avLst/>
+          </a:prstGeom>
+          <a:ln w="57150">
+            <a:solidFill>
+              <a:schemeClr val="tx1"/>
+            </a:solidFill>
+            <a:tailEnd type="triangle"/>
+          </a:ln>
+        </p:spPr>
+        <p:style>
+          <a:lnRef idx="1">
+            <a:schemeClr val="accent1"/>
+          </a:lnRef>
+          <a:fillRef idx="0">
+            <a:schemeClr val="accent1"/>
+          </a:fillRef>
+          <a:effectRef idx="0">
+            <a:schemeClr val="accent1"/>
+          </a:effectRef>
+          <a:fontRef idx="minor">
+            <a:schemeClr val="tx1"/>
+          </a:fontRef>
+        </p:style>
+      </p:cxnSp>
+      <p:sp>
+        <p:nvSpPr>
+          <p:cNvPr id="34" name="Rectangle 33">
+            <a:extLst>
+              <a:ext uri="{FF2B5EF4-FFF2-40B4-BE49-F238E27FC236}">
+                <a16:creationId xmlns:a16="http://schemas.microsoft.com/office/drawing/2014/main" id="{8CF177D0-E725-47EA-9580-FDB8786CD73C}"/>
+              </a:ext>
+            </a:extLst>
+          </p:cNvPr>
+          <p:cNvSpPr/>
+          <p:nvPr/>
+        </p:nvSpPr>
+        <p:spPr>
+          <a:xfrm>
+            <a:off x="7591345" y="2574668"/>
+            <a:ext cx="2539102" cy="1197218"/>
           </a:xfrm>
           <a:prstGeom prst="rect">
             <a:avLst/>
           </a:prstGeom>
-          <a:noFill/>
-        </p:spPr>
-        <p:txBody>
-          <a:bodyPr wrap="square" rtlCol="0">
-            <a:spAutoFit/>
-          </a:bodyPr>
-          <a:lstStyle/>
-          <a:p>
-            <a:r>
-              <a:rPr lang="en-US" sz="1600" b="1" dirty="0"/>
-              <a:t>Op</a:t>
-            </a:r>
-            <a:r>
-              <a:rPr lang="pt-BR" sz="1600" b="1" dirty="0"/>
-              <a:t>ções de funcionalidade</a:t>
-            </a:r>
-          </a:p>
-        </p:txBody>
-      </p:sp>
-      <p:sp>
-        <p:nvSpPr>
-          <p:cNvPr id="18" name="TextBox 17">
-            <a:extLst>
-              <a:ext uri="{FF2B5EF4-FFF2-40B4-BE49-F238E27FC236}">
-                <a16:creationId xmlns:a16="http://schemas.microsoft.com/office/drawing/2014/main" id="{AD57D9F1-1757-406C-8C7E-4FE71C772B93}"/>
-              </a:ext>
-            </a:extLst>
-          </p:cNvPr>
-          <p:cNvSpPr txBox="1"/>
-          <p:nvPr/>
-        </p:nvSpPr>
-        <p:spPr>
-          <a:xfrm>
-            <a:off x="7534714" y="1571366"/>
-            <a:ext cx="2390849" cy="584775"/>
-          </a:xfrm>
-          <a:prstGeom prst="rect">
-            <a:avLst/>
-          </a:prstGeom>
-          <a:noFill/>
-        </p:spPr>
-        <p:txBody>
-          <a:bodyPr wrap="square" rtlCol="0">
-            <a:spAutoFit/>
-          </a:bodyPr>
-          <a:lstStyle/>
-          <a:p>
-            <a:r>
-              <a:rPr lang="pt-BR" sz="1600" b="1" dirty="0"/>
-              <a:t>Endereço IP e Porta do dispositivo remoto</a:t>
-            </a:r>
-          </a:p>
-        </p:txBody>
-      </p:sp>
-      <p:sp>
-        <p:nvSpPr>
-          <p:cNvPr id="21" name="TextBox 20">
-            <a:extLst>
-              <a:ext uri="{FF2B5EF4-FFF2-40B4-BE49-F238E27FC236}">
-                <a16:creationId xmlns:a16="http://schemas.microsoft.com/office/drawing/2014/main" id="{74D8F0E3-BDEE-4375-BA97-12A1CB6C4D83}"/>
-              </a:ext>
-            </a:extLst>
-          </p:cNvPr>
-          <p:cNvSpPr txBox="1"/>
-          <p:nvPr/>
-        </p:nvSpPr>
-        <p:spPr>
-          <a:xfrm>
-            <a:off x="7366744" y="3901339"/>
-            <a:ext cx="2726788" cy="830997"/>
-          </a:xfrm>
-          <a:prstGeom prst="rect">
-            <a:avLst/>
-          </a:prstGeom>
-          <a:noFill/>
-        </p:spPr>
-        <p:txBody>
-          <a:bodyPr wrap="square" rtlCol="0">
-            <a:spAutoFit/>
-          </a:bodyPr>
-          <a:lstStyle/>
-          <a:p>
-            <a:r>
-              <a:rPr lang="pt-BR" sz="1600" b="1" dirty="0"/>
-              <a:t>Mensagens de dado que podem ser enviadas ao dispositivo “Servidor”</a:t>
-            </a:r>
-          </a:p>
-        </p:txBody>
-      </p:sp>
-      <p:sp>
-        <p:nvSpPr>
-          <p:cNvPr id="23" name="TextBox 22">
-            <a:extLst>
-              <a:ext uri="{FF2B5EF4-FFF2-40B4-BE49-F238E27FC236}">
-                <a16:creationId xmlns:a16="http://schemas.microsoft.com/office/drawing/2014/main" id="{836E0C09-840B-4596-97FB-72B096D65AF4}"/>
-              </a:ext>
-            </a:extLst>
-          </p:cNvPr>
-          <p:cNvSpPr txBox="1"/>
-          <p:nvPr/>
-        </p:nvSpPr>
-        <p:spPr>
-          <a:xfrm>
-            <a:off x="688953" y="2824121"/>
-            <a:ext cx="1848388" cy="1077218"/>
-          </a:xfrm>
-          <a:prstGeom prst="rect">
-            <a:avLst/>
-          </a:prstGeom>
-          <a:noFill/>
-        </p:spPr>
-        <p:txBody>
-          <a:bodyPr wrap="square" rtlCol="0">
-            <a:spAutoFit/>
-          </a:bodyPr>
-          <a:lstStyle/>
-          <a:p>
-            <a:r>
-              <a:rPr lang="pt-BR" sz="1600" b="1" dirty="0"/>
-              <a:t>Dados enviados e recebidos na comunicação entre os dispositivos</a:t>
-            </a:r>
-          </a:p>
-        </p:txBody>
-      </p:sp>
+          <a:gradFill flip="none" rotWithShape="1">
+            <a:gsLst>
+              <a:gs pos="0">
+                <a:schemeClr val="accent1">
+                  <a:tint val="66000"/>
+                  <a:satMod val="160000"/>
+                </a:schemeClr>
+              </a:gs>
+              <a:gs pos="50000">
+                <a:schemeClr val="accent1">
+                  <a:tint val="44500"/>
+                  <a:satMod val="160000"/>
+                </a:schemeClr>
+              </a:gs>
+              <a:gs pos="100000">
+                <a:schemeClr val="accent1">
+                  <a:tint val="23500"/>
+                  <a:satMod val="160000"/>
+                </a:schemeClr>
+              </a:gs>
+            </a:gsLst>
+            <a:lin ang="5400000" scaled="1"/>
+            <a:tileRect/>
+          </a:gradFill>
+          <a:ln w="38100">
+            <a:solidFill>
+              <a:schemeClr val="tx1"/>
+            </a:solidFill>
+          </a:ln>
+        </p:spPr>
+        <p:style>
+          <a:lnRef idx="2">
+            <a:schemeClr val="accent1">
+              <a:shade val="50000"/>
+            </a:schemeClr>
+          </a:lnRef>
+          <a:fillRef idx="1">
+            <a:schemeClr val="accent1"/>
+          </a:fillRef>
+          <a:effectRef idx="0">
+            <a:schemeClr val="accent1"/>
+          </a:effectRef>
+          <a:fontRef idx="minor">
+            <a:schemeClr val="lt1"/>
+          </a:fontRef>
+        </p:style>
+        <p:txBody>
+          <a:bodyPr rtlCol="0" anchor="ctr"/>
+          <a:lstStyle/>
+          <a:p>
+            <a:pPr algn="ctr"/>
+            <a:r>
+              <a:rPr lang="pt-BR" sz="1600" b="1" dirty="0">
+                <a:solidFill>
+                  <a:schemeClr val="tx1"/>
+                </a:solidFill>
+              </a:rPr>
+              <a:t>Usuário consulta informações do sistema (data, hora, eventos salvos) através de uma rede Ethernet</a:t>
+            </a:r>
+          </a:p>
+        </p:txBody>
+      </p:sp>
+      <p:cxnSp>
+        <p:nvCxnSpPr>
+          <p:cNvPr id="35" name="Straight Arrow Connector 34">
+            <a:extLst>
+              <a:ext uri="{FF2B5EF4-FFF2-40B4-BE49-F238E27FC236}">
+                <a16:creationId xmlns:a16="http://schemas.microsoft.com/office/drawing/2014/main" id="{0528D149-A961-4BB3-B3E0-4B4D592B8C18}"/>
+              </a:ext>
+            </a:extLst>
+          </p:cNvPr>
+          <p:cNvCxnSpPr/>
+          <p:nvPr/>
+        </p:nvCxnSpPr>
+        <p:spPr>
+          <a:xfrm>
+            <a:off x="8860896" y="1901237"/>
+            <a:ext cx="0" cy="655655"/>
+          </a:xfrm>
+          <a:prstGeom prst="straightConnector1">
+            <a:avLst/>
+          </a:prstGeom>
+          <a:ln w="57150">
+            <a:solidFill>
+              <a:schemeClr val="tx1"/>
+            </a:solidFill>
+            <a:tailEnd type="triangle"/>
+          </a:ln>
+        </p:spPr>
+        <p:style>
+          <a:lnRef idx="1">
+            <a:schemeClr val="accent1"/>
+          </a:lnRef>
+          <a:fillRef idx="0">
+            <a:schemeClr val="accent1"/>
+          </a:fillRef>
+          <a:effectRef idx="0">
+            <a:schemeClr val="accent1"/>
+          </a:effectRef>
+          <a:fontRef idx="minor">
+            <a:schemeClr val="tx1"/>
+          </a:fontRef>
+        </p:style>
+      </p:cxnSp>
     </p:spTree>
     <p:extLst>
       <p:ext uri="{BB962C8B-B14F-4D97-AF65-F5344CB8AC3E}">
-        <p14:creationId xmlns:p14="http://schemas.microsoft.com/office/powerpoint/2010/main" val="1291845881"/>
+        <p14:creationId xmlns:p14="http://schemas.microsoft.com/office/powerpoint/2010/main" val="169136294"/>
       </p:ext>
     </p:extLst>
   </p:cSld>
@@ -8043,7 +8821,7 @@
           <p:cNvPr id="5" name="Content Placeholder 4">
             <a:extLst>
               <a:ext uri="{FF2B5EF4-FFF2-40B4-BE49-F238E27FC236}">
-                <a16:creationId xmlns:a16="http://schemas.microsoft.com/office/drawing/2014/main" id="{6E60684B-99B0-461D-B073-7A6CBA7514E1}"/>
+                <a16:creationId xmlns:a16="http://schemas.microsoft.com/office/drawing/2014/main" id="{E49F0F35-3FC5-4544-BDB8-6F57195B2D76}"/>
               </a:ext>
             </a:extLst>
           </p:cNvPr>
@@ -8068,17 +8846,121 @@
         </p:blipFill>
         <p:spPr>
           <a:xfrm>
-            <a:off x="1462782" y="238178"/>
-            <a:ext cx="6011808" cy="4500333"/>
+            <a:off x="2577997" y="749074"/>
+            <a:ext cx="4645157" cy="4150095"/>
           </a:xfrm>
         </p:spPr>
       </p:pic>
+      <p:sp>
+        <p:nvSpPr>
+          <p:cNvPr id="7" name="Rectangle 6">
+            <a:extLst>
+              <a:ext uri="{FF2B5EF4-FFF2-40B4-BE49-F238E27FC236}">
+                <a16:creationId xmlns:a16="http://schemas.microsoft.com/office/drawing/2014/main" id="{C1B4FC52-1D59-449E-88DC-0AC081B489F1}"/>
+              </a:ext>
+            </a:extLst>
+          </p:cNvPr>
+          <p:cNvSpPr/>
+          <p:nvPr/>
+        </p:nvSpPr>
+        <p:spPr>
+          <a:xfrm>
+            <a:off x="2659310" y="3598877"/>
+            <a:ext cx="2978092" cy="1182848"/>
+          </a:xfrm>
+          <a:prstGeom prst="rect">
+            <a:avLst/>
+          </a:prstGeom>
+          <a:noFill/>
+          <a:ln w="28575">
+            <a:solidFill>
+              <a:schemeClr val="tx1"/>
+            </a:solidFill>
+          </a:ln>
+        </p:spPr>
+        <p:style>
+          <a:lnRef idx="2">
+            <a:schemeClr val="accent1">
+              <a:shade val="50000"/>
+            </a:schemeClr>
+          </a:lnRef>
+          <a:fillRef idx="1">
+            <a:schemeClr val="accent1"/>
+          </a:fillRef>
+          <a:effectRef idx="0">
+            <a:schemeClr val="accent1"/>
+          </a:effectRef>
+          <a:fontRef idx="minor">
+            <a:schemeClr val="lt1"/>
+          </a:fontRef>
+        </p:style>
+        <p:txBody>
+          <a:bodyPr rtlCol="0" anchor="ctr"/>
+          <a:lstStyle/>
+          <a:p>
+            <a:pPr algn="ctr"/>
+            <a:endParaRPr lang="pt-BR"/>
+          </a:p>
+        </p:txBody>
+      </p:sp>
+      <p:sp>
+        <p:nvSpPr>
+          <p:cNvPr id="8" name="Rectangle 7">
+            <a:extLst>
+              <a:ext uri="{FF2B5EF4-FFF2-40B4-BE49-F238E27FC236}">
+                <a16:creationId xmlns:a16="http://schemas.microsoft.com/office/drawing/2014/main" id="{D93BAD24-E617-4D75-A2AD-01F5F7024BAB}"/>
+              </a:ext>
+            </a:extLst>
+          </p:cNvPr>
+          <p:cNvSpPr/>
+          <p:nvPr/>
+        </p:nvSpPr>
+        <p:spPr>
+          <a:xfrm>
+            <a:off x="5058562" y="1426128"/>
+            <a:ext cx="2030136" cy="1015068"/>
+          </a:xfrm>
+          <a:prstGeom prst="rect">
+            <a:avLst/>
+          </a:prstGeom>
+          <a:noFill/>
+          <a:ln w="28575">
+            <a:solidFill>
+              <a:schemeClr val="tx1"/>
+            </a:solidFill>
+          </a:ln>
+        </p:spPr>
+        <p:style>
+          <a:lnRef idx="2">
+            <a:schemeClr val="accent1">
+              <a:shade val="50000"/>
+            </a:schemeClr>
+          </a:lnRef>
+          <a:fillRef idx="1">
+            <a:schemeClr val="accent1"/>
+          </a:fillRef>
+          <a:effectRef idx="0">
+            <a:schemeClr val="accent1"/>
+          </a:effectRef>
+          <a:fontRef idx="minor">
+            <a:schemeClr val="lt1"/>
+          </a:fontRef>
+        </p:style>
+        <p:txBody>
+          <a:bodyPr rtlCol="0" anchor="ctr"/>
+          <a:lstStyle/>
+          <a:p>
+            <a:pPr algn="ctr"/>
+            <a:endParaRPr lang="pt-BR"/>
+          </a:p>
+        </p:txBody>
+      </p:sp>
       <p:cxnSp>
         <p:nvCxnSpPr>
-          <p:cNvPr id="7" name="Straight Arrow Connector 6">
-            <a:extLst>
-              <a:ext uri="{FF2B5EF4-FFF2-40B4-BE49-F238E27FC236}">
-                <a16:creationId xmlns:a16="http://schemas.microsoft.com/office/drawing/2014/main" id="{A6CEF85E-4E5E-4185-992F-8BF53AF90C4F}"/>
+          <p:cNvPr id="10" name="Straight Arrow Connector 9">
+            <a:extLst>
+              <a:ext uri="{FF2B5EF4-FFF2-40B4-BE49-F238E27FC236}">
+                <a16:creationId xmlns:a16="http://schemas.microsoft.com/office/drawing/2014/main" id="{C270121D-0A49-495E-899A-D534C8CFE102}"/>
               </a:ext>
             </a:extLst>
           </p:cNvPr>
@@ -8089,13 +8971,13 @@
         </p:nvCxnSpPr>
         <p:spPr>
           <a:xfrm>
-            <a:off x="3716323" y="1610686"/>
-            <a:ext cx="0" cy="343949"/>
+            <a:off x="5637402" y="4307747"/>
+            <a:ext cx="1753299" cy="0"/>
           </a:xfrm>
           <a:prstGeom prst="straightConnector1">
             <a:avLst/>
           </a:prstGeom>
-          <a:ln w="12700">
+          <a:ln w="19050">
             <a:solidFill>
               <a:schemeClr val="tx1"/>
             </a:solidFill>
@@ -8119,10 +9001,10 @@
       </p:cxnSp>
       <p:cxnSp>
         <p:nvCxnSpPr>
-          <p:cNvPr id="8" name="Straight Arrow Connector 7">
-            <a:extLst>
-              <a:ext uri="{FF2B5EF4-FFF2-40B4-BE49-F238E27FC236}">
-                <a16:creationId xmlns:a16="http://schemas.microsoft.com/office/drawing/2014/main" id="{63C2D873-C176-4384-A24A-E6CC36246B5F}"/>
+          <p:cNvPr id="11" name="Straight Arrow Connector 10">
+            <a:extLst>
+              <a:ext uri="{FF2B5EF4-FFF2-40B4-BE49-F238E27FC236}">
+                <a16:creationId xmlns:a16="http://schemas.microsoft.com/office/drawing/2014/main" id="{73C356B1-56B0-4939-AE47-3534D3235BD8}"/>
               </a:ext>
             </a:extLst>
           </p:cNvPr>
@@ -8133,13 +9015,13 @@
         </p:nvCxnSpPr>
         <p:spPr>
           <a:xfrm>
-            <a:off x="1746308" y="1610686"/>
-            <a:ext cx="0" cy="1711354"/>
+            <a:off x="7088698" y="1863754"/>
+            <a:ext cx="446016" cy="0"/>
           </a:xfrm>
           <a:prstGeom prst="straightConnector1">
             <a:avLst/>
           </a:prstGeom>
-          <a:ln w="12700">
+          <a:ln w="19050">
             <a:solidFill>
               <a:schemeClr val="tx1"/>
             </a:solidFill>
@@ -8163,10 +9045,148 @@
       </p:cxnSp>
       <p:sp>
         <p:nvSpPr>
-          <p:cNvPr id="11" name="TextBox 10">
-            <a:extLst>
-              <a:ext uri="{FF2B5EF4-FFF2-40B4-BE49-F238E27FC236}">
-                <a16:creationId xmlns:a16="http://schemas.microsoft.com/office/drawing/2014/main" id="{00FDCB97-05AE-4A9A-97D5-212AEABE91DB}"/>
+          <p:cNvPr id="13" name="Rectangle 12">
+            <a:extLst>
+              <a:ext uri="{FF2B5EF4-FFF2-40B4-BE49-F238E27FC236}">
+                <a16:creationId xmlns:a16="http://schemas.microsoft.com/office/drawing/2014/main" id="{9AAD12D9-A44F-4394-BED1-967227ECE111}"/>
+              </a:ext>
+            </a:extLst>
+          </p:cNvPr>
+          <p:cNvSpPr/>
+          <p:nvPr/>
+        </p:nvSpPr>
+        <p:spPr>
+          <a:xfrm>
+            <a:off x="2659310" y="1132514"/>
+            <a:ext cx="4051883" cy="226504"/>
+          </a:xfrm>
+          <a:prstGeom prst="rect">
+            <a:avLst/>
+          </a:prstGeom>
+          <a:noFill/>
+          <a:ln w="28575">
+            <a:solidFill>
+              <a:schemeClr val="tx1"/>
+            </a:solidFill>
+          </a:ln>
+        </p:spPr>
+        <p:style>
+          <a:lnRef idx="2">
+            <a:schemeClr val="accent1">
+              <a:shade val="50000"/>
+            </a:schemeClr>
+          </a:lnRef>
+          <a:fillRef idx="1">
+            <a:schemeClr val="accent1"/>
+          </a:fillRef>
+          <a:effectRef idx="0">
+            <a:schemeClr val="accent1"/>
+          </a:effectRef>
+          <a:fontRef idx="minor">
+            <a:schemeClr val="lt1"/>
+          </a:fontRef>
+        </p:style>
+        <p:txBody>
+          <a:bodyPr rtlCol="0" anchor="ctr"/>
+          <a:lstStyle/>
+          <a:p>
+            <a:pPr algn="ctr"/>
+            <a:endParaRPr lang="pt-BR"/>
+          </a:p>
+        </p:txBody>
+      </p:sp>
+      <p:cxnSp>
+        <p:nvCxnSpPr>
+          <p:cNvPr id="14" name="Straight Arrow Connector 13">
+            <a:extLst>
+              <a:ext uri="{FF2B5EF4-FFF2-40B4-BE49-F238E27FC236}">
+                <a16:creationId xmlns:a16="http://schemas.microsoft.com/office/drawing/2014/main" id="{450BCEB9-4DB8-4E99-A151-0B5FAB500D76}"/>
+              </a:ext>
+            </a:extLst>
+          </p:cNvPr>
+          <p:cNvCxnSpPr/>
+          <p:nvPr/>
+        </p:nvCxnSpPr>
+        <p:spPr>
+          <a:xfrm flipH="1">
+            <a:off x="2223083" y="1251358"/>
+            <a:ext cx="436227" cy="0"/>
+          </a:xfrm>
+          <a:prstGeom prst="straightConnector1">
+            <a:avLst/>
+          </a:prstGeom>
+          <a:ln w="19050">
+            <a:solidFill>
+              <a:schemeClr val="tx1"/>
+            </a:solidFill>
+            <a:tailEnd type="triangle"/>
+          </a:ln>
+        </p:spPr>
+        <p:style>
+          <a:lnRef idx="1">
+            <a:schemeClr val="accent1"/>
+          </a:lnRef>
+          <a:fillRef idx="0">
+            <a:schemeClr val="accent1"/>
+          </a:fillRef>
+          <a:effectRef idx="0">
+            <a:schemeClr val="accent1"/>
+          </a:effectRef>
+          <a:fontRef idx="minor">
+            <a:schemeClr val="tx1"/>
+          </a:fontRef>
+        </p:style>
+      </p:cxnSp>
+      <p:cxnSp>
+        <p:nvCxnSpPr>
+          <p:cNvPr id="15" name="Straight Arrow Connector 14">
+            <a:extLst>
+              <a:ext uri="{FF2B5EF4-FFF2-40B4-BE49-F238E27FC236}">
+                <a16:creationId xmlns:a16="http://schemas.microsoft.com/office/drawing/2014/main" id="{7EDCCE8D-A8FB-4A74-AD14-7A9C98028411}"/>
+              </a:ext>
+            </a:extLst>
+          </p:cNvPr>
+          <p:cNvCxnSpPr>
+            <a:cxnSpLocks/>
+          </p:cNvCxnSpPr>
+          <p:nvPr/>
+        </p:nvCxnSpPr>
+        <p:spPr>
+          <a:xfrm flipH="1">
+            <a:off x="2223083" y="3214381"/>
+            <a:ext cx="573028" cy="0"/>
+          </a:xfrm>
+          <a:prstGeom prst="straightConnector1">
+            <a:avLst/>
+          </a:prstGeom>
+          <a:ln w="19050">
+            <a:solidFill>
+              <a:schemeClr val="tx1"/>
+            </a:solidFill>
+            <a:tailEnd type="triangle"/>
+          </a:ln>
+        </p:spPr>
+        <p:style>
+          <a:lnRef idx="1">
+            <a:schemeClr val="accent1"/>
+          </a:lnRef>
+          <a:fillRef idx="0">
+            <a:schemeClr val="accent1"/>
+          </a:fillRef>
+          <a:effectRef idx="0">
+            <a:schemeClr val="accent1"/>
+          </a:effectRef>
+          <a:fontRef idx="minor">
+            <a:schemeClr val="tx1"/>
+          </a:fontRef>
+        </p:style>
+      </p:cxnSp>
+      <p:sp>
+        <p:nvSpPr>
+          <p:cNvPr id="17" name="TextBox 16">
+            <a:extLst>
+              <a:ext uri="{FF2B5EF4-FFF2-40B4-BE49-F238E27FC236}">
+                <a16:creationId xmlns:a16="http://schemas.microsoft.com/office/drawing/2014/main" id="{B608A3A5-3FA2-412A-8FE7-B63B196E6FF2}"/>
               </a:ext>
             </a:extLst>
           </p:cNvPr>
@@ -8175,43 +9195,8 @@
         </p:nvSpPr>
         <p:spPr>
           <a:xfrm>
-            <a:off x="1577131" y="3275111"/>
-            <a:ext cx="1632498" cy="307777"/>
-          </a:xfrm>
-          <a:prstGeom prst="rect">
-            <a:avLst/>
-          </a:prstGeom>
-          <a:noFill/>
-        </p:spPr>
-        <p:txBody>
-          <a:bodyPr wrap="none" rtlCol="0">
-            <a:spAutoFit/>
-          </a:bodyPr>
-          <a:lstStyle/>
-          <a:p>
-            <a:r>
-              <a:rPr lang="pt-BR" sz="1400" b="1" dirty="0"/>
-              <a:t>Mensagem enviada</a:t>
-            </a:r>
-          </a:p>
-        </p:txBody>
-      </p:sp>
-      <p:sp>
-        <p:nvSpPr>
-          <p:cNvPr id="12" name="TextBox 11">
-            <a:extLst>
-              <a:ext uri="{FF2B5EF4-FFF2-40B4-BE49-F238E27FC236}">
-                <a16:creationId xmlns:a16="http://schemas.microsoft.com/office/drawing/2014/main" id="{65C1401E-4134-407B-B609-EC611B0C381C}"/>
-              </a:ext>
-            </a:extLst>
-          </p:cNvPr>
-          <p:cNvSpPr txBox="1"/>
-          <p:nvPr/>
-        </p:nvSpPr>
-        <p:spPr>
-          <a:xfrm>
-            <a:off x="3003260" y="1915412"/>
-            <a:ext cx="1962965" cy="954107"/>
+            <a:off x="837012" y="1066630"/>
+            <a:ext cx="1672585" cy="584775"/>
           </a:xfrm>
           <a:prstGeom prst="rect">
             <a:avLst/>
@@ -8225,8 +9210,117 @@
           <a:lstStyle/>
           <a:p>
             <a:r>
-              <a:rPr lang="pt-BR" sz="1400" b="1" dirty="0"/>
-              <a:t>Resposta recebida indicando que a configuração foi feita corretamente</a:t>
+              <a:rPr lang="en-US" sz="1600" b="1" dirty="0"/>
+              <a:t>Op</a:t>
+            </a:r>
+            <a:r>
+              <a:rPr lang="pt-BR" sz="1600" b="1" dirty="0"/>
+              <a:t>ções de funcionalidade</a:t>
+            </a:r>
+          </a:p>
+        </p:txBody>
+      </p:sp>
+      <p:sp>
+        <p:nvSpPr>
+          <p:cNvPr id="18" name="TextBox 17">
+            <a:extLst>
+              <a:ext uri="{FF2B5EF4-FFF2-40B4-BE49-F238E27FC236}">
+                <a16:creationId xmlns:a16="http://schemas.microsoft.com/office/drawing/2014/main" id="{AD57D9F1-1757-406C-8C7E-4FE71C772B93}"/>
+              </a:ext>
+            </a:extLst>
+          </p:cNvPr>
+          <p:cNvSpPr txBox="1"/>
+          <p:nvPr/>
+        </p:nvSpPr>
+        <p:spPr>
+          <a:xfrm>
+            <a:off x="7534714" y="1571366"/>
+            <a:ext cx="2390849" cy="584775"/>
+          </a:xfrm>
+          <a:prstGeom prst="rect">
+            <a:avLst/>
+          </a:prstGeom>
+          <a:noFill/>
+        </p:spPr>
+        <p:txBody>
+          <a:bodyPr wrap="square" rtlCol="0">
+            <a:spAutoFit/>
+          </a:bodyPr>
+          <a:lstStyle/>
+          <a:p>
+            <a:r>
+              <a:rPr lang="pt-BR" sz="1600" b="1" dirty="0"/>
+              <a:t>Endereço IP e Porta do dispositivo remoto</a:t>
+            </a:r>
+          </a:p>
+        </p:txBody>
+      </p:sp>
+      <p:sp>
+        <p:nvSpPr>
+          <p:cNvPr id="21" name="TextBox 20">
+            <a:extLst>
+              <a:ext uri="{FF2B5EF4-FFF2-40B4-BE49-F238E27FC236}">
+                <a16:creationId xmlns:a16="http://schemas.microsoft.com/office/drawing/2014/main" id="{74D8F0E3-BDEE-4375-BA97-12A1CB6C4D83}"/>
+              </a:ext>
+            </a:extLst>
+          </p:cNvPr>
+          <p:cNvSpPr txBox="1"/>
+          <p:nvPr/>
+        </p:nvSpPr>
+        <p:spPr>
+          <a:xfrm>
+            <a:off x="7366744" y="3901339"/>
+            <a:ext cx="2726788" cy="830997"/>
+          </a:xfrm>
+          <a:prstGeom prst="rect">
+            <a:avLst/>
+          </a:prstGeom>
+          <a:noFill/>
+        </p:spPr>
+        <p:txBody>
+          <a:bodyPr wrap="square" rtlCol="0">
+            <a:spAutoFit/>
+          </a:bodyPr>
+          <a:lstStyle/>
+          <a:p>
+            <a:r>
+              <a:rPr lang="pt-BR" sz="1600" b="1" dirty="0"/>
+              <a:t>Mensagens de dado que podem ser enviadas ao dispositivo “Servidor”</a:t>
+            </a:r>
+          </a:p>
+        </p:txBody>
+      </p:sp>
+      <p:sp>
+        <p:nvSpPr>
+          <p:cNvPr id="23" name="TextBox 22">
+            <a:extLst>
+              <a:ext uri="{FF2B5EF4-FFF2-40B4-BE49-F238E27FC236}">
+                <a16:creationId xmlns:a16="http://schemas.microsoft.com/office/drawing/2014/main" id="{836E0C09-840B-4596-97FB-72B096D65AF4}"/>
+              </a:ext>
+            </a:extLst>
+          </p:cNvPr>
+          <p:cNvSpPr txBox="1"/>
+          <p:nvPr/>
+        </p:nvSpPr>
+        <p:spPr>
+          <a:xfrm>
+            <a:off x="688953" y="2824121"/>
+            <a:ext cx="1848388" cy="1077218"/>
+          </a:xfrm>
+          <a:prstGeom prst="rect">
+            <a:avLst/>
+          </a:prstGeom>
+          <a:noFill/>
+        </p:spPr>
+        <p:txBody>
+          <a:bodyPr wrap="square" rtlCol="0">
+            <a:spAutoFit/>
+          </a:bodyPr>
+          <a:lstStyle/>
+          <a:p>
+            <a:r>
+              <a:rPr lang="pt-BR" sz="1600" b="1" dirty="0"/>
+              <a:t>Dados enviados e recebidos na comunicação entre os dispositivos</a:t>
             </a:r>
           </a:p>
         </p:txBody>
@@ -8234,7 +9328,7 @@
     </p:spTree>
     <p:extLst>
       <p:ext uri="{BB962C8B-B14F-4D97-AF65-F5344CB8AC3E}">
-        <p14:creationId xmlns:p14="http://schemas.microsoft.com/office/powerpoint/2010/main" val="4098012339"/>
+        <p14:creationId xmlns:p14="http://schemas.microsoft.com/office/powerpoint/2010/main" val="1291845881"/>
       </p:ext>
     </p:extLst>
   </p:cSld>
@@ -8266,7 +9360,7 @@
           <p:cNvPr id="5" name="Content Placeholder 4">
             <a:extLst>
               <a:ext uri="{FF2B5EF4-FFF2-40B4-BE49-F238E27FC236}">
-                <a16:creationId xmlns:a16="http://schemas.microsoft.com/office/drawing/2014/main" id="{3F68249B-9CC8-4EB4-AD20-78DD502873B1}"/>
+                <a16:creationId xmlns:a16="http://schemas.microsoft.com/office/drawing/2014/main" id="{6E60684B-99B0-461D-B073-7A6CBA7514E1}"/>
               </a:ext>
             </a:extLst>
           </p:cNvPr>
@@ -8291,190 +9385,34 @@
         </p:blipFill>
         <p:spPr>
           <a:xfrm>
-            <a:off x="1335881" y="255957"/>
-            <a:ext cx="6343213" cy="5234260"/>
+            <a:off x="1462782" y="238178"/>
+            <a:ext cx="6011808" cy="4500333"/>
           </a:xfrm>
         </p:spPr>
       </p:pic>
-      <p:sp>
-        <p:nvSpPr>
-          <p:cNvPr id="6" name="Rectangle 5">
-            <a:extLst>
-              <a:ext uri="{FF2B5EF4-FFF2-40B4-BE49-F238E27FC236}">
-                <a16:creationId xmlns:a16="http://schemas.microsoft.com/office/drawing/2014/main" id="{38F59DB5-403D-488E-99B7-E10CA531EC83}"/>
-              </a:ext>
-            </a:extLst>
-          </p:cNvPr>
-          <p:cNvSpPr/>
-          <p:nvPr/>
-        </p:nvSpPr>
-        <p:spPr>
-          <a:xfrm>
-            <a:off x="1435100" y="2324100"/>
-            <a:ext cx="387350" cy="209550"/>
-          </a:xfrm>
-          <a:prstGeom prst="rect">
-            <a:avLst/>
-          </a:prstGeom>
-          <a:noFill/>
-          <a:ln>
-            <a:solidFill>
-              <a:schemeClr val="tx1"/>
-            </a:solidFill>
-          </a:ln>
-        </p:spPr>
-        <p:style>
-          <a:lnRef idx="2">
-            <a:schemeClr val="accent1">
-              <a:shade val="50000"/>
-            </a:schemeClr>
-          </a:lnRef>
-          <a:fillRef idx="1">
-            <a:schemeClr val="accent1"/>
-          </a:fillRef>
-          <a:effectRef idx="0">
-            <a:schemeClr val="accent1"/>
-          </a:effectRef>
-          <a:fontRef idx="minor">
-            <a:schemeClr val="lt1"/>
-          </a:fontRef>
-        </p:style>
-        <p:txBody>
-          <a:bodyPr rtlCol="0" anchor="ctr"/>
-          <a:lstStyle/>
-          <a:p>
-            <a:pPr algn="ctr"/>
-            <a:endParaRPr lang="pt-BR"/>
-          </a:p>
-        </p:txBody>
-      </p:sp>
-      <p:sp>
-        <p:nvSpPr>
-          <p:cNvPr id="7" name="Rectangle 6">
-            <a:extLst>
-              <a:ext uri="{FF2B5EF4-FFF2-40B4-BE49-F238E27FC236}">
-                <a16:creationId xmlns:a16="http://schemas.microsoft.com/office/drawing/2014/main" id="{C4FC6D11-3787-48B2-8D58-605D51E7C743}"/>
-              </a:ext>
-            </a:extLst>
-          </p:cNvPr>
-          <p:cNvSpPr/>
-          <p:nvPr/>
-        </p:nvSpPr>
-        <p:spPr>
-          <a:xfrm>
-            <a:off x="1870869" y="2324100"/>
-            <a:ext cx="2072481" cy="209550"/>
-          </a:xfrm>
-          <a:prstGeom prst="rect">
-            <a:avLst/>
-          </a:prstGeom>
-          <a:noFill/>
-          <a:ln>
-            <a:solidFill>
-              <a:schemeClr val="tx1"/>
-            </a:solidFill>
-          </a:ln>
-        </p:spPr>
-        <p:style>
-          <a:lnRef idx="2">
-            <a:schemeClr val="accent1">
-              <a:shade val="50000"/>
-            </a:schemeClr>
-          </a:lnRef>
-          <a:fillRef idx="1">
-            <a:schemeClr val="accent1"/>
-          </a:fillRef>
-          <a:effectRef idx="0">
-            <a:schemeClr val="accent1"/>
-          </a:effectRef>
-          <a:fontRef idx="minor">
-            <a:schemeClr val="lt1"/>
-          </a:fontRef>
-        </p:style>
-        <p:txBody>
-          <a:bodyPr rtlCol="0" anchor="ctr"/>
-          <a:lstStyle/>
-          <a:p>
-            <a:pPr algn="ctr"/>
-            <a:endParaRPr lang="pt-BR"/>
-          </a:p>
-        </p:txBody>
-      </p:sp>
-      <p:sp>
-        <p:nvSpPr>
-          <p:cNvPr id="8" name="Rectangle 7">
-            <a:extLst>
-              <a:ext uri="{FF2B5EF4-FFF2-40B4-BE49-F238E27FC236}">
-                <a16:creationId xmlns:a16="http://schemas.microsoft.com/office/drawing/2014/main" id="{2247C2D1-74E0-4608-8E07-93367D570F44}"/>
-              </a:ext>
-            </a:extLst>
-          </p:cNvPr>
-          <p:cNvSpPr/>
-          <p:nvPr/>
-        </p:nvSpPr>
-        <p:spPr>
-          <a:xfrm>
-            <a:off x="1435100" y="3683000"/>
-            <a:ext cx="95250" cy="266700"/>
-          </a:xfrm>
-          <a:prstGeom prst="rect">
-            <a:avLst/>
-          </a:prstGeom>
-          <a:solidFill>
-            <a:schemeClr val="bg1"/>
-          </a:solidFill>
-          <a:ln>
-            <a:solidFill>
-              <a:schemeClr val="bg1"/>
-            </a:solidFill>
-          </a:ln>
-        </p:spPr>
-        <p:style>
-          <a:lnRef idx="2">
-            <a:schemeClr val="accent1">
-              <a:shade val="50000"/>
-            </a:schemeClr>
-          </a:lnRef>
-          <a:fillRef idx="1">
-            <a:schemeClr val="accent1"/>
-          </a:fillRef>
-          <a:effectRef idx="0">
-            <a:schemeClr val="accent1"/>
-          </a:effectRef>
-          <a:fontRef idx="minor">
-            <a:schemeClr val="lt1"/>
-          </a:fontRef>
-        </p:style>
-        <p:txBody>
-          <a:bodyPr rtlCol="0" anchor="ctr"/>
-          <a:lstStyle/>
-          <a:p>
-            <a:pPr algn="ctr"/>
-            <a:endParaRPr lang="pt-BR"/>
-          </a:p>
-        </p:txBody>
-      </p:sp>
       <p:cxnSp>
         <p:nvCxnSpPr>
-          <p:cNvPr id="10" name="Straight Arrow Connector 9">
-            <a:extLst>
-              <a:ext uri="{FF2B5EF4-FFF2-40B4-BE49-F238E27FC236}">
-                <a16:creationId xmlns:a16="http://schemas.microsoft.com/office/drawing/2014/main" id="{BE518349-F551-4A92-B64B-A329C7CED815}"/>
-              </a:ext>
-            </a:extLst>
-          </p:cNvPr>
-          <p:cNvCxnSpPr/>
+          <p:cNvPr id="7" name="Straight Arrow Connector 6">
+            <a:extLst>
+              <a:ext uri="{FF2B5EF4-FFF2-40B4-BE49-F238E27FC236}">
+                <a16:creationId xmlns:a16="http://schemas.microsoft.com/office/drawing/2014/main" id="{A6CEF85E-4E5E-4185-992F-8BF53AF90C4F}"/>
+              </a:ext>
+            </a:extLst>
+          </p:cNvPr>
+          <p:cNvCxnSpPr>
+            <a:cxnSpLocks/>
+          </p:cNvCxnSpPr>
           <p:nvPr/>
         </p:nvCxnSpPr>
         <p:spPr>
           <a:xfrm>
-            <a:off x="2562225" y="2533650"/>
-            <a:ext cx="0" cy="304800"/>
+            <a:off x="3716323" y="1610686"/>
+            <a:ext cx="0" cy="343949"/>
           </a:xfrm>
           <a:prstGeom prst="straightConnector1">
             <a:avLst/>
           </a:prstGeom>
-          <a:ln>
+          <a:ln w="12700">
             <a:solidFill>
               <a:schemeClr val="tx1"/>
             </a:solidFill>
@@ -8496,82 +9434,12 @@
           </a:fontRef>
         </p:style>
       </p:cxnSp>
-      <p:sp>
-        <p:nvSpPr>
-          <p:cNvPr id="12" name="TextBox 11">
-            <a:extLst>
-              <a:ext uri="{FF2B5EF4-FFF2-40B4-BE49-F238E27FC236}">
-                <a16:creationId xmlns:a16="http://schemas.microsoft.com/office/drawing/2014/main" id="{7C6E3AB8-E3CB-4B5F-BDDF-2A3F6763CF09}"/>
-              </a:ext>
-            </a:extLst>
-          </p:cNvPr>
-          <p:cNvSpPr txBox="1"/>
-          <p:nvPr/>
-        </p:nvSpPr>
-        <p:spPr>
-          <a:xfrm>
-            <a:off x="2393660" y="2819400"/>
-            <a:ext cx="1962965" cy="738664"/>
-          </a:xfrm>
-          <a:prstGeom prst="rect">
-            <a:avLst/>
-          </a:prstGeom>
-          <a:noFill/>
-        </p:spPr>
-        <p:txBody>
-          <a:bodyPr wrap="square" rtlCol="0">
-            <a:spAutoFit/>
-          </a:bodyPr>
-          <a:lstStyle/>
-          <a:p>
-            <a:r>
-              <a:rPr lang="pt-BR" sz="1400" b="1" dirty="0"/>
-              <a:t>Resposta recebida mostrando data e hora atuais do sistema</a:t>
-            </a:r>
-          </a:p>
-        </p:txBody>
-      </p:sp>
-      <p:sp>
-        <p:nvSpPr>
-          <p:cNvPr id="13" name="TextBox 12">
-            <a:extLst>
-              <a:ext uri="{FF2B5EF4-FFF2-40B4-BE49-F238E27FC236}">
-                <a16:creationId xmlns:a16="http://schemas.microsoft.com/office/drawing/2014/main" id="{F7DEAB0B-9897-44BF-A9CE-F6BAD9C44366}"/>
-              </a:ext>
-            </a:extLst>
-          </p:cNvPr>
-          <p:cNvSpPr txBox="1"/>
-          <p:nvPr/>
-        </p:nvSpPr>
-        <p:spPr>
-          <a:xfrm>
-            <a:off x="1435100" y="3858045"/>
-            <a:ext cx="1632498" cy="307777"/>
-          </a:xfrm>
-          <a:prstGeom prst="rect">
-            <a:avLst/>
-          </a:prstGeom>
-          <a:noFill/>
-        </p:spPr>
-        <p:txBody>
-          <a:bodyPr wrap="none" rtlCol="0">
-            <a:spAutoFit/>
-          </a:bodyPr>
-          <a:lstStyle/>
-          <a:p>
-            <a:r>
-              <a:rPr lang="pt-BR" sz="1400" b="1" dirty="0"/>
-              <a:t>Mensagem enviada</a:t>
-            </a:r>
-          </a:p>
-        </p:txBody>
-      </p:sp>
       <p:cxnSp>
         <p:nvCxnSpPr>
-          <p:cNvPr id="14" name="Straight Arrow Connector 13">
-            <a:extLst>
-              <a:ext uri="{FF2B5EF4-FFF2-40B4-BE49-F238E27FC236}">
-                <a16:creationId xmlns:a16="http://schemas.microsoft.com/office/drawing/2014/main" id="{74DC0D2E-900D-48D7-BBE4-7AD01DCD3A71}"/>
+          <p:cNvPr id="8" name="Straight Arrow Connector 7">
+            <a:extLst>
+              <a:ext uri="{FF2B5EF4-FFF2-40B4-BE49-F238E27FC236}">
+                <a16:creationId xmlns:a16="http://schemas.microsoft.com/office/drawing/2014/main" id="{63C2D873-C176-4384-A24A-E6CC36246B5F}"/>
               </a:ext>
             </a:extLst>
           </p:cNvPr>
@@ -8582,13 +9450,13 @@
         </p:nvCxnSpPr>
         <p:spPr>
           <a:xfrm>
-            <a:off x="1628775" y="2533650"/>
-            <a:ext cx="0" cy="1324395"/>
+            <a:off x="1746308" y="1610686"/>
+            <a:ext cx="0" cy="1711354"/>
           </a:xfrm>
           <a:prstGeom prst="straightConnector1">
             <a:avLst/>
           </a:prstGeom>
-          <a:ln>
+          <a:ln w="12700">
             <a:solidFill>
               <a:schemeClr val="tx1"/>
             </a:solidFill>
@@ -8610,10 +9478,80 @@
           </a:fontRef>
         </p:style>
       </p:cxnSp>
+      <p:sp>
+        <p:nvSpPr>
+          <p:cNvPr id="11" name="TextBox 10">
+            <a:extLst>
+              <a:ext uri="{FF2B5EF4-FFF2-40B4-BE49-F238E27FC236}">
+                <a16:creationId xmlns:a16="http://schemas.microsoft.com/office/drawing/2014/main" id="{00FDCB97-05AE-4A9A-97D5-212AEABE91DB}"/>
+              </a:ext>
+            </a:extLst>
+          </p:cNvPr>
+          <p:cNvSpPr txBox="1"/>
+          <p:nvPr/>
+        </p:nvSpPr>
+        <p:spPr>
+          <a:xfrm>
+            <a:off x="1577131" y="3275111"/>
+            <a:ext cx="1632498" cy="307777"/>
+          </a:xfrm>
+          <a:prstGeom prst="rect">
+            <a:avLst/>
+          </a:prstGeom>
+          <a:noFill/>
+        </p:spPr>
+        <p:txBody>
+          <a:bodyPr wrap="none" rtlCol="0">
+            <a:spAutoFit/>
+          </a:bodyPr>
+          <a:lstStyle/>
+          <a:p>
+            <a:r>
+              <a:rPr lang="pt-BR" sz="1400" b="1" dirty="0"/>
+              <a:t>Mensagem enviada</a:t>
+            </a:r>
+          </a:p>
+        </p:txBody>
+      </p:sp>
+      <p:sp>
+        <p:nvSpPr>
+          <p:cNvPr id="12" name="TextBox 11">
+            <a:extLst>
+              <a:ext uri="{FF2B5EF4-FFF2-40B4-BE49-F238E27FC236}">
+                <a16:creationId xmlns:a16="http://schemas.microsoft.com/office/drawing/2014/main" id="{65C1401E-4134-407B-B609-EC611B0C381C}"/>
+              </a:ext>
+            </a:extLst>
+          </p:cNvPr>
+          <p:cNvSpPr txBox="1"/>
+          <p:nvPr/>
+        </p:nvSpPr>
+        <p:spPr>
+          <a:xfrm>
+            <a:off x="3003260" y="1915412"/>
+            <a:ext cx="1962965" cy="954107"/>
+          </a:xfrm>
+          <a:prstGeom prst="rect">
+            <a:avLst/>
+          </a:prstGeom>
+          <a:noFill/>
+        </p:spPr>
+        <p:txBody>
+          <a:bodyPr wrap="square" rtlCol="0">
+            <a:spAutoFit/>
+          </a:bodyPr>
+          <a:lstStyle/>
+          <a:p>
+            <a:r>
+              <a:rPr lang="pt-BR" sz="1400" b="1" dirty="0"/>
+              <a:t>Resposta recebida indicando que a configuração foi feita corretamente</a:t>
+            </a:r>
+          </a:p>
+        </p:txBody>
+      </p:sp>
     </p:spTree>
     <p:extLst>
       <p:ext uri="{BB962C8B-B14F-4D97-AF65-F5344CB8AC3E}">
-        <p14:creationId xmlns:p14="http://schemas.microsoft.com/office/powerpoint/2010/main" val="2028562603"/>
+        <p14:creationId xmlns:p14="http://schemas.microsoft.com/office/powerpoint/2010/main" val="4098012339"/>
       </p:ext>
     </p:extLst>
   </p:cSld>
@@ -8642,17 +9580,19 @@
       </p:grpSpPr>
       <p:pic>
         <p:nvPicPr>
-          <p:cNvPr id="10" name="Picture 9">
-            <a:extLst>
-              <a:ext uri="{FF2B5EF4-FFF2-40B4-BE49-F238E27FC236}">
-                <a16:creationId xmlns:a16="http://schemas.microsoft.com/office/drawing/2014/main" id="{1676D98F-BA3A-4E88-9522-43AE7F87E1EF}"/>
+          <p:cNvPr id="5" name="Content Placeholder 4">
+            <a:extLst>
+              <a:ext uri="{FF2B5EF4-FFF2-40B4-BE49-F238E27FC236}">
+                <a16:creationId xmlns:a16="http://schemas.microsoft.com/office/drawing/2014/main" id="{3F68249B-9CC8-4EB4-AD20-78DD502873B1}"/>
               </a:ext>
             </a:extLst>
           </p:cNvPr>
           <p:cNvPicPr>
-            <a:picLocks noChangeAspect="1"/>
+            <a:picLocks noGrp="1" noChangeAspect="1"/>
           </p:cNvPicPr>
-          <p:nvPr/>
+          <p:nvPr>
+            <p:ph idx="1"/>
+          </p:nvPr>
         </p:nvPicPr>
         <p:blipFill>
           <a:blip r:embed="rId2">
@@ -8668,20 +9608,17 @@
         </p:blipFill>
         <p:spPr>
           <a:xfrm>
-            <a:off x="3494087" y="274637"/>
-            <a:ext cx="5419725" cy="4810125"/>
-          </a:xfrm>
-          <a:prstGeom prst="rect">
-            <a:avLst/>
-          </a:prstGeom>
+            <a:off x="1335881" y="255957"/>
+            <a:ext cx="6343213" cy="5234260"/>
+          </a:xfrm>
         </p:spPr>
       </p:pic>
       <p:sp>
         <p:nvSpPr>
-          <p:cNvPr id="11" name="Rectangle 10">
-            <a:extLst>
-              <a:ext uri="{FF2B5EF4-FFF2-40B4-BE49-F238E27FC236}">
-                <a16:creationId xmlns:a16="http://schemas.microsoft.com/office/drawing/2014/main" id="{1B718B4A-46FF-4E7D-9B8C-73D64F810642}"/>
+          <p:cNvPr id="6" name="Rectangle 5">
+            <a:extLst>
+              <a:ext uri="{FF2B5EF4-FFF2-40B4-BE49-F238E27FC236}">
+                <a16:creationId xmlns:a16="http://schemas.microsoft.com/office/drawing/2014/main" id="{38F59DB5-403D-488E-99B7-E10CA531EC83}"/>
               </a:ext>
             </a:extLst>
           </p:cNvPr>
@@ -8690,8 +9627,8 @@
         </p:nvSpPr>
         <p:spPr>
           <a:xfrm>
-            <a:off x="3562350" y="1111250"/>
-            <a:ext cx="412750" cy="450850"/>
+            <a:off x="1435100" y="2324100"/>
+            <a:ext cx="387350" cy="209550"/>
           </a:xfrm>
           <a:prstGeom prst="rect">
             <a:avLst/>
@@ -8730,10 +9667,10 @@
       </p:sp>
       <p:sp>
         <p:nvSpPr>
-          <p:cNvPr id="12" name="Rectangle 11">
-            <a:extLst>
-              <a:ext uri="{FF2B5EF4-FFF2-40B4-BE49-F238E27FC236}">
-                <a16:creationId xmlns:a16="http://schemas.microsoft.com/office/drawing/2014/main" id="{4655E23D-3F68-448D-B0F3-09635C8AF536}"/>
+          <p:cNvPr id="7" name="Rectangle 6">
+            <a:extLst>
+              <a:ext uri="{FF2B5EF4-FFF2-40B4-BE49-F238E27FC236}">
+                <a16:creationId xmlns:a16="http://schemas.microsoft.com/office/drawing/2014/main" id="{C4FC6D11-3787-48B2-8D58-605D51E7C743}"/>
               </a:ext>
             </a:extLst>
           </p:cNvPr>
@@ -8742,8 +9679,8 @@
         </p:nvSpPr>
         <p:spPr>
           <a:xfrm>
-            <a:off x="3562350" y="1562100"/>
-            <a:ext cx="1454150" cy="476250"/>
+            <a:off x="1870869" y="2324100"/>
+            <a:ext cx="2072481" cy="209550"/>
           </a:xfrm>
           <a:prstGeom prst="rect">
             <a:avLst/>
@@ -8780,24 +9717,76 @@
           </a:p>
         </p:txBody>
       </p:sp>
+      <p:sp>
+        <p:nvSpPr>
+          <p:cNvPr id="8" name="Rectangle 7">
+            <a:extLst>
+              <a:ext uri="{FF2B5EF4-FFF2-40B4-BE49-F238E27FC236}">
+                <a16:creationId xmlns:a16="http://schemas.microsoft.com/office/drawing/2014/main" id="{2247C2D1-74E0-4608-8E07-93367D570F44}"/>
+              </a:ext>
+            </a:extLst>
+          </p:cNvPr>
+          <p:cNvSpPr/>
+          <p:nvPr/>
+        </p:nvSpPr>
+        <p:spPr>
+          <a:xfrm>
+            <a:off x="1435100" y="3683000"/>
+            <a:ext cx="95250" cy="266700"/>
+          </a:xfrm>
+          <a:prstGeom prst="rect">
+            <a:avLst/>
+          </a:prstGeom>
+          <a:solidFill>
+            <a:schemeClr val="bg1"/>
+          </a:solidFill>
+          <a:ln>
+            <a:solidFill>
+              <a:schemeClr val="bg1"/>
+            </a:solidFill>
+          </a:ln>
+        </p:spPr>
+        <p:style>
+          <a:lnRef idx="2">
+            <a:schemeClr val="accent1">
+              <a:shade val="50000"/>
+            </a:schemeClr>
+          </a:lnRef>
+          <a:fillRef idx="1">
+            <a:schemeClr val="accent1"/>
+          </a:fillRef>
+          <a:effectRef idx="0">
+            <a:schemeClr val="accent1"/>
+          </a:effectRef>
+          <a:fontRef idx="minor">
+            <a:schemeClr val="lt1"/>
+          </a:fontRef>
+        </p:style>
+        <p:txBody>
+          <a:bodyPr rtlCol="0" anchor="ctr"/>
+          <a:lstStyle/>
+          <a:p>
+            <a:pPr algn="ctr"/>
+            <a:endParaRPr lang="pt-BR"/>
+          </a:p>
+        </p:txBody>
+      </p:sp>
       <p:cxnSp>
         <p:nvCxnSpPr>
-          <p:cNvPr id="14" name="Straight Arrow Connector 13">
-            <a:extLst>
-              <a:ext uri="{FF2B5EF4-FFF2-40B4-BE49-F238E27FC236}">
-                <a16:creationId xmlns:a16="http://schemas.microsoft.com/office/drawing/2014/main" id="{1E6DD13F-3BC6-45F4-9612-FCD35719926B}"/>
-              </a:ext>
-            </a:extLst>
-          </p:cNvPr>
-          <p:cNvCxnSpPr>
-            <a:cxnSpLocks/>
-          </p:cNvCxnSpPr>
+          <p:cNvPr id="10" name="Straight Arrow Connector 9">
+            <a:extLst>
+              <a:ext uri="{FF2B5EF4-FFF2-40B4-BE49-F238E27FC236}">
+                <a16:creationId xmlns:a16="http://schemas.microsoft.com/office/drawing/2014/main" id="{BE518349-F551-4A92-B64B-A329C7CED815}"/>
+              </a:ext>
+            </a:extLst>
+          </p:cNvPr>
+          <p:cNvCxnSpPr/>
           <p:nvPr/>
         </p:nvCxnSpPr>
         <p:spPr>
-          <a:xfrm flipH="1">
-            <a:off x="3238500" y="1336675"/>
-            <a:ext cx="323850" cy="0"/>
+          <a:xfrm>
+            <a:off x="2562225" y="2533650"/>
+            <a:ext cx="0" cy="304800"/>
           </a:xfrm>
           <a:prstGeom prst="straightConnector1">
             <a:avLst/>
@@ -8826,10 +9815,10 @@
       </p:cxnSp>
       <p:sp>
         <p:nvSpPr>
-          <p:cNvPr id="15" name="TextBox 14">
-            <a:extLst>
-              <a:ext uri="{FF2B5EF4-FFF2-40B4-BE49-F238E27FC236}">
-                <a16:creationId xmlns:a16="http://schemas.microsoft.com/office/drawing/2014/main" id="{1105A116-C056-4705-9604-2929B86C370B}"/>
+          <p:cNvPr id="12" name="TextBox 11">
+            <a:extLst>
+              <a:ext uri="{FF2B5EF4-FFF2-40B4-BE49-F238E27FC236}">
+                <a16:creationId xmlns:a16="http://schemas.microsoft.com/office/drawing/2014/main" id="{7C6E3AB8-E3CB-4B5F-BDDF-2A3F6763CF09}"/>
               </a:ext>
             </a:extLst>
           </p:cNvPr>
@@ -8838,8 +9827,8 @@
         </p:nvSpPr>
         <p:spPr>
           <a:xfrm>
-            <a:off x="1386894" y="1048134"/>
-            <a:ext cx="2013531" cy="577081"/>
+            <a:off x="2393660" y="2819400"/>
+            <a:ext cx="1962965" cy="738664"/>
           </a:xfrm>
           <a:prstGeom prst="rect">
             <a:avLst/>
@@ -8853,29 +9842,65 @@
           <a:lstStyle/>
           <a:p>
             <a:r>
-              <a:rPr lang="en-US" sz="1050" b="1" dirty="0"/>
-              <a:t>Resposta “NO” enviada pelo dispositivo, indicando que não ocorreram eventos de VTCD</a:t>
-            </a:r>
-            <a:endParaRPr lang="pt-BR" sz="1050" b="1" dirty="0"/>
+              <a:rPr lang="pt-BR" sz="1400" b="1" dirty="0"/>
+              <a:t>Resposta recebida mostrando data e hora atuais do sistema</a:t>
+            </a:r>
+          </a:p>
+        </p:txBody>
+      </p:sp>
+      <p:sp>
+        <p:nvSpPr>
+          <p:cNvPr id="13" name="TextBox 12">
+            <a:extLst>
+              <a:ext uri="{FF2B5EF4-FFF2-40B4-BE49-F238E27FC236}">
+                <a16:creationId xmlns:a16="http://schemas.microsoft.com/office/drawing/2014/main" id="{F7DEAB0B-9897-44BF-A9CE-F6BAD9C44366}"/>
+              </a:ext>
+            </a:extLst>
+          </p:cNvPr>
+          <p:cNvSpPr txBox="1"/>
+          <p:nvPr/>
+        </p:nvSpPr>
+        <p:spPr>
+          <a:xfrm>
+            <a:off x="1435100" y="3858045"/>
+            <a:ext cx="1632498" cy="307777"/>
+          </a:xfrm>
+          <a:prstGeom prst="rect">
+            <a:avLst/>
+          </a:prstGeom>
+          <a:noFill/>
+        </p:spPr>
+        <p:txBody>
+          <a:bodyPr wrap="none" rtlCol="0">
+            <a:spAutoFit/>
+          </a:bodyPr>
+          <a:lstStyle/>
+          <a:p>
+            <a:r>
+              <a:rPr lang="pt-BR" sz="1400" b="1" dirty="0"/>
+              <a:t>Mensagem enviada</a:t>
+            </a:r>
           </a:p>
         </p:txBody>
       </p:sp>
       <p:cxnSp>
         <p:nvCxnSpPr>
-          <p:cNvPr id="18" name="Straight Arrow Connector 17">
-            <a:extLst>
-              <a:ext uri="{FF2B5EF4-FFF2-40B4-BE49-F238E27FC236}">
-                <a16:creationId xmlns:a16="http://schemas.microsoft.com/office/drawing/2014/main" id="{C22707F0-FBCD-4C64-924C-BF35D389F499}"/>
-              </a:ext>
-            </a:extLst>
-          </p:cNvPr>
-          <p:cNvCxnSpPr/>
+          <p:cNvPr id="14" name="Straight Arrow Connector 13">
+            <a:extLst>
+              <a:ext uri="{FF2B5EF4-FFF2-40B4-BE49-F238E27FC236}">
+                <a16:creationId xmlns:a16="http://schemas.microsoft.com/office/drawing/2014/main" id="{74DC0D2E-900D-48D7-BBE4-7AD01DCD3A71}"/>
+              </a:ext>
+            </a:extLst>
+          </p:cNvPr>
+          <p:cNvCxnSpPr>
+            <a:cxnSpLocks/>
+          </p:cNvCxnSpPr>
           <p:nvPr/>
         </p:nvCxnSpPr>
         <p:spPr>
           <a:xfrm>
-            <a:off x="4432300" y="2038350"/>
-            <a:ext cx="0" cy="292100"/>
+            <a:off x="1628775" y="2533650"/>
+            <a:ext cx="0" cy="1324395"/>
           </a:xfrm>
           <a:prstGeom prst="straightConnector1">
             <a:avLst/>
@@ -8902,46 +9927,10 @@
           </a:fontRef>
         </p:style>
       </p:cxnSp>
-      <p:sp>
-        <p:nvSpPr>
-          <p:cNvPr id="19" name="TextBox 18">
-            <a:extLst>
-              <a:ext uri="{FF2B5EF4-FFF2-40B4-BE49-F238E27FC236}">
-                <a16:creationId xmlns:a16="http://schemas.microsoft.com/office/drawing/2014/main" id="{40B6560D-89DE-49FE-9BB1-1017ED39C4B8}"/>
-              </a:ext>
-            </a:extLst>
-          </p:cNvPr>
-          <p:cNvSpPr txBox="1"/>
-          <p:nvPr/>
-        </p:nvSpPr>
-        <p:spPr>
-          <a:xfrm>
-            <a:off x="3676650" y="2292925"/>
-            <a:ext cx="2330446" cy="646331"/>
-          </a:xfrm>
-          <a:prstGeom prst="rect">
-            <a:avLst/>
-          </a:prstGeom>
-          <a:noFill/>
-        </p:spPr>
-        <p:txBody>
-          <a:bodyPr wrap="square" rtlCol="0">
-            <a:spAutoFit/>
-          </a:bodyPr>
-          <a:lstStyle/>
-          <a:p>
-            <a:r>
-              <a:rPr lang="en-US" sz="1200" b="1" dirty="0"/>
-              <a:t>Após a ocorrência, o Sistema retorna data, hora e tipo do ultimo evento</a:t>
-            </a:r>
-            <a:endParaRPr lang="pt-BR" sz="1200" b="1" dirty="0"/>
-          </a:p>
-        </p:txBody>
-      </p:sp>
     </p:spTree>
     <p:extLst>
       <p:ext uri="{BB962C8B-B14F-4D97-AF65-F5344CB8AC3E}">
-        <p14:creationId xmlns:p14="http://schemas.microsoft.com/office/powerpoint/2010/main" val="1348513737"/>
+        <p14:creationId xmlns:p14="http://schemas.microsoft.com/office/powerpoint/2010/main" val="2028562603"/>
       </p:ext>
     </p:extLst>
   </p:cSld>

</xml_diff>

<commit_message>
Mudanças no Cap. 2
</commit_message>
<xml_diff>
--- a/Figuras/Presentation1.pptx
+++ b/Figuras/Presentation1.pptx
@@ -15,6 +15,7 @@
     <p:sldId id="262" r:id="rId9"/>
     <p:sldId id="263" r:id="rId10"/>
     <p:sldId id="264" r:id="rId11"/>
+    <p:sldId id="266" r:id="rId12"/>
   </p:sldIdLst>
   <p:sldSz cx="12192000" cy="6858000"/>
   <p:notesSz cx="6858000" cy="9144000"/>
@@ -270,7 +271,7 @@
           <a:p>
             <a:fld id="{5135F40E-8B21-4562-A227-5932CD61C66C}" type="datetimeFigureOut">
               <a:rPr lang="pt-BR" smtClean="0"/>
-              <a:t>16/09/2018</a:t>
+              <a:t>27/09/2018</a:t>
             </a:fld>
             <a:endParaRPr lang="pt-BR"/>
           </a:p>
@@ -470,7 +471,7 @@
           <a:p>
             <a:fld id="{5135F40E-8B21-4562-A227-5932CD61C66C}" type="datetimeFigureOut">
               <a:rPr lang="pt-BR" smtClean="0"/>
-              <a:t>16/09/2018</a:t>
+              <a:t>27/09/2018</a:t>
             </a:fld>
             <a:endParaRPr lang="pt-BR"/>
           </a:p>
@@ -680,7 +681,7 @@
           <a:p>
             <a:fld id="{5135F40E-8B21-4562-A227-5932CD61C66C}" type="datetimeFigureOut">
               <a:rPr lang="pt-BR" smtClean="0"/>
-              <a:t>16/09/2018</a:t>
+              <a:t>27/09/2018</a:t>
             </a:fld>
             <a:endParaRPr lang="pt-BR"/>
           </a:p>
@@ -880,7 +881,7 @@
           <a:p>
             <a:fld id="{5135F40E-8B21-4562-A227-5932CD61C66C}" type="datetimeFigureOut">
               <a:rPr lang="pt-BR" smtClean="0"/>
-              <a:t>16/09/2018</a:t>
+              <a:t>27/09/2018</a:t>
             </a:fld>
             <a:endParaRPr lang="pt-BR"/>
           </a:p>
@@ -1156,7 +1157,7 @@
           <a:p>
             <a:fld id="{5135F40E-8B21-4562-A227-5932CD61C66C}" type="datetimeFigureOut">
               <a:rPr lang="pt-BR" smtClean="0"/>
-              <a:t>16/09/2018</a:t>
+              <a:t>27/09/2018</a:t>
             </a:fld>
             <a:endParaRPr lang="pt-BR"/>
           </a:p>
@@ -1424,7 +1425,7 @@
           <a:p>
             <a:fld id="{5135F40E-8B21-4562-A227-5932CD61C66C}" type="datetimeFigureOut">
               <a:rPr lang="pt-BR" smtClean="0"/>
-              <a:t>16/09/2018</a:t>
+              <a:t>27/09/2018</a:t>
             </a:fld>
             <a:endParaRPr lang="pt-BR"/>
           </a:p>
@@ -1839,7 +1840,7 @@
           <a:p>
             <a:fld id="{5135F40E-8B21-4562-A227-5932CD61C66C}" type="datetimeFigureOut">
               <a:rPr lang="pt-BR" smtClean="0"/>
-              <a:t>16/09/2018</a:t>
+              <a:t>27/09/2018</a:t>
             </a:fld>
             <a:endParaRPr lang="pt-BR"/>
           </a:p>
@@ -1981,7 +1982,7 @@
           <a:p>
             <a:fld id="{5135F40E-8B21-4562-A227-5932CD61C66C}" type="datetimeFigureOut">
               <a:rPr lang="pt-BR" smtClean="0"/>
-              <a:t>16/09/2018</a:t>
+              <a:t>27/09/2018</a:t>
             </a:fld>
             <a:endParaRPr lang="pt-BR"/>
           </a:p>
@@ -2094,7 +2095,7 @@
           <a:p>
             <a:fld id="{5135F40E-8B21-4562-A227-5932CD61C66C}" type="datetimeFigureOut">
               <a:rPr lang="pt-BR" smtClean="0"/>
-              <a:t>16/09/2018</a:t>
+              <a:t>27/09/2018</a:t>
             </a:fld>
             <a:endParaRPr lang="pt-BR"/>
           </a:p>
@@ -2407,7 +2408,7 @@
           <a:p>
             <a:fld id="{5135F40E-8B21-4562-A227-5932CD61C66C}" type="datetimeFigureOut">
               <a:rPr lang="pt-BR" smtClean="0"/>
-              <a:t>16/09/2018</a:t>
+              <a:t>27/09/2018</a:t>
             </a:fld>
             <a:endParaRPr lang="pt-BR"/>
           </a:p>
@@ -2696,7 +2697,7 @@
           <a:p>
             <a:fld id="{5135F40E-8B21-4562-A227-5932CD61C66C}" type="datetimeFigureOut">
               <a:rPr lang="pt-BR" smtClean="0"/>
-              <a:t>16/09/2018</a:t>
+              <a:t>27/09/2018</a:t>
             </a:fld>
             <a:endParaRPr lang="pt-BR"/>
           </a:p>
@@ -2939,7 +2940,7 @@
           <a:p>
             <a:fld id="{5135F40E-8B21-4562-A227-5932CD61C66C}" type="datetimeFigureOut">
               <a:rPr lang="pt-BR" smtClean="0"/>
-              <a:t>16/09/2018</a:t>
+              <a:t>27/09/2018</a:t>
             </a:fld>
             <a:endParaRPr lang="pt-BR"/>
           </a:p>
@@ -4196,6 +4197,560 @@
 </p:sld>
 </file>
 
+<file path=ppt/slides/slide11.xml><?xml version="1.0" encoding="utf-8"?>
+<p:sld xmlns:a="http://schemas.openxmlformats.org/drawingml/2006/main" xmlns:r="http://schemas.openxmlformats.org/officeDocument/2006/relationships" xmlns:p="http://schemas.openxmlformats.org/presentationml/2006/main">
+  <p:cSld>
+    <p:spTree>
+      <p:nvGrpSpPr>
+        <p:cNvPr id="1" name=""/>
+        <p:cNvGrpSpPr/>
+        <p:nvPr/>
+      </p:nvGrpSpPr>
+      <p:grpSpPr>
+        <a:xfrm>
+          <a:off x="0" y="0"/>
+          <a:ext cx="0" cy="0"/>
+          <a:chOff x="0" y="0"/>
+          <a:chExt cx="0" cy="0"/>
+        </a:xfrm>
+      </p:grpSpPr>
+      <p:pic>
+        <p:nvPicPr>
+          <p:cNvPr id="5" name="Content Placeholder 4">
+            <a:extLst>
+              <a:ext uri="{FF2B5EF4-FFF2-40B4-BE49-F238E27FC236}">
+                <a16:creationId xmlns:a16="http://schemas.microsoft.com/office/drawing/2014/main" id="{967315D5-976D-444B-9839-3CE032E49D04}"/>
+              </a:ext>
+            </a:extLst>
+          </p:cNvPr>
+          <p:cNvPicPr>
+            <a:picLocks noGrp="1" noChangeAspect="1"/>
+          </p:cNvPicPr>
+          <p:nvPr>
+            <p:ph idx="1"/>
+          </p:nvPr>
+        </p:nvPicPr>
+        <p:blipFill>
+          <a:blip r:embed="rId2">
+            <a:extLst>
+              <a:ext uri="{28A0092B-C50C-407E-A947-70E740481C1C}">
+                <a14:useLocalDpi xmlns:a14="http://schemas.microsoft.com/office/drawing/2010/main" val="0"/>
+              </a:ext>
+            </a:extLst>
+          </a:blip>
+          <a:stretch>
+            <a:fillRect/>
+          </a:stretch>
+        </p:blipFill>
+        <p:spPr>
+          <a:xfrm>
+            <a:off x="5592584" y="178646"/>
+            <a:ext cx="4824442" cy="5375566"/>
+          </a:xfrm>
+        </p:spPr>
+      </p:pic>
+      <p:sp>
+        <p:nvSpPr>
+          <p:cNvPr id="6" name="Right Brace 5">
+            <a:extLst>
+              <a:ext uri="{FF2B5EF4-FFF2-40B4-BE49-F238E27FC236}">
+                <a16:creationId xmlns:a16="http://schemas.microsoft.com/office/drawing/2014/main" id="{786FFC89-6B02-40F4-87D3-C5374B4BE7E6}"/>
+              </a:ext>
+            </a:extLst>
+          </p:cNvPr>
+          <p:cNvSpPr/>
+          <p:nvPr/>
+        </p:nvSpPr>
+        <p:spPr>
+          <a:xfrm rot="10800000">
+            <a:off x="5384959" y="1688284"/>
+            <a:ext cx="318781" cy="2019650"/>
+          </a:xfrm>
+          <a:prstGeom prst="rightBrace">
+            <a:avLst/>
+          </a:prstGeom>
+          <a:ln w="28575">
+            <a:solidFill>
+              <a:schemeClr val="accent6">
+                <a:lumMod val="75000"/>
+              </a:schemeClr>
+            </a:solidFill>
+          </a:ln>
+        </p:spPr>
+        <p:style>
+          <a:lnRef idx="1">
+            <a:schemeClr val="accent1"/>
+          </a:lnRef>
+          <a:fillRef idx="0">
+            <a:schemeClr val="accent1"/>
+          </a:fillRef>
+          <a:effectRef idx="0">
+            <a:schemeClr val="accent1"/>
+          </a:effectRef>
+          <a:fontRef idx="minor">
+            <a:schemeClr val="tx1"/>
+          </a:fontRef>
+        </p:style>
+        <p:txBody>
+          <a:bodyPr rtlCol="0" anchor="ctr"/>
+          <a:lstStyle/>
+          <a:p>
+            <a:pPr algn="ctr"/>
+            <a:endParaRPr lang="pt-BR" dirty="0"/>
+          </a:p>
+        </p:txBody>
+      </p:sp>
+      <p:sp>
+        <p:nvSpPr>
+          <p:cNvPr id="7" name="Right Brace 6">
+            <a:extLst>
+              <a:ext uri="{FF2B5EF4-FFF2-40B4-BE49-F238E27FC236}">
+                <a16:creationId xmlns:a16="http://schemas.microsoft.com/office/drawing/2014/main" id="{EC7B4471-EF94-4A83-AB2E-722CA60F01EE}"/>
+              </a:ext>
+            </a:extLst>
+          </p:cNvPr>
+          <p:cNvSpPr/>
+          <p:nvPr/>
+        </p:nvSpPr>
+        <p:spPr>
+          <a:xfrm rot="10800000">
+            <a:off x="5465427" y="1117657"/>
+            <a:ext cx="238313" cy="513825"/>
+          </a:xfrm>
+          <a:prstGeom prst="rightBrace">
+            <a:avLst/>
+          </a:prstGeom>
+          <a:ln w="28575">
+            <a:solidFill>
+              <a:schemeClr val="accent4">
+                <a:lumMod val="60000"/>
+                <a:lumOff val="40000"/>
+              </a:schemeClr>
+            </a:solidFill>
+          </a:ln>
+        </p:spPr>
+        <p:style>
+          <a:lnRef idx="1">
+            <a:schemeClr val="accent1"/>
+          </a:lnRef>
+          <a:fillRef idx="0">
+            <a:schemeClr val="accent1"/>
+          </a:fillRef>
+          <a:effectRef idx="0">
+            <a:schemeClr val="accent1"/>
+          </a:effectRef>
+          <a:fontRef idx="minor">
+            <a:schemeClr val="tx1"/>
+          </a:fontRef>
+        </p:style>
+        <p:txBody>
+          <a:bodyPr rtlCol="0" anchor="ctr"/>
+          <a:lstStyle/>
+          <a:p>
+            <a:pPr algn="ctr"/>
+            <a:endParaRPr lang="pt-BR"/>
+          </a:p>
+        </p:txBody>
+      </p:sp>
+      <p:sp>
+        <p:nvSpPr>
+          <p:cNvPr id="8" name="Right Brace 7">
+            <a:extLst>
+              <a:ext uri="{FF2B5EF4-FFF2-40B4-BE49-F238E27FC236}">
+                <a16:creationId xmlns:a16="http://schemas.microsoft.com/office/drawing/2014/main" id="{4E5EA143-5B79-4557-9083-B3E4F86089B1}"/>
+              </a:ext>
+            </a:extLst>
+          </p:cNvPr>
+          <p:cNvSpPr/>
+          <p:nvPr/>
+        </p:nvSpPr>
+        <p:spPr>
+          <a:xfrm rot="10800000">
+            <a:off x="5445311" y="3764737"/>
+            <a:ext cx="258429" cy="813730"/>
+          </a:xfrm>
+          <a:prstGeom prst="rightBrace">
+            <a:avLst/>
+          </a:prstGeom>
+          <a:ln w="28575">
+            <a:solidFill>
+              <a:schemeClr val="accent4">
+                <a:lumMod val="60000"/>
+                <a:lumOff val="40000"/>
+              </a:schemeClr>
+            </a:solidFill>
+          </a:ln>
+        </p:spPr>
+        <p:style>
+          <a:lnRef idx="1">
+            <a:schemeClr val="accent1"/>
+          </a:lnRef>
+          <a:fillRef idx="0">
+            <a:schemeClr val="accent1"/>
+          </a:fillRef>
+          <a:effectRef idx="0">
+            <a:schemeClr val="accent1"/>
+          </a:effectRef>
+          <a:fontRef idx="minor">
+            <a:schemeClr val="tx1"/>
+          </a:fontRef>
+        </p:style>
+        <p:txBody>
+          <a:bodyPr rtlCol="0" anchor="ctr"/>
+          <a:lstStyle/>
+          <a:p>
+            <a:pPr algn="ctr"/>
+            <a:endParaRPr lang="pt-BR"/>
+          </a:p>
+        </p:txBody>
+      </p:sp>
+      <p:sp>
+        <p:nvSpPr>
+          <p:cNvPr id="9" name="Right Brace 8">
+            <a:extLst>
+              <a:ext uri="{FF2B5EF4-FFF2-40B4-BE49-F238E27FC236}">
+                <a16:creationId xmlns:a16="http://schemas.microsoft.com/office/drawing/2014/main" id="{D1CA7C3D-409E-44A2-B725-005F4B427A68}"/>
+              </a:ext>
+            </a:extLst>
+          </p:cNvPr>
+          <p:cNvSpPr/>
+          <p:nvPr/>
+        </p:nvSpPr>
+        <p:spPr>
+          <a:xfrm rot="10800000">
+            <a:off x="5481430" y="343948"/>
+            <a:ext cx="222309" cy="716905"/>
+          </a:xfrm>
+          <a:prstGeom prst="rightBrace">
+            <a:avLst/>
+          </a:prstGeom>
+          <a:ln w="28575">
+            <a:solidFill>
+              <a:srgbClr val="FF0000"/>
+            </a:solidFill>
+          </a:ln>
+        </p:spPr>
+        <p:style>
+          <a:lnRef idx="1">
+            <a:schemeClr val="accent1"/>
+          </a:lnRef>
+          <a:fillRef idx="0">
+            <a:schemeClr val="accent1"/>
+          </a:fillRef>
+          <a:effectRef idx="0">
+            <a:schemeClr val="accent1"/>
+          </a:effectRef>
+          <a:fontRef idx="minor">
+            <a:schemeClr val="tx1"/>
+          </a:fontRef>
+        </p:style>
+        <p:txBody>
+          <a:bodyPr rtlCol="0" anchor="ctr"/>
+          <a:lstStyle/>
+          <a:p>
+            <a:pPr algn="ctr"/>
+            <a:endParaRPr lang="pt-BR"/>
+          </a:p>
+        </p:txBody>
+      </p:sp>
+      <p:sp>
+        <p:nvSpPr>
+          <p:cNvPr id="10" name="Right Brace 9">
+            <a:extLst>
+              <a:ext uri="{FF2B5EF4-FFF2-40B4-BE49-F238E27FC236}">
+                <a16:creationId xmlns:a16="http://schemas.microsoft.com/office/drawing/2014/main" id="{364CB501-4408-4133-962E-4954626E79E7}"/>
+              </a:ext>
+            </a:extLst>
+          </p:cNvPr>
+          <p:cNvSpPr/>
+          <p:nvPr/>
+        </p:nvSpPr>
+        <p:spPr>
+          <a:xfrm rot="10800000">
+            <a:off x="5465426" y="4635269"/>
+            <a:ext cx="222309" cy="813730"/>
+          </a:xfrm>
+          <a:prstGeom prst="rightBrace">
+            <a:avLst/>
+          </a:prstGeom>
+          <a:ln w="28575">
+            <a:solidFill>
+              <a:srgbClr val="FF0000"/>
+            </a:solidFill>
+          </a:ln>
+        </p:spPr>
+        <p:style>
+          <a:lnRef idx="1">
+            <a:schemeClr val="accent1"/>
+          </a:lnRef>
+          <a:fillRef idx="0">
+            <a:schemeClr val="accent1"/>
+          </a:fillRef>
+          <a:effectRef idx="0">
+            <a:schemeClr val="accent1"/>
+          </a:effectRef>
+          <a:fontRef idx="minor">
+            <a:schemeClr val="tx1"/>
+          </a:fontRef>
+        </p:style>
+        <p:txBody>
+          <a:bodyPr rtlCol="0" anchor="ctr"/>
+          <a:lstStyle/>
+          <a:p>
+            <a:pPr algn="ctr"/>
+            <a:endParaRPr lang="pt-BR"/>
+          </a:p>
+        </p:txBody>
+      </p:sp>
+      <p:sp>
+        <p:nvSpPr>
+          <p:cNvPr id="11" name="TextBox 10">
+            <a:extLst>
+              <a:ext uri="{FF2B5EF4-FFF2-40B4-BE49-F238E27FC236}">
+                <a16:creationId xmlns:a16="http://schemas.microsoft.com/office/drawing/2014/main" id="{18ABEF1E-DF2A-4F78-B66F-16280B1C930F}"/>
+              </a:ext>
+            </a:extLst>
+          </p:cNvPr>
+          <p:cNvSpPr txBox="1"/>
+          <p:nvPr/>
+        </p:nvSpPr>
+        <p:spPr>
+          <a:xfrm>
+            <a:off x="6996418" y="2328777"/>
+            <a:ext cx="2292487" cy="369332"/>
+          </a:xfrm>
+          <a:prstGeom prst="rect">
+            <a:avLst/>
+          </a:prstGeom>
+          <a:noFill/>
+        </p:spPr>
+        <p:txBody>
+          <a:bodyPr wrap="none" rtlCol="0">
+            <a:spAutoFit/>
+          </a:bodyPr>
+          <a:lstStyle/>
+          <a:p>
+            <a:r>
+              <a:rPr lang="pt-BR" dirty="0"/>
+              <a:t>- Tensão de Referência</a:t>
+            </a:r>
+          </a:p>
+        </p:txBody>
+      </p:sp>
+      <p:sp>
+        <p:nvSpPr>
+          <p:cNvPr id="12" name="TextBox 11">
+            <a:extLst>
+              <a:ext uri="{FF2B5EF4-FFF2-40B4-BE49-F238E27FC236}">
+                <a16:creationId xmlns:a16="http://schemas.microsoft.com/office/drawing/2014/main" id="{C763CD5B-F2C3-459B-9995-873B7BD51263}"/>
+              </a:ext>
+            </a:extLst>
+          </p:cNvPr>
+          <p:cNvSpPr txBox="1"/>
+          <p:nvPr/>
+        </p:nvSpPr>
+        <p:spPr>
+          <a:xfrm>
+            <a:off x="2666345" y="2497097"/>
+            <a:ext cx="2663037" cy="369332"/>
+          </a:xfrm>
+          <a:prstGeom prst="rect">
+            <a:avLst/>
+          </a:prstGeom>
+          <a:noFill/>
+        </p:spPr>
+        <p:txBody>
+          <a:bodyPr wrap="none" rtlCol="0">
+            <a:spAutoFit/>
+          </a:bodyPr>
+          <a:lstStyle/>
+          <a:p>
+            <a:r>
+              <a:rPr lang="pt-BR" dirty="0">
+                <a:solidFill>
+                  <a:schemeClr val="accent6">
+                    <a:lumMod val="50000"/>
+                  </a:schemeClr>
+                </a:solidFill>
+              </a:rPr>
+              <a:t>Faixa adequada de tensão</a:t>
+            </a:r>
+          </a:p>
+        </p:txBody>
+      </p:sp>
+      <p:sp>
+        <p:nvSpPr>
+          <p:cNvPr id="13" name="TextBox 12">
+            <a:extLst>
+              <a:ext uri="{FF2B5EF4-FFF2-40B4-BE49-F238E27FC236}">
+                <a16:creationId xmlns:a16="http://schemas.microsoft.com/office/drawing/2014/main" id="{1BE3F99D-2299-4E58-939F-7B08C06A519C}"/>
+              </a:ext>
+            </a:extLst>
+          </p:cNvPr>
+          <p:cNvSpPr txBox="1"/>
+          <p:nvPr/>
+        </p:nvSpPr>
+        <p:spPr>
+          <a:xfrm>
+            <a:off x="2821964" y="3986936"/>
+            <a:ext cx="2507418" cy="369332"/>
+          </a:xfrm>
+          <a:prstGeom prst="rect">
+            <a:avLst/>
+          </a:prstGeom>
+          <a:noFill/>
+        </p:spPr>
+        <p:txBody>
+          <a:bodyPr wrap="none" rtlCol="0">
+            <a:spAutoFit/>
+          </a:bodyPr>
+          <a:lstStyle/>
+          <a:p>
+            <a:r>
+              <a:rPr lang="pt-BR" dirty="0">
+                <a:solidFill>
+                  <a:schemeClr val="accent4">
+                    <a:lumMod val="75000"/>
+                  </a:schemeClr>
+                </a:solidFill>
+              </a:rPr>
+              <a:t>Faixa Precária de tensão</a:t>
+            </a:r>
+          </a:p>
+        </p:txBody>
+      </p:sp>
+      <p:sp>
+        <p:nvSpPr>
+          <p:cNvPr id="14" name="TextBox 13">
+            <a:extLst>
+              <a:ext uri="{FF2B5EF4-FFF2-40B4-BE49-F238E27FC236}">
+                <a16:creationId xmlns:a16="http://schemas.microsoft.com/office/drawing/2014/main" id="{F19A5A40-E10A-4678-AE3F-20D545F18156}"/>
+              </a:ext>
+            </a:extLst>
+          </p:cNvPr>
+          <p:cNvSpPr txBox="1"/>
+          <p:nvPr/>
+        </p:nvSpPr>
+        <p:spPr>
+          <a:xfrm>
+            <a:off x="2854197" y="1189903"/>
+            <a:ext cx="2507418" cy="369332"/>
+          </a:xfrm>
+          <a:prstGeom prst="rect">
+            <a:avLst/>
+          </a:prstGeom>
+          <a:noFill/>
+        </p:spPr>
+        <p:txBody>
+          <a:bodyPr wrap="none" rtlCol="0">
+            <a:spAutoFit/>
+          </a:bodyPr>
+          <a:lstStyle/>
+          <a:p>
+            <a:r>
+              <a:rPr lang="pt-BR" dirty="0">
+                <a:solidFill>
+                  <a:schemeClr val="accent4">
+                    <a:lumMod val="75000"/>
+                  </a:schemeClr>
+                </a:solidFill>
+              </a:rPr>
+              <a:t>Faixa Precária de tensão</a:t>
+            </a:r>
+          </a:p>
+        </p:txBody>
+      </p:sp>
+      <p:sp>
+        <p:nvSpPr>
+          <p:cNvPr id="15" name="TextBox 14">
+            <a:extLst>
+              <a:ext uri="{FF2B5EF4-FFF2-40B4-BE49-F238E27FC236}">
+                <a16:creationId xmlns:a16="http://schemas.microsoft.com/office/drawing/2014/main" id="{837AFA39-CC01-4C76-A7E6-9818DDC2BF5E}"/>
+              </a:ext>
+            </a:extLst>
+          </p:cNvPr>
+          <p:cNvSpPr txBox="1"/>
+          <p:nvPr/>
+        </p:nvSpPr>
+        <p:spPr>
+          <a:xfrm>
+            <a:off x="3044570" y="4857468"/>
+            <a:ext cx="2317045" cy="369332"/>
+          </a:xfrm>
+          <a:prstGeom prst="rect">
+            <a:avLst/>
+          </a:prstGeom>
+          <a:noFill/>
+        </p:spPr>
+        <p:txBody>
+          <a:bodyPr wrap="none" rtlCol="0">
+            <a:spAutoFit/>
+          </a:bodyPr>
+          <a:lstStyle/>
+          <a:p>
+            <a:r>
+              <a:rPr lang="pt-BR" dirty="0">
+                <a:solidFill>
+                  <a:srgbClr val="C00000"/>
+                </a:solidFill>
+              </a:rPr>
+              <a:t>Faixa Crítica de tensão</a:t>
+            </a:r>
+          </a:p>
+        </p:txBody>
+      </p:sp>
+      <p:sp>
+        <p:nvSpPr>
+          <p:cNvPr id="16" name="TextBox 15">
+            <a:extLst>
+              <a:ext uri="{FF2B5EF4-FFF2-40B4-BE49-F238E27FC236}">
+                <a16:creationId xmlns:a16="http://schemas.microsoft.com/office/drawing/2014/main" id="{32713DC1-97ED-4D2B-8137-360C905C37DA}"/>
+              </a:ext>
+            </a:extLst>
+          </p:cNvPr>
+          <p:cNvSpPr txBox="1"/>
+          <p:nvPr/>
+        </p:nvSpPr>
+        <p:spPr>
+          <a:xfrm>
+            <a:off x="3069444" y="517734"/>
+            <a:ext cx="2317045" cy="369332"/>
+          </a:xfrm>
+          <a:prstGeom prst="rect">
+            <a:avLst/>
+          </a:prstGeom>
+          <a:noFill/>
+        </p:spPr>
+        <p:txBody>
+          <a:bodyPr wrap="none" rtlCol="0">
+            <a:spAutoFit/>
+          </a:bodyPr>
+          <a:lstStyle/>
+          <a:p>
+            <a:r>
+              <a:rPr lang="pt-BR" dirty="0">
+                <a:solidFill>
+                  <a:srgbClr val="C00000"/>
+                </a:solidFill>
+              </a:rPr>
+              <a:t>Faixa Crítica de tensão</a:t>
+            </a:r>
+          </a:p>
+        </p:txBody>
+      </p:sp>
+    </p:spTree>
+    <p:extLst>
+      <p:ext uri="{BB962C8B-B14F-4D97-AF65-F5344CB8AC3E}">
+        <p14:creationId xmlns:p14="http://schemas.microsoft.com/office/powerpoint/2010/main" val="1166453244"/>
+      </p:ext>
+    </p:extLst>
+  </p:cSld>
+  <p:clrMapOvr>
+    <a:masterClrMapping/>
+  </p:clrMapOvr>
+</p:sld>
+</file>
+
 <file path=ppt/slides/slide2.xml><?xml version="1.0" encoding="utf-8"?>
 <p:sld xmlns:a="http://schemas.openxmlformats.org/drawingml/2006/main" xmlns:r="http://schemas.openxmlformats.org/officeDocument/2006/relationships" xmlns:p="http://schemas.openxmlformats.org/presentationml/2006/main">
   <p:cSld>

</xml_diff>

<commit_message>
Final - Sem Correcoes
</commit_message>
<xml_diff>
--- a/Figuras/Presentation1.pptx
+++ b/Figuras/Presentation1.pptx
@@ -16,6 +16,7 @@
     <p:sldId id="263" r:id="rId10"/>
     <p:sldId id="264" r:id="rId11"/>
     <p:sldId id="266" r:id="rId12"/>
+    <p:sldId id="267" r:id="rId13"/>
   </p:sldIdLst>
   <p:sldSz cx="12192000" cy="6858000"/>
   <p:notesSz cx="6858000" cy="9144000"/>
@@ -271,7 +272,7 @@
           <a:p>
             <a:fld id="{5135F40E-8B21-4562-A227-5932CD61C66C}" type="datetimeFigureOut">
               <a:rPr lang="pt-BR" smtClean="0"/>
-              <a:t>27/09/2018</a:t>
+              <a:t>29/09/2018</a:t>
             </a:fld>
             <a:endParaRPr lang="pt-BR"/>
           </a:p>
@@ -471,7 +472,7 @@
           <a:p>
             <a:fld id="{5135F40E-8B21-4562-A227-5932CD61C66C}" type="datetimeFigureOut">
               <a:rPr lang="pt-BR" smtClean="0"/>
-              <a:t>27/09/2018</a:t>
+              <a:t>29/09/2018</a:t>
             </a:fld>
             <a:endParaRPr lang="pt-BR"/>
           </a:p>
@@ -681,7 +682,7 @@
           <a:p>
             <a:fld id="{5135F40E-8B21-4562-A227-5932CD61C66C}" type="datetimeFigureOut">
               <a:rPr lang="pt-BR" smtClean="0"/>
-              <a:t>27/09/2018</a:t>
+              <a:t>29/09/2018</a:t>
             </a:fld>
             <a:endParaRPr lang="pt-BR"/>
           </a:p>
@@ -881,7 +882,7 @@
           <a:p>
             <a:fld id="{5135F40E-8B21-4562-A227-5932CD61C66C}" type="datetimeFigureOut">
               <a:rPr lang="pt-BR" smtClean="0"/>
-              <a:t>27/09/2018</a:t>
+              <a:t>29/09/2018</a:t>
             </a:fld>
             <a:endParaRPr lang="pt-BR"/>
           </a:p>
@@ -1157,7 +1158,7 @@
           <a:p>
             <a:fld id="{5135F40E-8B21-4562-A227-5932CD61C66C}" type="datetimeFigureOut">
               <a:rPr lang="pt-BR" smtClean="0"/>
-              <a:t>27/09/2018</a:t>
+              <a:t>29/09/2018</a:t>
             </a:fld>
             <a:endParaRPr lang="pt-BR"/>
           </a:p>
@@ -1425,7 +1426,7 @@
           <a:p>
             <a:fld id="{5135F40E-8B21-4562-A227-5932CD61C66C}" type="datetimeFigureOut">
               <a:rPr lang="pt-BR" smtClean="0"/>
-              <a:t>27/09/2018</a:t>
+              <a:t>29/09/2018</a:t>
             </a:fld>
             <a:endParaRPr lang="pt-BR"/>
           </a:p>
@@ -1840,7 +1841,7 @@
           <a:p>
             <a:fld id="{5135F40E-8B21-4562-A227-5932CD61C66C}" type="datetimeFigureOut">
               <a:rPr lang="pt-BR" smtClean="0"/>
-              <a:t>27/09/2018</a:t>
+              <a:t>29/09/2018</a:t>
             </a:fld>
             <a:endParaRPr lang="pt-BR"/>
           </a:p>
@@ -1982,7 +1983,7 @@
           <a:p>
             <a:fld id="{5135F40E-8B21-4562-A227-5932CD61C66C}" type="datetimeFigureOut">
               <a:rPr lang="pt-BR" smtClean="0"/>
-              <a:t>27/09/2018</a:t>
+              <a:t>29/09/2018</a:t>
             </a:fld>
             <a:endParaRPr lang="pt-BR"/>
           </a:p>
@@ -2095,7 +2096,7 @@
           <a:p>
             <a:fld id="{5135F40E-8B21-4562-A227-5932CD61C66C}" type="datetimeFigureOut">
               <a:rPr lang="pt-BR" smtClean="0"/>
-              <a:t>27/09/2018</a:t>
+              <a:t>29/09/2018</a:t>
             </a:fld>
             <a:endParaRPr lang="pt-BR"/>
           </a:p>
@@ -2408,7 +2409,7 @@
           <a:p>
             <a:fld id="{5135F40E-8B21-4562-A227-5932CD61C66C}" type="datetimeFigureOut">
               <a:rPr lang="pt-BR" smtClean="0"/>
-              <a:t>27/09/2018</a:t>
+              <a:t>29/09/2018</a:t>
             </a:fld>
             <a:endParaRPr lang="pt-BR"/>
           </a:p>
@@ -2697,7 +2698,7 @@
           <a:p>
             <a:fld id="{5135F40E-8B21-4562-A227-5932CD61C66C}" type="datetimeFigureOut">
               <a:rPr lang="pt-BR" smtClean="0"/>
-              <a:t>27/09/2018</a:t>
+              <a:t>29/09/2018</a:t>
             </a:fld>
             <a:endParaRPr lang="pt-BR"/>
           </a:p>
@@ -2940,7 +2941,7 @@
           <a:p>
             <a:fld id="{5135F40E-8B21-4562-A227-5932CD61C66C}" type="datetimeFigureOut">
               <a:rPr lang="pt-BR" smtClean="0"/>
-              <a:t>27/09/2018</a:t>
+              <a:t>29/09/2018</a:t>
             </a:fld>
             <a:endParaRPr lang="pt-BR"/>
           </a:p>
@@ -4751,6 +4752,1285 @@
 </p:sld>
 </file>
 
+<file path=ppt/slides/slide12.xml><?xml version="1.0" encoding="utf-8"?>
+<p:sld xmlns:a="http://schemas.openxmlformats.org/drawingml/2006/main" xmlns:r="http://schemas.openxmlformats.org/officeDocument/2006/relationships" xmlns:p="http://schemas.openxmlformats.org/presentationml/2006/main">
+  <p:cSld>
+    <p:spTree>
+      <p:nvGrpSpPr>
+        <p:cNvPr id="1" name=""/>
+        <p:cNvGrpSpPr/>
+        <p:nvPr/>
+      </p:nvGrpSpPr>
+      <p:grpSpPr>
+        <a:xfrm>
+          <a:off x="0" y="0"/>
+          <a:ext cx="0" cy="0"/>
+          <a:chOff x="0" y="0"/>
+          <a:chExt cx="0" cy="0"/>
+        </a:xfrm>
+      </p:grpSpPr>
+      <p:sp>
+        <p:nvSpPr>
+          <p:cNvPr id="17" name="Rectangle 16">
+            <a:extLst>
+              <a:ext uri="{FF2B5EF4-FFF2-40B4-BE49-F238E27FC236}">
+                <a16:creationId xmlns:a16="http://schemas.microsoft.com/office/drawing/2014/main" id="{1B5EC31D-ED3B-43AC-B790-C0601CA1BED2}"/>
+              </a:ext>
+            </a:extLst>
+          </p:cNvPr>
+          <p:cNvSpPr/>
+          <p:nvPr/>
+        </p:nvSpPr>
+        <p:spPr>
+          <a:xfrm>
+            <a:off x="1375235" y="1756123"/>
+            <a:ext cx="2463568" cy="1466424"/>
+          </a:xfrm>
+          <a:prstGeom prst="rect">
+            <a:avLst/>
+          </a:prstGeom>
+          <a:gradFill flip="none" rotWithShape="1">
+            <a:gsLst>
+              <a:gs pos="0">
+                <a:srgbClr val="F40A0A">
+                  <a:tint val="66000"/>
+                  <a:satMod val="160000"/>
+                </a:srgbClr>
+              </a:gs>
+              <a:gs pos="50000">
+                <a:srgbClr val="F40A0A">
+                  <a:tint val="44500"/>
+                  <a:satMod val="160000"/>
+                </a:srgbClr>
+              </a:gs>
+              <a:gs pos="100000">
+                <a:srgbClr val="F40A0A">
+                  <a:tint val="23500"/>
+                  <a:satMod val="160000"/>
+                </a:srgbClr>
+              </a:gs>
+            </a:gsLst>
+            <a:lin ang="5400000" scaled="1"/>
+            <a:tileRect/>
+          </a:gradFill>
+          <a:ln w="38100">
+            <a:solidFill>
+              <a:schemeClr val="tx1"/>
+            </a:solidFill>
+          </a:ln>
+        </p:spPr>
+        <p:style>
+          <a:lnRef idx="2">
+            <a:schemeClr val="accent1">
+              <a:shade val="50000"/>
+            </a:schemeClr>
+          </a:lnRef>
+          <a:fillRef idx="1">
+            <a:schemeClr val="accent1"/>
+          </a:fillRef>
+          <a:effectRef idx="0">
+            <a:schemeClr val="accent1"/>
+          </a:effectRef>
+          <a:fontRef idx="minor">
+            <a:schemeClr val="lt1"/>
+          </a:fontRef>
+        </p:style>
+        <p:txBody>
+          <a:bodyPr rtlCol="0" anchor="ctr"/>
+          <a:lstStyle/>
+          <a:p>
+            <a:pPr algn="ctr"/>
+            <a:endParaRPr lang="pt-BR" b="1" dirty="0">
+              <a:solidFill>
+                <a:schemeClr val="tx1"/>
+              </a:solidFill>
+            </a:endParaRPr>
+          </a:p>
+        </p:txBody>
+      </p:sp>
+      <p:sp>
+        <p:nvSpPr>
+          <p:cNvPr id="18" name="Rectangle 17">
+            <a:extLst>
+              <a:ext uri="{FF2B5EF4-FFF2-40B4-BE49-F238E27FC236}">
+                <a16:creationId xmlns:a16="http://schemas.microsoft.com/office/drawing/2014/main" id="{65DF40B9-E13D-44CF-9FAE-D7574D45B3D9}"/>
+              </a:ext>
+            </a:extLst>
+          </p:cNvPr>
+          <p:cNvSpPr/>
+          <p:nvPr/>
+        </p:nvSpPr>
+        <p:spPr>
+          <a:xfrm>
+            <a:off x="5438863" y="1596732"/>
+            <a:ext cx="2463568" cy="1466424"/>
+          </a:xfrm>
+          <a:prstGeom prst="rect">
+            <a:avLst/>
+          </a:prstGeom>
+          <a:gradFill flip="none" rotWithShape="1">
+            <a:gsLst>
+              <a:gs pos="0">
+                <a:schemeClr val="accent4">
+                  <a:lumMod val="60000"/>
+                  <a:lumOff val="40000"/>
+                  <a:tint val="66000"/>
+                  <a:satMod val="160000"/>
+                </a:schemeClr>
+              </a:gs>
+              <a:gs pos="50000">
+                <a:schemeClr val="accent4">
+                  <a:lumMod val="60000"/>
+                  <a:lumOff val="40000"/>
+                  <a:tint val="44500"/>
+                  <a:satMod val="160000"/>
+                </a:schemeClr>
+              </a:gs>
+              <a:gs pos="100000">
+                <a:schemeClr val="accent4">
+                  <a:lumMod val="60000"/>
+                  <a:lumOff val="40000"/>
+                  <a:tint val="23500"/>
+                  <a:satMod val="160000"/>
+                </a:schemeClr>
+              </a:gs>
+            </a:gsLst>
+            <a:lin ang="5400000" scaled="1"/>
+            <a:tileRect/>
+          </a:gradFill>
+          <a:ln w="38100">
+            <a:solidFill>
+              <a:schemeClr val="tx1"/>
+            </a:solidFill>
+          </a:ln>
+        </p:spPr>
+        <p:style>
+          <a:lnRef idx="2">
+            <a:schemeClr val="accent1">
+              <a:shade val="50000"/>
+            </a:schemeClr>
+          </a:lnRef>
+          <a:fillRef idx="1">
+            <a:schemeClr val="accent1"/>
+          </a:fillRef>
+          <a:effectRef idx="0">
+            <a:schemeClr val="accent1"/>
+          </a:effectRef>
+          <a:fontRef idx="minor">
+            <a:schemeClr val="lt1"/>
+          </a:fontRef>
+        </p:style>
+        <p:txBody>
+          <a:bodyPr rtlCol="0" anchor="ctr"/>
+          <a:lstStyle/>
+          <a:p>
+            <a:pPr algn="ctr"/>
+            <a:endParaRPr lang="pt-BR" b="1" dirty="0">
+              <a:solidFill>
+                <a:schemeClr val="tx1"/>
+              </a:solidFill>
+            </a:endParaRPr>
+          </a:p>
+        </p:txBody>
+      </p:sp>
+      <p:sp>
+        <p:nvSpPr>
+          <p:cNvPr id="2" name="TextBox 1">
+            <a:extLst>
+              <a:ext uri="{FF2B5EF4-FFF2-40B4-BE49-F238E27FC236}">
+                <a16:creationId xmlns:a16="http://schemas.microsoft.com/office/drawing/2014/main" id="{970DBFDF-3568-4B02-B543-8C8F7FEE1B08}"/>
+              </a:ext>
+            </a:extLst>
+          </p:cNvPr>
+          <p:cNvSpPr txBox="1"/>
+          <p:nvPr/>
+        </p:nvSpPr>
+        <p:spPr>
+          <a:xfrm>
+            <a:off x="6670647" y="2168883"/>
+            <a:ext cx="1248227" cy="369332"/>
+          </a:xfrm>
+          <a:prstGeom prst="rect">
+            <a:avLst/>
+          </a:prstGeom>
+          <a:noFill/>
+        </p:spPr>
+        <p:txBody>
+          <a:bodyPr wrap="none" rtlCol="0">
+            <a:spAutoFit/>
+          </a:bodyPr>
+          <a:lstStyle/>
+          <a:p>
+            <a:r>
+              <a:rPr lang="en-US" b="1" dirty="0"/>
+              <a:t>SPI Escravo</a:t>
+            </a:r>
+            <a:endParaRPr lang="pt-BR" b="1" dirty="0"/>
+          </a:p>
+        </p:txBody>
+      </p:sp>
+      <p:sp>
+        <p:nvSpPr>
+          <p:cNvPr id="19" name="TextBox 18">
+            <a:extLst>
+              <a:ext uri="{FF2B5EF4-FFF2-40B4-BE49-F238E27FC236}">
+                <a16:creationId xmlns:a16="http://schemas.microsoft.com/office/drawing/2014/main" id="{B578B598-878E-45EE-B6CE-4265235D255E}"/>
+              </a:ext>
+            </a:extLst>
+          </p:cNvPr>
+          <p:cNvSpPr txBox="1"/>
+          <p:nvPr/>
+        </p:nvSpPr>
+        <p:spPr>
+          <a:xfrm>
+            <a:off x="3174138" y="1736936"/>
+            <a:ext cx="731290" cy="1477328"/>
+          </a:xfrm>
+          <a:prstGeom prst="rect">
+            <a:avLst/>
+          </a:prstGeom>
+          <a:noFill/>
+        </p:spPr>
+        <p:txBody>
+          <a:bodyPr wrap="none" rtlCol="0">
+            <a:spAutoFit/>
+          </a:bodyPr>
+          <a:lstStyle/>
+          <a:p>
+            <a:r>
+              <a:rPr lang="en-US" b="1" dirty="0"/>
+              <a:t>SCLK</a:t>
+            </a:r>
+          </a:p>
+          <a:p>
+            <a:r>
+              <a:rPr lang="en-US" b="1" dirty="0"/>
+              <a:t>MOSI</a:t>
+            </a:r>
+          </a:p>
+          <a:p>
+            <a:r>
+              <a:rPr lang="en-US" b="1" dirty="0"/>
+              <a:t>MISO</a:t>
+            </a:r>
+          </a:p>
+          <a:p>
+            <a:r>
+              <a:rPr lang="en-US" b="1" dirty="0"/>
+              <a:t>   SS</a:t>
+            </a:r>
+            <a:r>
+              <a:rPr lang="en-US" sz="1400" b="1" dirty="0"/>
+              <a:t>1</a:t>
+            </a:r>
+          </a:p>
+          <a:p>
+            <a:r>
+              <a:rPr lang="en-US" b="1" dirty="0"/>
+              <a:t>   SS</a:t>
+            </a:r>
+            <a:r>
+              <a:rPr lang="en-US" sz="1400" b="1" dirty="0"/>
+              <a:t>2</a:t>
+            </a:r>
+            <a:endParaRPr lang="en-US" b="1" dirty="0"/>
+          </a:p>
+        </p:txBody>
+      </p:sp>
+      <p:sp>
+        <p:nvSpPr>
+          <p:cNvPr id="20" name="Rectangle 19">
+            <a:extLst>
+              <a:ext uri="{FF2B5EF4-FFF2-40B4-BE49-F238E27FC236}">
+                <a16:creationId xmlns:a16="http://schemas.microsoft.com/office/drawing/2014/main" id="{07E64FCE-DB46-4D26-87FF-0A020C9F96B8}"/>
+              </a:ext>
+            </a:extLst>
+          </p:cNvPr>
+          <p:cNvSpPr/>
+          <p:nvPr/>
+        </p:nvSpPr>
+        <p:spPr>
+          <a:xfrm>
+            <a:off x="5438863" y="3314355"/>
+            <a:ext cx="2463568" cy="1466424"/>
+          </a:xfrm>
+          <a:prstGeom prst="rect">
+            <a:avLst/>
+          </a:prstGeom>
+          <a:gradFill flip="none" rotWithShape="1">
+            <a:gsLst>
+              <a:gs pos="0">
+                <a:schemeClr val="accent1">
+                  <a:tint val="66000"/>
+                  <a:satMod val="160000"/>
+                </a:schemeClr>
+              </a:gs>
+              <a:gs pos="50000">
+                <a:schemeClr val="accent1">
+                  <a:tint val="44500"/>
+                  <a:satMod val="160000"/>
+                </a:schemeClr>
+              </a:gs>
+              <a:gs pos="100000">
+                <a:schemeClr val="accent1">
+                  <a:tint val="23500"/>
+                  <a:satMod val="160000"/>
+                </a:schemeClr>
+              </a:gs>
+            </a:gsLst>
+            <a:lin ang="5400000" scaled="1"/>
+            <a:tileRect/>
+          </a:gradFill>
+          <a:ln w="38100">
+            <a:solidFill>
+              <a:schemeClr val="tx1"/>
+            </a:solidFill>
+          </a:ln>
+        </p:spPr>
+        <p:style>
+          <a:lnRef idx="2">
+            <a:schemeClr val="accent1">
+              <a:shade val="50000"/>
+            </a:schemeClr>
+          </a:lnRef>
+          <a:fillRef idx="1">
+            <a:schemeClr val="accent1"/>
+          </a:fillRef>
+          <a:effectRef idx="0">
+            <a:schemeClr val="accent1"/>
+          </a:effectRef>
+          <a:fontRef idx="minor">
+            <a:schemeClr val="lt1"/>
+          </a:fontRef>
+        </p:style>
+        <p:txBody>
+          <a:bodyPr rtlCol="0" anchor="ctr"/>
+          <a:lstStyle/>
+          <a:p>
+            <a:pPr algn="ctr"/>
+            <a:endParaRPr lang="pt-BR" b="1" dirty="0">
+              <a:solidFill>
+                <a:schemeClr val="tx1"/>
+              </a:solidFill>
+            </a:endParaRPr>
+          </a:p>
+        </p:txBody>
+      </p:sp>
+      <p:sp>
+        <p:nvSpPr>
+          <p:cNvPr id="21" name="TextBox 20">
+            <a:extLst>
+              <a:ext uri="{FF2B5EF4-FFF2-40B4-BE49-F238E27FC236}">
+                <a16:creationId xmlns:a16="http://schemas.microsoft.com/office/drawing/2014/main" id="{A74FA3CB-B30A-45DE-AA8B-B74BC2F8F7FD}"/>
+              </a:ext>
+            </a:extLst>
+          </p:cNvPr>
+          <p:cNvSpPr txBox="1"/>
+          <p:nvPr/>
+        </p:nvSpPr>
+        <p:spPr>
+          <a:xfrm>
+            <a:off x="5438863" y="1756123"/>
+            <a:ext cx="720069" cy="1200329"/>
+          </a:xfrm>
+          <a:prstGeom prst="rect">
+            <a:avLst/>
+          </a:prstGeom>
+          <a:noFill/>
+        </p:spPr>
+        <p:txBody>
+          <a:bodyPr wrap="none" rtlCol="0">
+            <a:spAutoFit/>
+          </a:bodyPr>
+          <a:lstStyle/>
+          <a:p>
+            <a:r>
+              <a:rPr lang="en-US" b="1" dirty="0"/>
+              <a:t>SCLK</a:t>
+            </a:r>
+          </a:p>
+          <a:p>
+            <a:r>
+              <a:rPr lang="en-US" b="1" dirty="0"/>
+              <a:t>MOSI</a:t>
+            </a:r>
+          </a:p>
+          <a:p>
+            <a:r>
+              <a:rPr lang="en-US" b="1" dirty="0"/>
+              <a:t>MISO</a:t>
+            </a:r>
+          </a:p>
+          <a:p>
+            <a:r>
+              <a:rPr lang="en-US" b="1" dirty="0"/>
+              <a:t> SS</a:t>
+            </a:r>
+          </a:p>
+        </p:txBody>
+      </p:sp>
+      <p:cxnSp>
+        <p:nvCxnSpPr>
+          <p:cNvPr id="4" name="Straight Arrow Connector 3">
+            <a:extLst>
+              <a:ext uri="{FF2B5EF4-FFF2-40B4-BE49-F238E27FC236}">
+                <a16:creationId xmlns:a16="http://schemas.microsoft.com/office/drawing/2014/main" id="{C52E54D8-0036-4D6F-8DD0-7BF29B76B9C8}"/>
+              </a:ext>
+            </a:extLst>
+          </p:cNvPr>
+          <p:cNvCxnSpPr>
+            <a:cxnSpLocks/>
+          </p:cNvCxnSpPr>
+          <p:nvPr/>
+        </p:nvCxnSpPr>
+        <p:spPr>
+          <a:xfrm>
+            <a:off x="3855246" y="1954635"/>
+            <a:ext cx="1583617" cy="0"/>
+          </a:xfrm>
+          <a:prstGeom prst="straightConnector1">
+            <a:avLst/>
+          </a:prstGeom>
+          <a:ln w="28575">
+            <a:solidFill>
+              <a:schemeClr val="tx1"/>
+            </a:solidFill>
+            <a:tailEnd type="triangle"/>
+          </a:ln>
+        </p:spPr>
+        <p:style>
+          <a:lnRef idx="1">
+            <a:schemeClr val="accent1"/>
+          </a:lnRef>
+          <a:fillRef idx="0">
+            <a:schemeClr val="accent1"/>
+          </a:fillRef>
+          <a:effectRef idx="0">
+            <a:schemeClr val="accent1"/>
+          </a:effectRef>
+          <a:fontRef idx="minor">
+            <a:schemeClr val="tx1"/>
+          </a:fontRef>
+        </p:style>
+      </p:cxnSp>
+      <p:cxnSp>
+        <p:nvCxnSpPr>
+          <p:cNvPr id="25" name="Straight Arrow Connector 24">
+            <a:extLst>
+              <a:ext uri="{FF2B5EF4-FFF2-40B4-BE49-F238E27FC236}">
+                <a16:creationId xmlns:a16="http://schemas.microsoft.com/office/drawing/2014/main" id="{060617AE-B898-4BB8-A05B-A22F572B2053}"/>
+              </a:ext>
+            </a:extLst>
+          </p:cNvPr>
+          <p:cNvCxnSpPr>
+            <a:cxnSpLocks/>
+          </p:cNvCxnSpPr>
+          <p:nvPr/>
+        </p:nvCxnSpPr>
+        <p:spPr>
+          <a:xfrm>
+            <a:off x="3855246" y="2206305"/>
+            <a:ext cx="1583617" cy="0"/>
+          </a:xfrm>
+          <a:prstGeom prst="straightConnector1">
+            <a:avLst/>
+          </a:prstGeom>
+          <a:ln w="28575">
+            <a:solidFill>
+              <a:schemeClr val="tx1"/>
+            </a:solidFill>
+            <a:tailEnd type="triangle"/>
+          </a:ln>
+        </p:spPr>
+        <p:style>
+          <a:lnRef idx="1">
+            <a:schemeClr val="accent1"/>
+          </a:lnRef>
+          <a:fillRef idx="0">
+            <a:schemeClr val="accent1"/>
+          </a:fillRef>
+          <a:effectRef idx="0">
+            <a:schemeClr val="accent1"/>
+          </a:effectRef>
+          <a:fontRef idx="minor">
+            <a:schemeClr val="tx1"/>
+          </a:fontRef>
+        </p:style>
+      </p:cxnSp>
+      <p:cxnSp>
+        <p:nvCxnSpPr>
+          <p:cNvPr id="26" name="Straight Arrow Connector 25">
+            <a:extLst>
+              <a:ext uri="{FF2B5EF4-FFF2-40B4-BE49-F238E27FC236}">
+                <a16:creationId xmlns:a16="http://schemas.microsoft.com/office/drawing/2014/main" id="{4E255009-9D79-478F-82A6-126AD5AE65FC}"/>
+              </a:ext>
+            </a:extLst>
+          </p:cNvPr>
+          <p:cNvCxnSpPr>
+            <a:cxnSpLocks/>
+          </p:cNvCxnSpPr>
+          <p:nvPr/>
+        </p:nvCxnSpPr>
+        <p:spPr>
+          <a:xfrm>
+            <a:off x="3855246" y="2751589"/>
+            <a:ext cx="1583617" cy="0"/>
+          </a:xfrm>
+          <a:prstGeom prst="straightConnector1">
+            <a:avLst/>
+          </a:prstGeom>
+          <a:ln w="28575">
+            <a:solidFill>
+              <a:schemeClr val="tx1"/>
+            </a:solidFill>
+            <a:tailEnd type="triangle"/>
+          </a:ln>
+        </p:spPr>
+        <p:style>
+          <a:lnRef idx="1">
+            <a:schemeClr val="accent1"/>
+          </a:lnRef>
+          <a:fillRef idx="0">
+            <a:schemeClr val="accent1"/>
+          </a:fillRef>
+          <a:effectRef idx="0">
+            <a:schemeClr val="accent1"/>
+          </a:effectRef>
+          <a:fontRef idx="minor">
+            <a:schemeClr val="tx1"/>
+          </a:fontRef>
+        </p:style>
+      </p:cxnSp>
+      <p:cxnSp>
+        <p:nvCxnSpPr>
+          <p:cNvPr id="27" name="Straight Arrow Connector 26">
+            <a:extLst>
+              <a:ext uri="{FF2B5EF4-FFF2-40B4-BE49-F238E27FC236}">
+                <a16:creationId xmlns:a16="http://schemas.microsoft.com/office/drawing/2014/main" id="{E0C8E1CE-EDF0-46FF-AE41-56272221CD5B}"/>
+              </a:ext>
+            </a:extLst>
+          </p:cNvPr>
+          <p:cNvCxnSpPr>
+            <a:cxnSpLocks/>
+          </p:cNvCxnSpPr>
+          <p:nvPr/>
+        </p:nvCxnSpPr>
+        <p:spPr>
+          <a:xfrm flipH="1">
+            <a:off x="3855247" y="2488267"/>
+            <a:ext cx="1583616" cy="0"/>
+          </a:xfrm>
+          <a:prstGeom prst="straightConnector1">
+            <a:avLst/>
+          </a:prstGeom>
+          <a:ln w="28575">
+            <a:solidFill>
+              <a:schemeClr val="tx1"/>
+            </a:solidFill>
+            <a:tailEnd type="triangle"/>
+          </a:ln>
+        </p:spPr>
+        <p:style>
+          <a:lnRef idx="1">
+            <a:schemeClr val="accent1"/>
+          </a:lnRef>
+          <a:fillRef idx="0">
+            <a:schemeClr val="accent1"/>
+          </a:fillRef>
+          <a:effectRef idx="0">
+            <a:schemeClr val="accent1"/>
+          </a:effectRef>
+          <a:fontRef idx="minor">
+            <a:schemeClr val="tx1"/>
+          </a:fontRef>
+        </p:style>
+      </p:cxnSp>
+      <p:sp>
+        <p:nvSpPr>
+          <p:cNvPr id="30" name="TextBox 29">
+            <a:extLst>
+              <a:ext uri="{FF2B5EF4-FFF2-40B4-BE49-F238E27FC236}">
+                <a16:creationId xmlns:a16="http://schemas.microsoft.com/office/drawing/2014/main" id="{3A8B409F-D69E-42FB-995D-7CE0CEAEA149}"/>
+              </a:ext>
+            </a:extLst>
+          </p:cNvPr>
+          <p:cNvSpPr txBox="1"/>
+          <p:nvPr/>
+        </p:nvSpPr>
+        <p:spPr>
+          <a:xfrm>
+            <a:off x="1441860" y="2021639"/>
+            <a:ext cx="1211870" cy="369332"/>
+          </a:xfrm>
+          <a:prstGeom prst="rect">
+            <a:avLst/>
+          </a:prstGeom>
+          <a:noFill/>
+        </p:spPr>
+        <p:txBody>
+          <a:bodyPr wrap="none" rtlCol="0">
+            <a:spAutoFit/>
+          </a:bodyPr>
+          <a:lstStyle/>
+          <a:p>
+            <a:r>
+              <a:rPr lang="en-US" b="1" dirty="0"/>
+              <a:t>SPI Mestre</a:t>
+            </a:r>
+            <a:endParaRPr lang="pt-BR" b="1" dirty="0"/>
+          </a:p>
+        </p:txBody>
+      </p:sp>
+      <p:sp>
+        <p:nvSpPr>
+          <p:cNvPr id="31" name="TextBox 30">
+            <a:extLst>
+              <a:ext uri="{FF2B5EF4-FFF2-40B4-BE49-F238E27FC236}">
+                <a16:creationId xmlns:a16="http://schemas.microsoft.com/office/drawing/2014/main" id="{D8C81740-11A7-452A-8B51-B89EAFFDD13B}"/>
+              </a:ext>
+            </a:extLst>
+          </p:cNvPr>
+          <p:cNvSpPr txBox="1"/>
+          <p:nvPr/>
+        </p:nvSpPr>
+        <p:spPr>
+          <a:xfrm>
+            <a:off x="5438863" y="3347468"/>
+            <a:ext cx="720069" cy="1200329"/>
+          </a:xfrm>
+          <a:prstGeom prst="rect">
+            <a:avLst/>
+          </a:prstGeom>
+          <a:noFill/>
+        </p:spPr>
+        <p:txBody>
+          <a:bodyPr wrap="none" rtlCol="0">
+            <a:spAutoFit/>
+          </a:bodyPr>
+          <a:lstStyle/>
+          <a:p>
+            <a:r>
+              <a:rPr lang="en-US" b="1" dirty="0"/>
+              <a:t>SCLK</a:t>
+            </a:r>
+          </a:p>
+          <a:p>
+            <a:r>
+              <a:rPr lang="en-US" b="1" dirty="0"/>
+              <a:t>MOSI</a:t>
+            </a:r>
+          </a:p>
+          <a:p>
+            <a:r>
+              <a:rPr lang="en-US" b="1" dirty="0"/>
+              <a:t>MISO</a:t>
+            </a:r>
+          </a:p>
+          <a:p>
+            <a:r>
+              <a:rPr lang="en-US" b="1" dirty="0"/>
+              <a:t> SS</a:t>
+            </a:r>
+          </a:p>
+        </p:txBody>
+      </p:sp>
+      <p:cxnSp>
+        <p:nvCxnSpPr>
+          <p:cNvPr id="12" name="Straight Connector 11">
+            <a:extLst>
+              <a:ext uri="{FF2B5EF4-FFF2-40B4-BE49-F238E27FC236}">
+                <a16:creationId xmlns:a16="http://schemas.microsoft.com/office/drawing/2014/main" id="{3C4ABD1C-D432-4B18-AC52-A0EF462B11D3}"/>
+              </a:ext>
+            </a:extLst>
+          </p:cNvPr>
+          <p:cNvCxnSpPr>
+            <a:cxnSpLocks/>
+          </p:cNvCxnSpPr>
+          <p:nvPr/>
+        </p:nvCxnSpPr>
+        <p:spPr>
+          <a:xfrm>
+            <a:off x="4983061" y="1954635"/>
+            <a:ext cx="0" cy="1631528"/>
+          </a:xfrm>
+          <a:prstGeom prst="line">
+            <a:avLst/>
+          </a:prstGeom>
+          <a:ln w="28575">
+            <a:solidFill>
+              <a:schemeClr val="tx1"/>
+            </a:solidFill>
+          </a:ln>
+        </p:spPr>
+        <p:style>
+          <a:lnRef idx="1">
+            <a:schemeClr val="accent1"/>
+          </a:lnRef>
+          <a:fillRef idx="0">
+            <a:schemeClr val="accent1"/>
+          </a:fillRef>
+          <a:effectRef idx="0">
+            <a:schemeClr val="accent1"/>
+          </a:effectRef>
+          <a:fontRef idx="minor">
+            <a:schemeClr val="tx1"/>
+          </a:fontRef>
+        </p:style>
+      </p:cxnSp>
+      <p:cxnSp>
+        <p:nvCxnSpPr>
+          <p:cNvPr id="14" name="Straight Connector 13">
+            <a:extLst>
+              <a:ext uri="{FF2B5EF4-FFF2-40B4-BE49-F238E27FC236}">
+                <a16:creationId xmlns:a16="http://schemas.microsoft.com/office/drawing/2014/main" id="{37DBA9CC-125C-4285-8BE5-4088DE1B0348}"/>
+              </a:ext>
+            </a:extLst>
+          </p:cNvPr>
+          <p:cNvCxnSpPr/>
+          <p:nvPr/>
+        </p:nvCxnSpPr>
+        <p:spPr>
+          <a:xfrm>
+            <a:off x="4806892" y="2204208"/>
+            <a:ext cx="0" cy="1602297"/>
+          </a:xfrm>
+          <a:prstGeom prst="line">
+            <a:avLst/>
+          </a:prstGeom>
+          <a:ln w="28575">
+            <a:solidFill>
+              <a:schemeClr val="tx1"/>
+            </a:solidFill>
+          </a:ln>
+        </p:spPr>
+        <p:style>
+          <a:lnRef idx="1">
+            <a:schemeClr val="accent1"/>
+          </a:lnRef>
+          <a:fillRef idx="0">
+            <a:schemeClr val="accent1"/>
+          </a:fillRef>
+          <a:effectRef idx="0">
+            <a:schemeClr val="accent1"/>
+          </a:effectRef>
+          <a:fontRef idx="minor">
+            <a:schemeClr val="tx1"/>
+          </a:fontRef>
+        </p:style>
+      </p:cxnSp>
+      <p:cxnSp>
+        <p:nvCxnSpPr>
+          <p:cNvPr id="22" name="Straight Connector 21">
+            <a:extLst>
+              <a:ext uri="{FF2B5EF4-FFF2-40B4-BE49-F238E27FC236}">
+                <a16:creationId xmlns:a16="http://schemas.microsoft.com/office/drawing/2014/main" id="{26CE0993-E082-4766-9717-91FB004EAB97}"/>
+              </a:ext>
+            </a:extLst>
+          </p:cNvPr>
+          <p:cNvCxnSpPr>
+            <a:cxnSpLocks/>
+          </p:cNvCxnSpPr>
+          <p:nvPr/>
+        </p:nvCxnSpPr>
+        <p:spPr>
+          <a:xfrm>
+            <a:off x="4546833" y="2488267"/>
+            <a:ext cx="0" cy="1647505"/>
+          </a:xfrm>
+          <a:prstGeom prst="line">
+            <a:avLst/>
+          </a:prstGeom>
+          <a:ln w="28575">
+            <a:solidFill>
+              <a:schemeClr val="tx1"/>
+            </a:solidFill>
+          </a:ln>
+        </p:spPr>
+        <p:style>
+          <a:lnRef idx="1">
+            <a:schemeClr val="accent1"/>
+          </a:lnRef>
+          <a:fillRef idx="0">
+            <a:schemeClr val="accent1"/>
+          </a:fillRef>
+          <a:effectRef idx="0">
+            <a:schemeClr val="accent1"/>
+          </a:effectRef>
+          <a:fontRef idx="minor">
+            <a:schemeClr val="tx1"/>
+          </a:fontRef>
+        </p:style>
+      </p:cxnSp>
+      <p:cxnSp>
+        <p:nvCxnSpPr>
+          <p:cNvPr id="32" name="Straight Arrow Connector 31">
+            <a:extLst>
+              <a:ext uri="{FF2B5EF4-FFF2-40B4-BE49-F238E27FC236}">
+                <a16:creationId xmlns:a16="http://schemas.microsoft.com/office/drawing/2014/main" id="{CB3BADCE-60C3-42D3-B697-24E6A8E2D1FC}"/>
+              </a:ext>
+            </a:extLst>
+          </p:cNvPr>
+          <p:cNvCxnSpPr/>
+          <p:nvPr/>
+        </p:nvCxnSpPr>
+        <p:spPr>
+          <a:xfrm>
+            <a:off x="4983061" y="3529668"/>
+            <a:ext cx="455802" cy="0"/>
+          </a:xfrm>
+          <a:prstGeom prst="straightConnector1">
+            <a:avLst/>
+          </a:prstGeom>
+          <a:ln w="28575">
+            <a:solidFill>
+              <a:schemeClr val="tx1"/>
+            </a:solidFill>
+            <a:tailEnd type="triangle"/>
+          </a:ln>
+        </p:spPr>
+        <p:style>
+          <a:lnRef idx="1">
+            <a:schemeClr val="accent1"/>
+          </a:lnRef>
+          <a:fillRef idx="0">
+            <a:schemeClr val="accent1"/>
+          </a:fillRef>
+          <a:effectRef idx="0">
+            <a:schemeClr val="accent1"/>
+          </a:effectRef>
+          <a:fontRef idx="minor">
+            <a:schemeClr val="tx1"/>
+          </a:fontRef>
+        </p:style>
+      </p:cxnSp>
+      <p:cxnSp>
+        <p:nvCxnSpPr>
+          <p:cNvPr id="46" name="Straight Arrow Connector 45">
+            <a:extLst>
+              <a:ext uri="{FF2B5EF4-FFF2-40B4-BE49-F238E27FC236}">
+                <a16:creationId xmlns:a16="http://schemas.microsoft.com/office/drawing/2014/main" id="{428297CA-04A5-4173-A6F0-B01C2B471170}"/>
+              </a:ext>
+            </a:extLst>
+          </p:cNvPr>
+          <p:cNvCxnSpPr>
+            <a:cxnSpLocks/>
+          </p:cNvCxnSpPr>
+          <p:nvPr/>
+        </p:nvCxnSpPr>
+        <p:spPr>
+          <a:xfrm>
+            <a:off x="4772025" y="3806505"/>
+            <a:ext cx="666838" cy="0"/>
+          </a:xfrm>
+          <a:prstGeom prst="straightConnector1">
+            <a:avLst/>
+          </a:prstGeom>
+          <a:ln w="28575">
+            <a:solidFill>
+              <a:schemeClr val="tx1"/>
+            </a:solidFill>
+            <a:tailEnd type="triangle"/>
+          </a:ln>
+        </p:spPr>
+        <p:style>
+          <a:lnRef idx="1">
+            <a:schemeClr val="accent1"/>
+          </a:lnRef>
+          <a:fillRef idx="0">
+            <a:schemeClr val="accent1"/>
+          </a:fillRef>
+          <a:effectRef idx="0">
+            <a:schemeClr val="accent1"/>
+          </a:effectRef>
+          <a:fontRef idx="minor">
+            <a:schemeClr val="tx1"/>
+          </a:fontRef>
+        </p:style>
+      </p:cxnSp>
+      <p:cxnSp>
+        <p:nvCxnSpPr>
+          <p:cNvPr id="39" name="Straight Connector 38">
+            <a:extLst>
+              <a:ext uri="{FF2B5EF4-FFF2-40B4-BE49-F238E27FC236}">
+                <a16:creationId xmlns:a16="http://schemas.microsoft.com/office/drawing/2014/main" id="{897A0BF1-5E52-4AA3-B7CD-D53526DC0B17}"/>
+              </a:ext>
+            </a:extLst>
+          </p:cNvPr>
+          <p:cNvCxnSpPr>
+            <a:cxnSpLocks/>
+          </p:cNvCxnSpPr>
+          <p:nvPr/>
+        </p:nvCxnSpPr>
+        <p:spPr>
+          <a:xfrm>
+            <a:off x="4546833" y="4125689"/>
+            <a:ext cx="892030" cy="0"/>
+          </a:xfrm>
+          <a:prstGeom prst="line">
+            <a:avLst/>
+          </a:prstGeom>
+          <a:ln w="28575">
+            <a:solidFill>
+              <a:schemeClr val="tx1"/>
+            </a:solidFill>
+          </a:ln>
+        </p:spPr>
+        <p:style>
+          <a:lnRef idx="1">
+            <a:schemeClr val="accent1"/>
+          </a:lnRef>
+          <a:fillRef idx="0">
+            <a:schemeClr val="accent1"/>
+          </a:fillRef>
+          <a:effectRef idx="0">
+            <a:schemeClr val="accent1"/>
+          </a:effectRef>
+          <a:fontRef idx="minor">
+            <a:schemeClr val="tx1"/>
+          </a:fontRef>
+        </p:style>
+      </p:cxnSp>
+      <p:sp>
+        <p:nvSpPr>
+          <p:cNvPr id="57" name="TextBox 56">
+            <a:extLst>
+              <a:ext uri="{FF2B5EF4-FFF2-40B4-BE49-F238E27FC236}">
+                <a16:creationId xmlns:a16="http://schemas.microsoft.com/office/drawing/2014/main" id="{616523D8-8160-4A53-9EE8-1215BD393E24}"/>
+              </a:ext>
+            </a:extLst>
+          </p:cNvPr>
+          <p:cNvSpPr txBox="1"/>
+          <p:nvPr/>
+        </p:nvSpPr>
+        <p:spPr>
+          <a:xfrm>
+            <a:off x="6614733" y="3862901"/>
+            <a:ext cx="1248227" cy="369332"/>
+          </a:xfrm>
+          <a:prstGeom prst="rect">
+            <a:avLst/>
+          </a:prstGeom>
+          <a:noFill/>
+        </p:spPr>
+        <p:txBody>
+          <a:bodyPr wrap="none" rtlCol="0">
+            <a:spAutoFit/>
+          </a:bodyPr>
+          <a:lstStyle/>
+          <a:p>
+            <a:r>
+              <a:rPr lang="en-US" b="1" dirty="0"/>
+              <a:t>SPI Escravo</a:t>
+            </a:r>
+            <a:endParaRPr lang="pt-BR" b="1" dirty="0"/>
+          </a:p>
+        </p:txBody>
+      </p:sp>
+      <p:sp>
+        <p:nvSpPr>
+          <p:cNvPr id="43" name="Oval 42">
+            <a:extLst>
+              <a:ext uri="{FF2B5EF4-FFF2-40B4-BE49-F238E27FC236}">
+                <a16:creationId xmlns:a16="http://schemas.microsoft.com/office/drawing/2014/main" id="{24DF8DE0-D4D9-4282-B8D6-0BC692113907}"/>
+              </a:ext>
+            </a:extLst>
+          </p:cNvPr>
+          <p:cNvSpPr/>
+          <p:nvPr/>
+        </p:nvSpPr>
+        <p:spPr>
+          <a:xfrm>
+            <a:off x="4927498" y="1907343"/>
+            <a:ext cx="111125" cy="94582"/>
+          </a:xfrm>
+          <a:prstGeom prst="ellipse">
+            <a:avLst/>
+          </a:prstGeom>
+          <a:solidFill>
+            <a:schemeClr val="tx1"/>
+          </a:solidFill>
+          <a:ln>
+            <a:solidFill>
+              <a:schemeClr val="tx1"/>
+            </a:solidFill>
+          </a:ln>
+        </p:spPr>
+        <p:style>
+          <a:lnRef idx="2">
+            <a:schemeClr val="accent1">
+              <a:shade val="50000"/>
+            </a:schemeClr>
+          </a:lnRef>
+          <a:fillRef idx="1">
+            <a:schemeClr val="accent1"/>
+          </a:fillRef>
+          <a:effectRef idx="0">
+            <a:schemeClr val="accent1"/>
+          </a:effectRef>
+          <a:fontRef idx="minor">
+            <a:schemeClr val="lt1"/>
+          </a:fontRef>
+        </p:style>
+        <p:txBody>
+          <a:bodyPr rtlCol="0" anchor="ctr"/>
+          <a:lstStyle/>
+          <a:p>
+            <a:pPr algn="ctr"/>
+            <a:endParaRPr lang="pt-BR"/>
+          </a:p>
+        </p:txBody>
+      </p:sp>
+      <p:sp>
+        <p:nvSpPr>
+          <p:cNvPr id="60" name="Oval 59">
+            <a:extLst>
+              <a:ext uri="{FF2B5EF4-FFF2-40B4-BE49-F238E27FC236}">
+                <a16:creationId xmlns:a16="http://schemas.microsoft.com/office/drawing/2014/main" id="{8E82A7F9-4725-4FC4-8F52-81F44A0B2736}"/>
+              </a:ext>
+            </a:extLst>
+          </p:cNvPr>
+          <p:cNvSpPr/>
+          <p:nvPr/>
+        </p:nvSpPr>
+        <p:spPr>
+          <a:xfrm>
+            <a:off x="4751329" y="2168335"/>
+            <a:ext cx="111125" cy="94582"/>
+          </a:xfrm>
+          <a:prstGeom prst="ellipse">
+            <a:avLst/>
+          </a:prstGeom>
+          <a:solidFill>
+            <a:schemeClr val="tx1"/>
+          </a:solidFill>
+          <a:ln>
+            <a:solidFill>
+              <a:schemeClr val="tx1"/>
+            </a:solidFill>
+          </a:ln>
+        </p:spPr>
+        <p:style>
+          <a:lnRef idx="2">
+            <a:schemeClr val="accent1">
+              <a:shade val="50000"/>
+            </a:schemeClr>
+          </a:lnRef>
+          <a:fillRef idx="1">
+            <a:schemeClr val="accent1"/>
+          </a:fillRef>
+          <a:effectRef idx="0">
+            <a:schemeClr val="accent1"/>
+          </a:effectRef>
+          <a:fontRef idx="minor">
+            <a:schemeClr val="lt1"/>
+          </a:fontRef>
+        </p:style>
+        <p:txBody>
+          <a:bodyPr rtlCol="0" anchor="ctr"/>
+          <a:lstStyle/>
+          <a:p>
+            <a:pPr algn="ctr"/>
+            <a:endParaRPr lang="pt-BR"/>
+          </a:p>
+        </p:txBody>
+      </p:sp>
+      <p:sp>
+        <p:nvSpPr>
+          <p:cNvPr id="62" name="Oval 61">
+            <a:extLst>
+              <a:ext uri="{FF2B5EF4-FFF2-40B4-BE49-F238E27FC236}">
+                <a16:creationId xmlns:a16="http://schemas.microsoft.com/office/drawing/2014/main" id="{7D7595B8-4C1E-462D-BEFF-02010A5A9AD0}"/>
+              </a:ext>
+            </a:extLst>
+          </p:cNvPr>
+          <p:cNvSpPr/>
+          <p:nvPr/>
+        </p:nvSpPr>
+        <p:spPr>
+          <a:xfrm>
+            <a:off x="4491270" y="2445440"/>
+            <a:ext cx="111125" cy="94582"/>
+          </a:xfrm>
+          <a:prstGeom prst="ellipse">
+            <a:avLst/>
+          </a:prstGeom>
+          <a:solidFill>
+            <a:schemeClr val="tx1"/>
+          </a:solidFill>
+          <a:ln>
+            <a:solidFill>
+              <a:schemeClr val="tx1"/>
+            </a:solidFill>
+          </a:ln>
+        </p:spPr>
+        <p:style>
+          <a:lnRef idx="2">
+            <a:schemeClr val="accent1">
+              <a:shade val="50000"/>
+            </a:schemeClr>
+          </a:lnRef>
+          <a:fillRef idx="1">
+            <a:schemeClr val="accent1"/>
+          </a:fillRef>
+          <a:effectRef idx="0">
+            <a:schemeClr val="accent1"/>
+          </a:effectRef>
+          <a:fontRef idx="minor">
+            <a:schemeClr val="lt1"/>
+          </a:fontRef>
+        </p:style>
+        <p:txBody>
+          <a:bodyPr rtlCol="0" anchor="ctr"/>
+          <a:lstStyle/>
+          <a:p>
+            <a:pPr algn="ctr"/>
+            <a:endParaRPr lang="pt-BR"/>
+          </a:p>
+        </p:txBody>
+      </p:sp>
+      <p:cxnSp>
+        <p:nvCxnSpPr>
+          <p:cNvPr id="47" name="Straight Connector 46">
+            <a:extLst>
+              <a:ext uri="{FF2B5EF4-FFF2-40B4-BE49-F238E27FC236}">
+                <a16:creationId xmlns:a16="http://schemas.microsoft.com/office/drawing/2014/main" id="{7737246A-9B24-4FDF-B0FA-3C60E59891CD}"/>
+              </a:ext>
+            </a:extLst>
+          </p:cNvPr>
+          <p:cNvCxnSpPr>
+            <a:cxnSpLocks/>
+          </p:cNvCxnSpPr>
+          <p:nvPr/>
+        </p:nvCxnSpPr>
+        <p:spPr>
+          <a:xfrm>
+            <a:off x="3855246" y="3059262"/>
+            <a:ext cx="228511" cy="0"/>
+          </a:xfrm>
+          <a:prstGeom prst="line">
+            <a:avLst/>
+          </a:prstGeom>
+          <a:ln w="28575">
+            <a:solidFill>
+              <a:schemeClr val="tx1"/>
+            </a:solidFill>
+          </a:ln>
+        </p:spPr>
+        <p:style>
+          <a:lnRef idx="1">
+            <a:schemeClr val="accent1"/>
+          </a:lnRef>
+          <a:fillRef idx="0">
+            <a:schemeClr val="accent1"/>
+          </a:fillRef>
+          <a:effectRef idx="0">
+            <a:schemeClr val="accent1"/>
+          </a:effectRef>
+          <a:fontRef idx="minor">
+            <a:schemeClr val="tx1"/>
+          </a:fontRef>
+        </p:style>
+      </p:cxnSp>
+      <p:cxnSp>
+        <p:nvCxnSpPr>
+          <p:cNvPr id="53" name="Straight Connector 52">
+            <a:extLst>
+              <a:ext uri="{FF2B5EF4-FFF2-40B4-BE49-F238E27FC236}">
+                <a16:creationId xmlns:a16="http://schemas.microsoft.com/office/drawing/2014/main" id="{E4A4268C-4D6E-4E3D-8839-D926083C42F4}"/>
+              </a:ext>
+            </a:extLst>
+          </p:cNvPr>
+          <p:cNvCxnSpPr>
+            <a:cxnSpLocks/>
+          </p:cNvCxnSpPr>
+          <p:nvPr/>
+        </p:nvCxnSpPr>
+        <p:spPr>
+          <a:xfrm>
+            <a:off x="4083757" y="3059262"/>
+            <a:ext cx="0" cy="1341288"/>
+          </a:xfrm>
+          <a:prstGeom prst="line">
+            <a:avLst/>
+          </a:prstGeom>
+          <a:ln w="28575">
+            <a:solidFill>
+              <a:schemeClr val="tx1"/>
+            </a:solidFill>
+          </a:ln>
+        </p:spPr>
+        <p:style>
+          <a:lnRef idx="1">
+            <a:schemeClr val="accent1"/>
+          </a:lnRef>
+          <a:fillRef idx="0">
+            <a:schemeClr val="accent1"/>
+          </a:fillRef>
+          <a:effectRef idx="0">
+            <a:schemeClr val="accent1"/>
+          </a:effectRef>
+          <a:fontRef idx="minor">
+            <a:schemeClr val="tx1"/>
+          </a:fontRef>
+        </p:style>
+      </p:cxnSp>
+      <p:cxnSp>
+        <p:nvCxnSpPr>
+          <p:cNvPr id="67" name="Straight Arrow Connector 66">
+            <a:extLst>
+              <a:ext uri="{FF2B5EF4-FFF2-40B4-BE49-F238E27FC236}">
+                <a16:creationId xmlns:a16="http://schemas.microsoft.com/office/drawing/2014/main" id="{ACF5E315-0D5B-465F-A86A-0DF4519F70D8}"/>
+              </a:ext>
+            </a:extLst>
+          </p:cNvPr>
+          <p:cNvCxnSpPr>
+            <a:cxnSpLocks/>
+          </p:cNvCxnSpPr>
+          <p:nvPr/>
+        </p:nvCxnSpPr>
+        <p:spPr>
+          <a:xfrm>
+            <a:off x="4083757" y="4400550"/>
+            <a:ext cx="1355106" cy="0"/>
+          </a:xfrm>
+          <a:prstGeom prst="straightConnector1">
+            <a:avLst/>
+          </a:prstGeom>
+          <a:ln w="28575">
+            <a:solidFill>
+              <a:schemeClr val="tx1"/>
+            </a:solidFill>
+            <a:tailEnd type="triangle"/>
+          </a:ln>
+        </p:spPr>
+        <p:style>
+          <a:lnRef idx="1">
+            <a:schemeClr val="accent1"/>
+          </a:lnRef>
+          <a:fillRef idx="0">
+            <a:schemeClr val="accent1"/>
+          </a:fillRef>
+          <a:effectRef idx="0">
+            <a:schemeClr val="accent1"/>
+          </a:effectRef>
+          <a:fontRef idx="minor">
+            <a:schemeClr val="tx1"/>
+          </a:fontRef>
+        </p:style>
+      </p:cxnSp>
+    </p:spTree>
+    <p:extLst>
+      <p:ext uri="{BB962C8B-B14F-4D97-AF65-F5344CB8AC3E}">
+        <p14:creationId xmlns:p14="http://schemas.microsoft.com/office/powerpoint/2010/main" val="1304002449"/>
+      </p:ext>
+    </p:extLst>
+  </p:cSld>
+  <p:clrMapOvr>
+    <a:masterClrMapping/>
+  </p:clrMapOvr>
+</p:sld>
+</file>
+
 <file path=ppt/slides/slide2.xml><?xml version="1.0" encoding="utf-8"?>
 <p:sld xmlns:a="http://schemas.openxmlformats.org/drawingml/2006/main" xmlns:r="http://schemas.openxmlformats.org/officeDocument/2006/relationships" xmlns:p="http://schemas.openxmlformats.org/presentationml/2006/main">
   <p:cSld>

</xml_diff>